<commit_message>
Sun May 14 2017 15:58:46
</commit_message>
<xml_diff>
--- a/apresentacao.pptx
+++ b/apresentacao.pptx
@@ -5,7 +5,7 @@
     <p:sldMasterId id="2147483648" r:id="rId1"/>
   </p:sldMasterIdLst>
   <p:notesMasterIdLst>
-    <p:notesMasterId r:id="rId13"/>
+    <p:notesMasterId r:id="rId19"/>
   </p:notesMasterIdLst>
   <p:sldIdLst>
     <p:sldId id="256" r:id="rId2"/>
@@ -13,12 +13,18 @@
     <p:sldId id="258" r:id="rId4"/>
     <p:sldId id="261" r:id="rId5"/>
     <p:sldId id="262" r:id="rId6"/>
-    <p:sldId id="259" r:id="rId7"/>
-    <p:sldId id="263" r:id="rId8"/>
-    <p:sldId id="264" r:id="rId9"/>
-    <p:sldId id="265" r:id="rId10"/>
-    <p:sldId id="266" r:id="rId11"/>
-    <p:sldId id="260" r:id="rId12"/>
+    <p:sldId id="271" r:id="rId7"/>
+    <p:sldId id="259" r:id="rId8"/>
+    <p:sldId id="263" r:id="rId9"/>
+    <p:sldId id="264" r:id="rId10"/>
+    <p:sldId id="265" r:id="rId11"/>
+    <p:sldId id="272" r:id="rId12"/>
+    <p:sldId id="266" r:id="rId13"/>
+    <p:sldId id="270" r:id="rId14"/>
+    <p:sldId id="260" r:id="rId15"/>
+    <p:sldId id="267" r:id="rId16"/>
+    <p:sldId id="268" r:id="rId17"/>
+    <p:sldId id="269" r:id="rId18"/>
   </p:sldIdLst>
   <p:sldSz cx="9144000" cy="6858000" type="screen4x3"/>
   <p:notesSz cx="6858000" cy="9144000"/>
@@ -202,7 +208,8 @@
           <a:p>
             <a:fld id="{0730F96E-CD9F-47DE-9E3A-CF98BE122B94}" type="datetimeFigureOut">
               <a:rPr lang="pt-BR" smtClean="0"/>
-              <a:t>13/05/2017</a:t>
+              <a:pPr/>
+              <a:t>14/05/2017</a:t>
             </a:fld>
             <a:endParaRPr lang="pt-BR"/>
           </a:p>
@@ -363,6 +370,7 @@
           <a:p>
             <a:fld id="{C8C32A52-9B3C-426D-89F0-ABA11F806A10}" type="slidenum">
               <a:rPr lang="pt-BR" smtClean="0"/>
+              <a:pPr/>
               <a:t>‹nº›</a:t>
             </a:fld>
             <a:endParaRPr lang="pt-BR"/>
@@ -534,6 +542,7 @@
           <a:p>
             <a:fld id="{C8C32A52-9B3C-426D-89F0-ABA11F806A10}" type="slidenum">
               <a:rPr lang="pt-BR" smtClean="0"/>
+              <a:pPr/>
               <a:t>2</a:t>
             </a:fld>
             <a:endParaRPr lang="pt-BR"/>
@@ -729,7 +738,8 @@
           <a:p>
             <a:fld id="{194CB1D5-6381-4E76-AD57-B9022AD4A2C7}" type="datetime1">
               <a:rPr lang="pt-BR" smtClean="0"/>
-              <a:t>13/05/2017</a:t>
+              <a:pPr/>
+              <a:t>14/05/2017</a:t>
             </a:fld>
             <a:endParaRPr lang="pt-BR"/>
           </a:p>
@@ -771,6 +781,7 @@
           <a:p>
             <a:fld id="{7606F037-5F0B-48DD-A241-E3C6F3921244}" type="slidenum">
               <a:rPr lang="pt-BR" smtClean="0"/>
+              <a:pPr/>
               <a:t>‹nº›</a:t>
             </a:fld>
             <a:endParaRPr lang="pt-BR"/>
@@ -894,7 +905,8 @@
           <a:p>
             <a:fld id="{70AC06B7-17CA-46C5-9115-9CCDC26EB0F6}" type="datetime1">
               <a:rPr lang="pt-BR" smtClean="0"/>
-              <a:t>13/05/2017</a:t>
+              <a:pPr/>
+              <a:t>14/05/2017</a:t>
             </a:fld>
             <a:endParaRPr lang="pt-BR"/>
           </a:p>
@@ -936,6 +948,7 @@
           <a:p>
             <a:fld id="{7606F037-5F0B-48DD-A241-E3C6F3921244}" type="slidenum">
               <a:rPr lang="pt-BR" smtClean="0"/>
+              <a:pPr/>
               <a:t>‹nº›</a:t>
             </a:fld>
             <a:endParaRPr lang="pt-BR"/>
@@ -1069,7 +1082,8 @@
           <a:p>
             <a:fld id="{775CA797-804E-4AD7-A3C0-3795D50495EA}" type="datetime1">
               <a:rPr lang="pt-BR" smtClean="0"/>
-              <a:t>13/05/2017</a:t>
+              <a:pPr/>
+              <a:t>14/05/2017</a:t>
             </a:fld>
             <a:endParaRPr lang="pt-BR"/>
           </a:p>
@@ -1111,6 +1125,7 @@
           <a:p>
             <a:fld id="{7606F037-5F0B-48DD-A241-E3C6F3921244}" type="slidenum">
               <a:rPr lang="pt-BR" smtClean="0"/>
+              <a:pPr/>
               <a:t>‹nº›</a:t>
             </a:fld>
             <a:endParaRPr lang="pt-BR"/>
@@ -1234,7 +1249,8 @@
           <a:p>
             <a:fld id="{4D0D9180-9CC1-4B9F-BD86-289B320B5737}" type="datetime1">
               <a:rPr lang="pt-BR" smtClean="0"/>
-              <a:t>13/05/2017</a:t>
+              <a:pPr/>
+              <a:t>14/05/2017</a:t>
             </a:fld>
             <a:endParaRPr lang="pt-BR"/>
           </a:p>
@@ -1276,6 +1292,7 @@
           <a:p>
             <a:fld id="{7606F037-5F0B-48DD-A241-E3C6F3921244}" type="slidenum">
               <a:rPr lang="pt-BR" smtClean="0"/>
+              <a:pPr/>
               <a:t>‹nº›</a:t>
             </a:fld>
             <a:endParaRPr lang="pt-BR"/>
@@ -1475,7 +1492,8 @@
           <a:p>
             <a:fld id="{AC4D17E9-988B-4C37-B696-7B547BECE548}" type="datetime1">
               <a:rPr lang="pt-BR" smtClean="0"/>
-              <a:t>13/05/2017</a:t>
+              <a:pPr/>
+              <a:t>14/05/2017</a:t>
             </a:fld>
             <a:endParaRPr lang="pt-BR"/>
           </a:p>
@@ -1517,6 +1535,7 @@
           <a:p>
             <a:fld id="{7606F037-5F0B-48DD-A241-E3C6F3921244}" type="slidenum">
               <a:rPr lang="pt-BR" smtClean="0"/>
+              <a:pPr/>
               <a:t>‹nº›</a:t>
             </a:fld>
             <a:endParaRPr lang="pt-BR"/>
@@ -1758,7 +1777,8 @@
           <a:p>
             <a:fld id="{50B1281A-4B9C-4B49-9B6F-25AA207B80D1}" type="datetime1">
               <a:rPr lang="pt-BR" smtClean="0"/>
-              <a:t>13/05/2017</a:t>
+              <a:pPr/>
+              <a:t>14/05/2017</a:t>
             </a:fld>
             <a:endParaRPr lang="pt-BR"/>
           </a:p>
@@ -1800,6 +1820,7 @@
           <a:p>
             <a:fld id="{7606F037-5F0B-48DD-A241-E3C6F3921244}" type="slidenum">
               <a:rPr lang="pt-BR" smtClean="0"/>
+              <a:pPr/>
               <a:t>‹nº›</a:t>
             </a:fld>
             <a:endParaRPr lang="pt-BR"/>
@@ -2175,7 +2196,8 @@
           <a:p>
             <a:fld id="{EE4679D3-5732-4EAE-A664-C4FC7EA14FF8}" type="datetime1">
               <a:rPr lang="pt-BR" smtClean="0"/>
-              <a:t>13/05/2017</a:t>
+              <a:pPr/>
+              <a:t>14/05/2017</a:t>
             </a:fld>
             <a:endParaRPr lang="pt-BR"/>
           </a:p>
@@ -2217,6 +2239,7 @@
           <a:p>
             <a:fld id="{7606F037-5F0B-48DD-A241-E3C6F3921244}" type="slidenum">
               <a:rPr lang="pt-BR" smtClean="0"/>
+              <a:pPr/>
               <a:t>‹nº›</a:t>
             </a:fld>
             <a:endParaRPr lang="pt-BR"/>
@@ -2288,7 +2311,8 @@
           <a:p>
             <a:fld id="{DD2B67A8-A89F-4660-9469-7C809E93377A}" type="datetime1">
               <a:rPr lang="pt-BR" smtClean="0"/>
-              <a:t>13/05/2017</a:t>
+              <a:pPr/>
+              <a:t>14/05/2017</a:t>
             </a:fld>
             <a:endParaRPr lang="pt-BR"/>
           </a:p>
@@ -2330,6 +2354,7 @@
           <a:p>
             <a:fld id="{7606F037-5F0B-48DD-A241-E3C6F3921244}" type="slidenum">
               <a:rPr lang="pt-BR" smtClean="0"/>
+              <a:pPr/>
               <a:t>‹nº›</a:t>
             </a:fld>
             <a:endParaRPr lang="pt-BR"/>
@@ -2378,7 +2403,8 @@
           <a:p>
             <a:fld id="{5D952FB9-EC2D-4D24-B0DC-78BBD6D065F2}" type="datetime1">
               <a:rPr lang="pt-BR" smtClean="0"/>
-              <a:t>13/05/2017</a:t>
+              <a:pPr/>
+              <a:t>14/05/2017</a:t>
             </a:fld>
             <a:endParaRPr lang="pt-BR"/>
           </a:p>
@@ -2420,6 +2446,7 @@
           <a:p>
             <a:fld id="{7606F037-5F0B-48DD-A241-E3C6F3921244}" type="slidenum">
               <a:rPr lang="pt-BR" smtClean="0"/>
+              <a:pPr/>
               <a:t>‹nº›</a:t>
             </a:fld>
             <a:endParaRPr lang="pt-BR"/>
@@ -2650,7 +2677,8 @@
           <a:p>
             <a:fld id="{7AB76327-70CD-43EA-9FC5-1226846EB383}" type="datetime1">
               <a:rPr lang="pt-BR" smtClean="0"/>
-              <a:t>13/05/2017</a:t>
+              <a:pPr/>
+              <a:t>14/05/2017</a:t>
             </a:fld>
             <a:endParaRPr lang="pt-BR"/>
           </a:p>
@@ -2692,6 +2720,7 @@
           <a:p>
             <a:fld id="{7606F037-5F0B-48DD-A241-E3C6F3921244}" type="slidenum">
               <a:rPr lang="pt-BR" smtClean="0"/>
+              <a:pPr/>
               <a:t>‹nº›</a:t>
             </a:fld>
             <a:endParaRPr lang="pt-BR"/>
@@ -2898,7 +2927,8 @@
           <a:p>
             <a:fld id="{F4859177-8CEB-47E9-87D5-CA4581D77702}" type="datetime1">
               <a:rPr lang="pt-BR" smtClean="0"/>
-              <a:t>13/05/2017</a:t>
+              <a:pPr/>
+              <a:t>14/05/2017</a:t>
             </a:fld>
             <a:endParaRPr lang="pt-BR"/>
           </a:p>
@@ -2940,6 +2970,7 @@
           <a:p>
             <a:fld id="{7606F037-5F0B-48DD-A241-E3C6F3921244}" type="slidenum">
               <a:rPr lang="pt-BR" smtClean="0"/>
+              <a:pPr/>
               <a:t>‹nº›</a:t>
             </a:fld>
             <a:endParaRPr lang="pt-BR"/>
@@ -3106,7 +3137,8 @@
           <a:p>
             <a:fld id="{6782A638-3448-44BC-9962-075E4BB902B1}" type="datetime1">
               <a:rPr lang="pt-BR" smtClean="0"/>
-              <a:t>13/05/2017</a:t>
+              <a:pPr/>
+              <a:t>14/05/2017</a:t>
             </a:fld>
             <a:endParaRPr lang="pt-BR"/>
           </a:p>
@@ -3184,6 +3216,7 @@
           <a:p>
             <a:fld id="{7606F037-5F0B-48DD-A241-E3C6F3921244}" type="slidenum">
               <a:rPr lang="pt-BR" smtClean="0"/>
+              <a:pPr/>
               <a:t>‹nº›</a:t>
             </a:fld>
             <a:endParaRPr lang="pt-BR"/>
@@ -3582,6 +3615,7 @@
           <a:p>
             <a:fld id="{7606F037-5F0B-48DD-A241-E3C6F3921244}" type="slidenum">
               <a:rPr lang="pt-BR" smtClean="0"/>
+              <a:pPr/>
               <a:t>1</a:t>
             </a:fld>
             <a:endParaRPr lang="pt-BR"/>
@@ -3629,12 +3663,16 @@
           <a:lstStyle/>
           <a:p>
             <a:r>
+              <a:rPr lang="pt-BR" i="1" dirty="0" err="1" smtClean="0"/>
+              <a:t>Service</a:t>
+            </a:r>
+            <a:r>
               <a:rPr lang="pt-BR" i="1" dirty="0" smtClean="0"/>
-              <a:t>Web </a:t>
+              <a:t> </a:t>
             </a:r>
             <a:r>
               <a:rPr lang="pt-BR" i="1" dirty="0" err="1" smtClean="0"/>
-              <a:t>Manifest</a:t>
+              <a:t>Workers</a:t>
             </a:r>
             <a:endParaRPr lang="pt-BR" i="1" dirty="0"/>
           </a:p>
@@ -3657,18 +3695,11 @@
           <a:p>
             <a:r>
               <a:rPr lang="pt-BR" sz="2400" dirty="0" smtClean="0"/>
-              <a:t>Arquivo JSON</a:t>
-            </a:r>
-          </a:p>
-          <a:p>
-            <a:pPr lvl="1"/>
-            <a:r>
-              <a:rPr lang="pt-BR" sz="2400" dirty="0" smtClean="0"/>
-              <a:t>Atalho na </a:t>
+              <a:t>Servidor de </a:t>
             </a:r>
             <a:r>
               <a:rPr lang="pt-BR" sz="2400" i="1" dirty="0" err="1" smtClean="0"/>
-              <a:t>homescreen</a:t>
+              <a:t>proxy</a:t>
             </a:r>
             <a:r>
               <a:rPr lang="pt-BR" sz="2400" i="1" dirty="0" smtClean="0"/>
@@ -3676,25 +3707,40 @@
             </a:r>
             <a:r>
               <a:rPr lang="pt-BR" sz="2400" dirty="0" smtClean="0"/>
-              <a:t>do aparelho</a:t>
+              <a:t>de rede programável</a:t>
             </a:r>
           </a:p>
           <a:p>
             <a:pPr lvl="1"/>
             <a:r>
               <a:rPr lang="pt-BR" sz="2400" dirty="0" smtClean="0"/>
-              <a:t>Definição de temas</a:t>
+              <a:t>Execução em segundo plano</a:t>
             </a:r>
           </a:p>
           <a:p>
             <a:pPr lvl="1"/>
             <a:r>
               <a:rPr lang="pt-BR" sz="2400" dirty="0" smtClean="0"/>
-              <a:t>Personalização do tipo </a:t>
-            </a:r>
-            <a:r>
-              <a:rPr lang="pt-BR" sz="2400" smtClean="0"/>
-              <a:t>de exibição</a:t>
+              <a:t>Armazenamento em </a:t>
+            </a:r>
+            <a:r>
+              <a:rPr lang="pt-BR" sz="2400" i="1" dirty="0" err="1" smtClean="0"/>
+              <a:t>cache</a:t>
+            </a:r>
+            <a:r>
+              <a:rPr lang="pt-BR" sz="2400" i="1" dirty="0" smtClean="0"/>
+              <a:t> </a:t>
+            </a:r>
+            <a:r>
+              <a:rPr lang="pt-BR" sz="2400" dirty="0" smtClean="0"/>
+              <a:t>dos arquivos estáticos</a:t>
+            </a:r>
+          </a:p>
+          <a:p>
+            <a:pPr lvl="1"/>
+            <a:r>
+              <a:rPr lang="pt-BR" sz="2400" dirty="0" smtClean="0"/>
+              <a:t>Uso obrigatório de conexões seguras (HTTPS)</a:t>
             </a:r>
             <a:endParaRPr lang="pt-BR" dirty="0"/>
           </a:p>
@@ -3717,6 +3763,7 @@
           <a:p>
             <a:fld id="{7606F037-5F0B-48DD-A241-E3C6F3921244}" type="slidenum">
               <a:rPr lang="pt-BR" smtClean="0"/>
+              <a:pPr/>
               <a:t>10</a:t>
             </a:fld>
             <a:endParaRPr lang="pt-BR"/>
@@ -3755,6 +3802,328 @@
             <a:spLocks noGrp="1"/>
           </p:cNvSpPr>
           <p:nvPr>
+            <p:ph type="title"/>
+          </p:nvPr>
+        </p:nvSpPr>
+        <p:spPr/>
+        <p:txBody>
+          <a:bodyPr/>
+          <a:lstStyle/>
+          <a:p>
+            <a:r>
+              <a:rPr lang="pt-BR" dirty="0" smtClean="0"/>
+              <a:t>Ciclo de vida</a:t>
+            </a:r>
+            <a:endParaRPr lang="pt-BR" dirty="0"/>
+          </a:p>
+        </p:txBody>
+      </p:sp>
+      <p:pic>
+        <p:nvPicPr>
+          <p:cNvPr id="5" name="Espaço Reservado para Conteúdo 4" descr="sw-lifecycle.png"/>
+          <p:cNvPicPr>
+            <a:picLocks noGrp="1" noChangeAspect="1"/>
+          </p:cNvPicPr>
+          <p:nvPr>
+            <p:ph idx="1"/>
+          </p:nvPr>
+        </p:nvPicPr>
+        <p:blipFill>
+          <a:blip r:embed="rId2"/>
+          <a:stretch>
+            <a:fillRect/>
+          </a:stretch>
+        </p:blipFill>
+        <p:spPr>
+          <a:xfrm>
+            <a:off x="2252857" y="1600200"/>
+            <a:ext cx="4638286" cy="4525963"/>
+          </a:xfrm>
+        </p:spPr>
+      </p:pic>
+      <p:sp>
+        <p:nvSpPr>
+          <p:cNvPr id="4" name="Espaço Reservado para Número de Slide 3"/>
+          <p:cNvSpPr>
+            <a:spLocks noGrp="1"/>
+          </p:cNvSpPr>
+          <p:nvPr>
+            <p:ph type="sldNum" sz="quarter" idx="12"/>
+          </p:nvPr>
+        </p:nvSpPr>
+        <p:spPr/>
+        <p:txBody>
+          <a:bodyPr/>
+          <a:lstStyle/>
+          <a:p>
+            <a:fld id="{7606F037-5F0B-48DD-A241-E3C6F3921244}" type="slidenum">
+              <a:rPr lang="pt-BR" smtClean="0"/>
+              <a:pPr/>
+              <a:t>11</a:t>
+            </a:fld>
+            <a:endParaRPr lang="pt-BR"/>
+          </a:p>
+        </p:txBody>
+      </p:sp>
+    </p:spTree>
+  </p:cSld>
+  <p:clrMapOvr>
+    <a:masterClrMapping/>
+  </p:clrMapOvr>
+</p:sld>
+</file>
+
+<file path=ppt/slides/slide12.xml><?xml version="1.0" encoding="utf-8"?>
+<p:sld xmlns:a="http://schemas.openxmlformats.org/drawingml/2006/main" xmlns:r="http://schemas.openxmlformats.org/officeDocument/2006/relationships" xmlns:p="http://schemas.openxmlformats.org/presentationml/2006/main">
+  <p:cSld>
+    <p:spTree>
+      <p:nvGrpSpPr>
+        <p:cNvPr id="1" name=""/>
+        <p:cNvGrpSpPr/>
+        <p:nvPr/>
+      </p:nvGrpSpPr>
+      <p:grpSpPr>
+        <a:xfrm>
+          <a:off x="0" y="0"/>
+          <a:ext cx="0" cy="0"/>
+          <a:chOff x="0" y="0"/>
+          <a:chExt cx="0" cy="0"/>
+        </a:xfrm>
+      </p:grpSpPr>
+      <p:sp>
+        <p:nvSpPr>
+          <p:cNvPr id="2" name="Título 1"/>
+          <p:cNvSpPr>
+            <a:spLocks noGrp="1"/>
+          </p:cNvSpPr>
+          <p:nvPr>
+            <p:ph type="title"/>
+          </p:nvPr>
+        </p:nvSpPr>
+        <p:spPr/>
+        <p:txBody>
+          <a:bodyPr/>
+          <a:lstStyle/>
+          <a:p>
+            <a:r>
+              <a:rPr lang="pt-BR" i="1" dirty="0" smtClean="0"/>
+              <a:t>Web </a:t>
+            </a:r>
+            <a:r>
+              <a:rPr lang="pt-BR" i="1" dirty="0" err="1" smtClean="0"/>
+              <a:t>Manifest</a:t>
+            </a:r>
+            <a:endParaRPr lang="pt-BR" i="1" dirty="0"/>
+          </a:p>
+        </p:txBody>
+      </p:sp>
+      <p:sp>
+        <p:nvSpPr>
+          <p:cNvPr id="3" name="Espaço Reservado para Conteúdo 2"/>
+          <p:cNvSpPr>
+            <a:spLocks noGrp="1"/>
+          </p:cNvSpPr>
+          <p:nvPr>
+            <p:ph idx="1"/>
+          </p:nvPr>
+        </p:nvSpPr>
+        <p:spPr/>
+        <p:txBody>
+          <a:bodyPr/>
+          <a:lstStyle/>
+          <a:p>
+            <a:r>
+              <a:rPr lang="pt-BR" sz="2400" dirty="0" smtClean="0"/>
+              <a:t>Arquivo JSON</a:t>
+            </a:r>
+          </a:p>
+          <a:p>
+            <a:pPr lvl="1"/>
+            <a:r>
+              <a:rPr lang="pt-BR" sz="2400" dirty="0" smtClean="0"/>
+              <a:t>Atalho na </a:t>
+            </a:r>
+            <a:r>
+              <a:rPr lang="pt-BR" sz="2400" i="1" dirty="0" err="1" smtClean="0"/>
+              <a:t>homescreen</a:t>
+            </a:r>
+            <a:r>
+              <a:rPr lang="pt-BR" sz="2400" i="1" dirty="0" smtClean="0"/>
+              <a:t> </a:t>
+            </a:r>
+            <a:r>
+              <a:rPr lang="pt-BR" sz="2400" dirty="0" smtClean="0"/>
+              <a:t>do aparelho</a:t>
+            </a:r>
+          </a:p>
+          <a:p>
+            <a:pPr lvl="1"/>
+            <a:r>
+              <a:rPr lang="pt-BR" sz="2400" dirty="0" smtClean="0"/>
+              <a:t>Definição de temas</a:t>
+            </a:r>
+          </a:p>
+          <a:p>
+            <a:pPr lvl="1"/>
+            <a:r>
+              <a:rPr lang="pt-BR" sz="2400" dirty="0" smtClean="0"/>
+              <a:t>Personalização do tipo </a:t>
+            </a:r>
+            <a:r>
+              <a:rPr lang="pt-BR" sz="2400" smtClean="0"/>
+              <a:t>de exibição</a:t>
+            </a:r>
+            <a:endParaRPr lang="pt-BR" dirty="0"/>
+          </a:p>
+        </p:txBody>
+      </p:sp>
+      <p:sp>
+        <p:nvSpPr>
+          <p:cNvPr id="4" name="Espaço Reservado para Número de Slide 3"/>
+          <p:cNvSpPr>
+            <a:spLocks noGrp="1"/>
+          </p:cNvSpPr>
+          <p:nvPr>
+            <p:ph type="sldNum" sz="quarter" idx="12"/>
+          </p:nvPr>
+        </p:nvSpPr>
+        <p:spPr/>
+        <p:txBody>
+          <a:bodyPr/>
+          <a:lstStyle/>
+          <a:p>
+            <a:fld id="{7606F037-5F0B-48DD-A241-E3C6F3921244}" type="slidenum">
+              <a:rPr lang="pt-BR" smtClean="0"/>
+              <a:pPr/>
+              <a:t>12</a:t>
+            </a:fld>
+            <a:endParaRPr lang="pt-BR"/>
+          </a:p>
+        </p:txBody>
+      </p:sp>
+    </p:spTree>
+  </p:cSld>
+  <p:clrMapOvr>
+    <a:masterClrMapping/>
+  </p:clrMapOvr>
+</p:sld>
+</file>
+
+<file path=ppt/slides/slide13.xml><?xml version="1.0" encoding="utf-8"?>
+<p:sld xmlns:a="http://schemas.openxmlformats.org/drawingml/2006/main" xmlns:r="http://schemas.openxmlformats.org/officeDocument/2006/relationships" xmlns:p="http://schemas.openxmlformats.org/presentationml/2006/main">
+  <p:cSld>
+    <p:spTree>
+      <p:nvGrpSpPr>
+        <p:cNvPr id="1" name=""/>
+        <p:cNvGrpSpPr/>
+        <p:nvPr/>
+      </p:nvGrpSpPr>
+      <p:grpSpPr>
+        <a:xfrm>
+          <a:off x="0" y="0"/>
+          <a:ext cx="0" cy="0"/>
+          <a:chOff x="0" y="0"/>
+          <a:chExt cx="0" cy="0"/>
+        </a:xfrm>
+      </p:grpSpPr>
+      <p:sp>
+        <p:nvSpPr>
+          <p:cNvPr id="2" name="Título 1"/>
+          <p:cNvSpPr>
+            <a:spLocks noGrp="1"/>
+          </p:cNvSpPr>
+          <p:nvPr>
+            <p:ph type="title"/>
+          </p:nvPr>
+        </p:nvSpPr>
+        <p:spPr/>
+        <p:txBody>
+          <a:bodyPr/>
+          <a:lstStyle/>
+          <a:p>
+            <a:r>
+              <a:rPr lang="pt-BR" dirty="0" smtClean="0"/>
+              <a:t>Problemas</a:t>
+            </a:r>
+            <a:endParaRPr lang="pt-BR" dirty="0"/>
+          </a:p>
+        </p:txBody>
+      </p:sp>
+      <p:sp>
+        <p:nvSpPr>
+          <p:cNvPr id="3" name="Espaço Reservado para Conteúdo 2"/>
+          <p:cNvSpPr>
+            <a:spLocks noGrp="1"/>
+          </p:cNvSpPr>
+          <p:nvPr>
+            <p:ph idx="1"/>
+          </p:nvPr>
+        </p:nvSpPr>
+        <p:spPr/>
+        <p:txBody>
+          <a:bodyPr/>
+          <a:lstStyle/>
+          <a:p>
+            <a:endParaRPr lang="pt-BR" sz="2400" dirty="0" smtClean="0"/>
+          </a:p>
+        </p:txBody>
+      </p:sp>
+      <p:sp>
+        <p:nvSpPr>
+          <p:cNvPr id="4" name="Espaço Reservado para Número de Slide 3"/>
+          <p:cNvSpPr>
+            <a:spLocks noGrp="1"/>
+          </p:cNvSpPr>
+          <p:nvPr>
+            <p:ph type="sldNum" sz="quarter" idx="12"/>
+          </p:nvPr>
+        </p:nvSpPr>
+        <p:spPr/>
+        <p:txBody>
+          <a:bodyPr/>
+          <a:lstStyle/>
+          <a:p>
+            <a:fld id="{7606F037-5F0B-48DD-A241-E3C6F3921244}" type="slidenum">
+              <a:rPr lang="pt-BR" smtClean="0"/>
+              <a:pPr/>
+              <a:t>13</a:t>
+            </a:fld>
+            <a:endParaRPr lang="pt-BR"/>
+          </a:p>
+        </p:txBody>
+      </p:sp>
+    </p:spTree>
+  </p:cSld>
+  <p:clrMapOvr>
+    <a:masterClrMapping/>
+  </p:clrMapOvr>
+</p:sld>
+</file>
+
+<file path=ppt/slides/slide14.xml><?xml version="1.0" encoding="utf-8"?>
+<p:sld xmlns:a="http://schemas.openxmlformats.org/drawingml/2006/main" xmlns:r="http://schemas.openxmlformats.org/officeDocument/2006/relationships" xmlns:p="http://schemas.openxmlformats.org/presentationml/2006/main">
+  <p:cSld>
+    <p:spTree>
+      <p:nvGrpSpPr>
+        <p:cNvPr id="1" name=""/>
+        <p:cNvGrpSpPr/>
+        <p:nvPr/>
+      </p:nvGrpSpPr>
+      <p:grpSpPr>
+        <a:xfrm>
+          <a:off x="0" y="0"/>
+          <a:ext cx="0" cy="0"/>
+          <a:chOff x="0" y="0"/>
+          <a:chExt cx="0" cy="0"/>
+        </a:xfrm>
+      </p:grpSpPr>
+      <p:sp>
+        <p:nvSpPr>
+          <p:cNvPr id="2" name="Título 1"/>
+          <p:cNvSpPr>
+            <a:spLocks noGrp="1"/>
+          </p:cNvSpPr>
+          <p:nvPr>
             <p:ph type="ctrTitle"/>
           </p:nvPr>
         </p:nvSpPr>
@@ -3807,7 +4176,281 @@
           <a:p>
             <a:fld id="{7606F037-5F0B-48DD-A241-E3C6F3921244}" type="slidenum">
               <a:rPr lang="pt-BR" smtClean="0"/>
-              <a:t>11</a:t>
+              <a:pPr/>
+              <a:t>14</a:t>
+            </a:fld>
+            <a:endParaRPr lang="pt-BR"/>
+          </a:p>
+        </p:txBody>
+      </p:sp>
+    </p:spTree>
+  </p:cSld>
+  <p:clrMapOvr>
+    <a:masterClrMapping/>
+  </p:clrMapOvr>
+</p:sld>
+</file>
+
+<file path=ppt/slides/slide15.xml><?xml version="1.0" encoding="utf-8"?>
+<p:sld xmlns:a="http://schemas.openxmlformats.org/drawingml/2006/main" xmlns:r="http://schemas.openxmlformats.org/officeDocument/2006/relationships" xmlns:p="http://schemas.openxmlformats.org/presentationml/2006/main">
+  <p:cSld>
+    <p:spTree>
+      <p:nvGrpSpPr>
+        <p:cNvPr id="1" name=""/>
+        <p:cNvGrpSpPr/>
+        <p:nvPr/>
+      </p:nvGrpSpPr>
+      <p:grpSpPr>
+        <a:xfrm>
+          <a:off x="0" y="0"/>
+          <a:ext cx="0" cy="0"/>
+          <a:chOff x="0" y="0"/>
+          <a:chExt cx="0" cy="0"/>
+        </a:xfrm>
+      </p:grpSpPr>
+      <p:sp>
+        <p:nvSpPr>
+          <p:cNvPr id="2" name="Título 1"/>
+          <p:cNvSpPr>
+            <a:spLocks noGrp="1"/>
+          </p:cNvSpPr>
+          <p:nvPr>
+            <p:ph type="title"/>
+          </p:nvPr>
+        </p:nvSpPr>
+        <p:spPr/>
+        <p:txBody>
+          <a:bodyPr/>
+          <a:lstStyle/>
+          <a:p>
+            <a:r>
+              <a:rPr lang="pt-BR" dirty="0" smtClean="0"/>
+              <a:t>Cronograma</a:t>
+            </a:r>
+            <a:endParaRPr lang="pt-BR" dirty="0"/>
+          </a:p>
+        </p:txBody>
+      </p:sp>
+      <p:sp>
+        <p:nvSpPr>
+          <p:cNvPr id="3" name="Espaço Reservado para Conteúdo 2"/>
+          <p:cNvSpPr>
+            <a:spLocks noGrp="1"/>
+          </p:cNvSpPr>
+          <p:nvPr>
+            <p:ph idx="1"/>
+          </p:nvPr>
+        </p:nvSpPr>
+        <p:spPr/>
+        <p:txBody>
+          <a:bodyPr/>
+          <a:lstStyle/>
+          <a:p>
+            <a:endParaRPr lang="pt-BR"/>
+          </a:p>
+        </p:txBody>
+      </p:sp>
+      <p:sp>
+        <p:nvSpPr>
+          <p:cNvPr id="4" name="Espaço Reservado para Número de Slide 3"/>
+          <p:cNvSpPr>
+            <a:spLocks noGrp="1"/>
+          </p:cNvSpPr>
+          <p:nvPr>
+            <p:ph type="sldNum" sz="quarter" idx="12"/>
+          </p:nvPr>
+        </p:nvSpPr>
+        <p:spPr/>
+        <p:txBody>
+          <a:bodyPr/>
+          <a:lstStyle/>
+          <a:p>
+            <a:fld id="{7606F037-5F0B-48DD-A241-E3C6F3921244}" type="slidenum">
+              <a:rPr lang="pt-BR" smtClean="0"/>
+              <a:pPr/>
+              <a:t>15</a:t>
+            </a:fld>
+            <a:endParaRPr lang="pt-BR"/>
+          </a:p>
+        </p:txBody>
+      </p:sp>
+    </p:spTree>
+  </p:cSld>
+  <p:clrMapOvr>
+    <a:masterClrMapping/>
+  </p:clrMapOvr>
+</p:sld>
+</file>
+
+<file path=ppt/slides/slide16.xml><?xml version="1.0" encoding="utf-8"?>
+<p:sld xmlns:a="http://schemas.openxmlformats.org/drawingml/2006/main" xmlns:r="http://schemas.openxmlformats.org/officeDocument/2006/relationships" xmlns:p="http://schemas.openxmlformats.org/presentationml/2006/main">
+  <p:cSld>
+    <p:spTree>
+      <p:nvGrpSpPr>
+        <p:cNvPr id="1" name=""/>
+        <p:cNvGrpSpPr/>
+        <p:nvPr/>
+      </p:nvGrpSpPr>
+      <p:grpSpPr>
+        <a:xfrm>
+          <a:off x="0" y="0"/>
+          <a:ext cx="0" cy="0"/>
+          <a:chOff x="0" y="0"/>
+          <a:chExt cx="0" cy="0"/>
+        </a:xfrm>
+      </p:grpSpPr>
+      <p:sp>
+        <p:nvSpPr>
+          <p:cNvPr id="2" name="Título 1"/>
+          <p:cNvSpPr>
+            <a:spLocks noGrp="1"/>
+          </p:cNvSpPr>
+          <p:nvPr>
+            <p:ph type="title"/>
+          </p:nvPr>
+        </p:nvSpPr>
+        <p:spPr/>
+        <p:txBody>
+          <a:bodyPr/>
+          <a:lstStyle/>
+          <a:p>
+            <a:r>
+              <a:rPr lang="pt-BR" dirty="0" smtClean="0"/>
+              <a:t>Referências</a:t>
+            </a:r>
+            <a:endParaRPr lang="pt-BR" dirty="0"/>
+          </a:p>
+        </p:txBody>
+      </p:sp>
+      <p:sp>
+        <p:nvSpPr>
+          <p:cNvPr id="3" name="Espaço Reservado para Conteúdo 2"/>
+          <p:cNvSpPr>
+            <a:spLocks noGrp="1"/>
+          </p:cNvSpPr>
+          <p:nvPr>
+            <p:ph idx="1"/>
+          </p:nvPr>
+        </p:nvSpPr>
+        <p:spPr/>
+        <p:txBody>
+          <a:bodyPr/>
+          <a:lstStyle/>
+          <a:p>
+            <a:endParaRPr lang="pt-BR" dirty="0"/>
+          </a:p>
+        </p:txBody>
+      </p:sp>
+      <p:sp>
+        <p:nvSpPr>
+          <p:cNvPr id="4" name="Espaço Reservado para Número de Slide 3"/>
+          <p:cNvSpPr>
+            <a:spLocks noGrp="1"/>
+          </p:cNvSpPr>
+          <p:nvPr>
+            <p:ph type="sldNum" sz="quarter" idx="12"/>
+          </p:nvPr>
+        </p:nvSpPr>
+        <p:spPr/>
+        <p:txBody>
+          <a:bodyPr/>
+          <a:lstStyle/>
+          <a:p>
+            <a:fld id="{7606F037-5F0B-48DD-A241-E3C6F3921244}" type="slidenum">
+              <a:rPr lang="pt-BR" smtClean="0"/>
+              <a:pPr/>
+              <a:t>16</a:t>
+            </a:fld>
+            <a:endParaRPr lang="pt-BR"/>
+          </a:p>
+        </p:txBody>
+      </p:sp>
+    </p:spTree>
+  </p:cSld>
+  <p:clrMapOvr>
+    <a:masterClrMapping/>
+  </p:clrMapOvr>
+</p:sld>
+</file>
+
+<file path=ppt/slides/slide17.xml><?xml version="1.0" encoding="utf-8"?>
+<p:sld xmlns:a="http://schemas.openxmlformats.org/drawingml/2006/main" xmlns:r="http://schemas.openxmlformats.org/officeDocument/2006/relationships" xmlns:p="http://schemas.openxmlformats.org/presentationml/2006/main">
+  <p:cSld>
+    <p:spTree>
+      <p:nvGrpSpPr>
+        <p:cNvPr id="1" name=""/>
+        <p:cNvGrpSpPr/>
+        <p:nvPr/>
+      </p:nvGrpSpPr>
+      <p:grpSpPr>
+        <a:xfrm>
+          <a:off x="0" y="0"/>
+          <a:ext cx="0" cy="0"/>
+          <a:chOff x="0" y="0"/>
+          <a:chExt cx="0" cy="0"/>
+        </a:xfrm>
+      </p:grpSpPr>
+      <p:sp>
+        <p:nvSpPr>
+          <p:cNvPr id="2" name="Título 1"/>
+          <p:cNvSpPr>
+            <a:spLocks noGrp="1"/>
+          </p:cNvSpPr>
+          <p:nvPr>
+            <p:ph type="ctrTitle"/>
+          </p:nvPr>
+        </p:nvSpPr>
+        <p:spPr/>
+        <p:txBody>
+          <a:bodyPr/>
+          <a:lstStyle/>
+          <a:p>
+            <a:r>
+              <a:rPr lang="pt-BR" dirty="0" smtClean="0"/>
+              <a:t>Obrigado pela atenção.</a:t>
+            </a:r>
+            <a:endParaRPr lang="pt-BR" dirty="0"/>
+          </a:p>
+        </p:txBody>
+      </p:sp>
+      <p:sp>
+        <p:nvSpPr>
+          <p:cNvPr id="3" name="Subtítulo 2"/>
+          <p:cNvSpPr>
+            <a:spLocks noGrp="1"/>
+          </p:cNvSpPr>
+          <p:nvPr>
+            <p:ph type="subTitle" idx="1"/>
+          </p:nvPr>
+        </p:nvSpPr>
+        <p:spPr/>
+        <p:txBody>
+          <a:bodyPr/>
+          <a:lstStyle/>
+          <a:p>
+            <a:endParaRPr lang="pt-BR"/>
+          </a:p>
+        </p:txBody>
+      </p:sp>
+      <p:sp>
+        <p:nvSpPr>
+          <p:cNvPr id="4" name="Espaço Reservado para Número de Slide 3"/>
+          <p:cNvSpPr>
+            <a:spLocks noGrp="1"/>
+          </p:cNvSpPr>
+          <p:nvPr>
+            <p:ph type="sldNum" sz="quarter" idx="12"/>
+          </p:nvPr>
+        </p:nvSpPr>
+        <p:spPr/>
+        <p:txBody>
+          <a:bodyPr/>
+          <a:lstStyle/>
+          <a:p>
+            <a:fld id="{7606F037-5F0B-48DD-A241-E3C6F3921244}" type="slidenum">
+              <a:rPr lang="pt-BR" smtClean="0"/>
+              <a:pPr/>
+              <a:t>17</a:t>
             </a:fld>
             <a:endParaRPr lang="pt-BR"/>
           </a:p>
@@ -3964,6 +4607,7 @@
           <a:p>
             <a:fld id="{7606F037-5F0B-48DD-A241-E3C6F3921244}" type="slidenum">
               <a:rPr lang="pt-BR" smtClean="0"/>
+              <a:pPr/>
               <a:t>2</a:t>
             </a:fld>
             <a:endParaRPr lang="pt-BR"/>
@@ -4054,6 +4698,7 @@
           <a:p>
             <a:fld id="{7606F037-5F0B-48DD-A241-E3C6F3921244}" type="slidenum">
               <a:rPr lang="pt-BR" smtClean="0"/>
+              <a:pPr/>
               <a:t>3</a:t>
             </a:fld>
             <a:endParaRPr lang="pt-BR"/>
@@ -4200,6 +4845,7 @@
           <a:p>
             <a:fld id="{7606F037-5F0B-48DD-A241-E3C6F3921244}" type="slidenum">
               <a:rPr lang="pt-BR" smtClean="0"/>
+              <a:pPr/>
               <a:t>4</a:t>
             </a:fld>
             <a:endParaRPr lang="pt-BR"/>
@@ -4341,6 +4987,7 @@
           <a:p>
             <a:fld id="{7606F037-5F0B-48DD-A241-E3C6F3921244}" type="slidenum">
               <a:rPr lang="pt-BR" smtClean="0"/>
+              <a:pPr/>
               <a:t>5</a:t>
             </a:fld>
             <a:endParaRPr lang="pt-BR"/>
@@ -4379,7 +5026,7 @@
             <a:spLocks noGrp="1"/>
           </p:cNvSpPr>
           <p:nvPr>
-            <p:ph type="ctrTitle"/>
+            <p:ph type="title"/>
           </p:nvPr>
         </p:nvSpPr>
         <p:spPr/>
@@ -4389,7 +5036,7 @@
           <a:p>
             <a:r>
               <a:rPr lang="pt-BR" dirty="0" smtClean="0"/>
-              <a:t>II – Referencial Teórico</a:t>
+              <a:t>Objetivos</a:t>
             </a:r>
             <a:endParaRPr lang="pt-BR" dirty="0"/>
           </a:p>
@@ -4397,20 +5044,36 @@
       </p:sp>
       <p:sp>
         <p:nvSpPr>
-          <p:cNvPr id="3" name="Subtítulo 2"/>
-          <p:cNvSpPr>
-            <a:spLocks noGrp="1"/>
-          </p:cNvSpPr>
-          <p:nvPr>
-            <p:ph type="subTitle" idx="1"/>
-          </p:nvPr>
-        </p:nvSpPr>
-        <p:spPr/>
-        <p:txBody>
-          <a:bodyPr/>
-          <a:lstStyle/>
-          <a:p>
-            <a:endParaRPr lang="pt-BR"/>
+          <p:cNvPr id="3" name="Espaço Reservado para Conteúdo 2"/>
+          <p:cNvSpPr>
+            <a:spLocks noGrp="1"/>
+          </p:cNvSpPr>
+          <p:nvPr>
+            <p:ph idx="1"/>
+          </p:nvPr>
+        </p:nvSpPr>
+        <p:spPr/>
+        <p:txBody>
+          <a:bodyPr>
+            <a:normAutofit/>
+          </a:bodyPr>
+          <a:lstStyle/>
+          <a:p>
+            <a:r>
+              <a:rPr lang="pt-BR" sz="2400" dirty="0" smtClean="0"/>
+              <a:t>Apresentar as tecnologias que compõem um </a:t>
+            </a:r>
+            <a:r>
+              <a:rPr lang="pt-BR" sz="2400" i="1" dirty="0" smtClean="0"/>
+              <a:t>progressive web app</a:t>
+            </a:r>
+          </a:p>
+          <a:p>
+            <a:r>
+              <a:rPr lang="pt-BR" sz="2400" dirty="0" smtClean="0"/>
+              <a:t>Descrever tipos de aplicações onde a abordagem pouco ou nada têm a contribuir</a:t>
+            </a:r>
+            <a:endParaRPr lang="pt-BR" sz="2400" dirty="0" smtClean="0"/>
           </a:p>
         </p:txBody>
       </p:sp>
@@ -4431,6 +5094,7 @@
           <a:p>
             <a:fld id="{7606F037-5F0B-48DD-A241-E3C6F3921244}" type="slidenum">
               <a:rPr lang="pt-BR" smtClean="0"/>
+              <a:pPr/>
               <a:t>6</a:t>
             </a:fld>
             <a:endParaRPr lang="pt-BR"/>
@@ -4469,98 +5133,43 @@
             <a:spLocks noGrp="1"/>
           </p:cNvSpPr>
           <p:nvPr>
-            <p:ph type="title"/>
-          </p:nvPr>
-        </p:nvSpPr>
-        <p:spPr/>
-        <p:txBody>
-          <a:bodyPr/>
-          <a:lstStyle/>
-          <a:p>
-            <a:r>
-              <a:rPr lang="pt-BR" i="1" dirty="0" smtClean="0"/>
-              <a:t>Progressive Web Apps</a:t>
-            </a:r>
-            <a:endParaRPr lang="pt-BR" i="1" dirty="0"/>
-          </a:p>
-        </p:txBody>
-      </p:sp>
-      <p:sp>
-        <p:nvSpPr>
-          <p:cNvPr id="3" name="Espaço Reservado para Conteúdo 2"/>
-          <p:cNvSpPr>
-            <a:spLocks noGrp="1"/>
-          </p:cNvSpPr>
-          <p:nvPr>
-            <p:ph idx="1"/>
-          </p:nvPr>
-        </p:nvSpPr>
-        <p:spPr/>
-        <p:txBody>
-          <a:bodyPr/>
-          <a:lstStyle/>
-          <a:p>
-            <a:r>
-              <a:rPr lang="pt-BR" sz="2400" dirty="0" smtClean="0"/>
-              <a:t>Conjunto de tecnologias</a:t>
-            </a:r>
-          </a:p>
-          <a:p>
-            <a:pPr lvl="1"/>
-            <a:r>
-              <a:rPr lang="pt-BR" sz="2400" dirty="0" smtClean="0"/>
-              <a:t>Visual de aplicativos nativos</a:t>
-            </a:r>
-          </a:p>
-          <a:p>
-            <a:pPr lvl="1"/>
-            <a:r>
-              <a:rPr lang="pt-BR" sz="2400" dirty="0" smtClean="0"/>
-              <a:t>Carregamento rápido e confiável</a:t>
-            </a:r>
-          </a:p>
-          <a:p>
-            <a:pPr lvl="1"/>
-            <a:r>
-              <a:rPr lang="pt-BR" sz="2400" dirty="0" smtClean="0"/>
-              <a:t>Seguro</a:t>
-            </a:r>
-          </a:p>
-          <a:p>
-            <a:pPr lvl="1"/>
-            <a:r>
-              <a:rPr lang="pt-BR" sz="2400" dirty="0" err="1" smtClean="0"/>
-              <a:t>Indexável</a:t>
-            </a:r>
-            <a:endParaRPr lang="pt-BR" sz="2400" dirty="0" smtClean="0"/>
-          </a:p>
-          <a:p>
-            <a:pPr lvl="1"/>
-            <a:r>
-              <a:rPr lang="pt-BR" sz="2400" dirty="0" smtClean="0"/>
-              <a:t>Ícone de atalho na </a:t>
-            </a:r>
-            <a:r>
-              <a:rPr lang="pt-BR" sz="2400" i="1" dirty="0" err="1" smtClean="0"/>
-              <a:t>homescreen</a:t>
-            </a:r>
-            <a:r>
-              <a:rPr lang="pt-BR" sz="2400" i="1" dirty="0" smtClean="0"/>
-              <a:t> </a:t>
-            </a:r>
-            <a:r>
-              <a:rPr lang="pt-BR" sz="2400" dirty="0" smtClean="0"/>
-              <a:t>do aparelho</a:t>
-            </a:r>
-          </a:p>
-          <a:p>
-            <a:pPr lvl="1"/>
+            <p:ph type="ctrTitle"/>
+          </p:nvPr>
+        </p:nvSpPr>
+        <p:spPr/>
+        <p:txBody>
+          <a:bodyPr/>
+          <a:lstStyle/>
+          <a:p>
+            <a:r>
+              <a:rPr lang="pt-BR" dirty="0" smtClean="0"/>
+              <a:t>II – Referencial Teórico</a:t>
+            </a:r>
             <a:endParaRPr lang="pt-BR" dirty="0"/>
           </a:p>
         </p:txBody>
       </p:sp>
       <p:sp>
         <p:nvSpPr>
+          <p:cNvPr id="3" name="Subtítulo 2"/>
+          <p:cNvSpPr>
+            <a:spLocks noGrp="1"/>
+          </p:cNvSpPr>
+          <p:nvPr>
+            <p:ph type="subTitle" idx="1"/>
+          </p:nvPr>
+        </p:nvSpPr>
+        <p:spPr/>
+        <p:txBody>
+          <a:bodyPr/>
+          <a:lstStyle/>
+          <a:p>
+            <a:endParaRPr lang="pt-BR"/>
+          </a:p>
+        </p:txBody>
+      </p:sp>
+      <p:sp>
+        <p:nvSpPr>
           <p:cNvPr id="4" name="Espaço Reservado para Número de Slide 3"/>
           <p:cNvSpPr>
             <a:spLocks noGrp="1"/>
@@ -4576,6 +5185,7 @@
           <a:p>
             <a:fld id="{7606F037-5F0B-48DD-A241-E3C6F3921244}" type="slidenum">
               <a:rPr lang="pt-BR" smtClean="0"/>
+              <a:pPr/>
               <a:t>7</a:t>
             </a:fld>
             <a:endParaRPr lang="pt-BR"/>
@@ -4624,7 +5234,7 @@
           <a:p>
             <a:r>
               <a:rPr lang="pt-BR" i="1" dirty="0" smtClean="0"/>
-              <a:t>Application Shell</a:t>
+              <a:t>Progressive Web Apps</a:t>
             </a:r>
             <a:endParaRPr lang="pt-BR" i="1" dirty="0"/>
           </a:p>
@@ -4647,46 +5257,59 @@
           <a:p>
             <a:r>
               <a:rPr lang="pt-BR" sz="2400" dirty="0" smtClean="0"/>
-              <a:t>Modelo arquitetural</a:t>
+              <a:t>Conjunto de tecnologias</a:t>
             </a:r>
           </a:p>
           <a:p>
             <a:pPr lvl="1"/>
             <a:r>
               <a:rPr lang="pt-BR" sz="2400" dirty="0" smtClean="0"/>
-              <a:t>Arquivos de </a:t>
+              <a:t>Visual de aplicativos nativos</a:t>
+            </a:r>
+          </a:p>
+          <a:p>
+            <a:pPr lvl="1"/>
+            <a:r>
+              <a:rPr lang="pt-BR" sz="2400" dirty="0" smtClean="0"/>
+              <a:t>Carregamento rápido e confiável</a:t>
+            </a:r>
+          </a:p>
+          <a:p>
+            <a:pPr lvl="1"/>
+            <a:r>
+              <a:rPr lang="pt-BR" sz="2400" dirty="0" smtClean="0"/>
+              <a:t>Seguro</a:t>
+            </a:r>
+          </a:p>
+          <a:p>
+            <a:pPr lvl="1"/>
+            <a:r>
+              <a:rPr lang="pt-BR" sz="2400" dirty="0" err="1" smtClean="0"/>
+              <a:t>Indexável</a:t>
+            </a:r>
+            <a:endParaRPr lang="pt-BR" sz="2400" dirty="0" smtClean="0"/>
+          </a:p>
+          <a:p>
+            <a:pPr lvl="1"/>
+            <a:r>
+              <a:rPr lang="pt-BR" sz="2400" dirty="0" smtClean="0"/>
+              <a:t>Ícone de atalho na </a:t>
             </a:r>
             <a:r>
               <a:rPr lang="pt-BR" sz="2400" i="1" dirty="0" err="1" smtClean="0"/>
-              <a:t>user</a:t>
+              <a:t>homescreen</a:t>
             </a:r>
             <a:r>
               <a:rPr lang="pt-BR" sz="2400" i="1" dirty="0" smtClean="0"/>
-              <a:t> interface </a:t>
+              <a:t> </a:t>
             </a:r>
             <a:r>
               <a:rPr lang="pt-BR" sz="2400" dirty="0" smtClean="0"/>
-              <a:t>armazenados em </a:t>
-            </a:r>
-            <a:r>
-              <a:rPr lang="pt-BR" sz="2400" i="1" dirty="0" err="1" smtClean="0"/>
-              <a:t>cache</a:t>
-            </a:r>
-            <a:endParaRPr lang="pt-BR" sz="2400" dirty="0" smtClean="0"/>
+              <a:t>do aparelho</a:t>
+            </a:r>
           </a:p>
           <a:p>
             <a:pPr lvl="1"/>
-            <a:r>
-              <a:rPr lang="pt-BR" sz="2400" dirty="0" smtClean="0"/>
-              <a:t>Dados dinâmicos sendo requisitados na rede</a:t>
-            </a:r>
-          </a:p>
-          <a:p>
-            <a:pPr lvl="1"/>
-            <a:r>
-              <a:rPr lang="pt-BR" sz="2400" dirty="0" smtClean="0"/>
-              <a:t>Economia no uso de dados</a:t>
-            </a:r>
             <a:endParaRPr lang="pt-BR" dirty="0"/>
           </a:p>
         </p:txBody>
@@ -4708,6 +5331,7 @@
           <a:p>
             <a:fld id="{7606F037-5F0B-48DD-A241-E3C6F3921244}" type="slidenum">
               <a:rPr lang="pt-BR" smtClean="0"/>
+              <a:pPr/>
               <a:t>8</a:t>
             </a:fld>
             <a:endParaRPr lang="pt-BR"/>
@@ -4755,16 +5379,8 @@
           <a:lstStyle/>
           <a:p>
             <a:r>
-              <a:rPr lang="pt-BR" i="1" dirty="0" err="1" smtClean="0"/>
-              <a:t>Service</a:t>
-            </a:r>
-            <a:r>
               <a:rPr lang="pt-BR" i="1" dirty="0" smtClean="0"/>
-              <a:t> </a:t>
-            </a:r>
-            <a:r>
-              <a:rPr lang="pt-BR" i="1" dirty="0" err="1" smtClean="0"/>
-              <a:t>Workers</a:t>
+              <a:t>Application Shell</a:t>
             </a:r>
             <a:endParaRPr lang="pt-BR" i="1" dirty="0"/>
           </a:p>
@@ -4787,52 +5403,45 @@
           <a:p>
             <a:r>
               <a:rPr lang="pt-BR" sz="2400" dirty="0" smtClean="0"/>
-              <a:t>Servidor de </a:t>
+              <a:t>Modelo arquitetural</a:t>
+            </a:r>
+          </a:p>
+          <a:p>
+            <a:pPr lvl="1"/>
+            <a:r>
+              <a:rPr lang="pt-BR" sz="2400" dirty="0" smtClean="0"/>
+              <a:t>Arquivos de </a:t>
             </a:r>
             <a:r>
               <a:rPr lang="pt-BR" sz="2400" i="1" dirty="0" err="1" smtClean="0"/>
-              <a:t>proxy</a:t>
+              <a:t>user</a:t>
             </a:r>
             <a:r>
               <a:rPr lang="pt-BR" sz="2400" i="1" dirty="0" smtClean="0"/>
-              <a:t> </a:t>
+              <a:t> interface </a:t>
             </a:r>
             <a:r>
               <a:rPr lang="pt-BR" sz="2400" dirty="0" smtClean="0"/>
-              <a:t>de rede programável</a:t>
-            </a:r>
-          </a:p>
-          <a:p>
-            <a:pPr lvl="1"/>
-            <a:r>
-              <a:rPr lang="pt-BR" sz="2400" dirty="0" smtClean="0"/>
-              <a:t>Execução em segundo plano</a:t>
-            </a:r>
-          </a:p>
-          <a:p>
-            <a:pPr lvl="1"/>
-            <a:r>
-              <a:rPr lang="pt-BR" sz="2400" dirty="0" smtClean="0"/>
-              <a:t>Armazenamento em </a:t>
+              <a:t>armazenados em </a:t>
             </a:r>
             <a:r>
               <a:rPr lang="pt-BR" sz="2400" i="1" dirty="0" err="1" smtClean="0"/>
               <a:t>cache</a:t>
             </a:r>
-            <a:r>
-              <a:rPr lang="pt-BR" sz="2400" i="1" dirty="0" smtClean="0"/>
-              <a:t> </a:t>
-            </a:r>
+            <a:endParaRPr lang="pt-BR" sz="2400" dirty="0" smtClean="0"/>
+          </a:p>
+          <a:p>
+            <a:pPr lvl="1"/>
             <a:r>
               <a:rPr lang="pt-BR" sz="2400" dirty="0" smtClean="0"/>
-              <a:t>dos arquivos estáticos</a:t>
+              <a:t>Dados dinâmicos sendo requisitados na rede</a:t>
             </a:r>
           </a:p>
           <a:p>
             <a:pPr lvl="1"/>
             <a:r>
               <a:rPr lang="pt-BR" sz="2400" dirty="0" smtClean="0"/>
-              <a:t>Uso obrigatório de conexões seguras (HTTPS)</a:t>
+              <a:t>Economia no uso de dados</a:t>
             </a:r>
             <a:endParaRPr lang="pt-BR" dirty="0"/>
           </a:p>
@@ -4855,6 +5464,7 @@
           <a:p>
             <a:fld id="{7606F037-5F0B-48DD-A241-E3C6F3921244}" type="slidenum">
               <a:rPr lang="pt-BR" smtClean="0"/>
+              <a:pPr/>
               <a:t>9</a:t>
             </a:fld>
             <a:endParaRPr lang="pt-BR"/>

</xml_diff>

<commit_message>
Sun May 14 2017 20:25:41
</commit_message>
<xml_diff>
--- a/apresentacao.pptx
+++ b/apresentacao.pptx
@@ -4064,6 +4064,22 @@
           <a:bodyPr/>
           <a:lstStyle/>
           <a:p>
+            <a:r>
+              <a:rPr lang="pt-BR" sz="2400" dirty="0" smtClean="0"/>
+              <a:t>Compatibilidade</a:t>
+            </a:r>
+          </a:p>
+          <a:p>
+            <a:r>
+              <a:rPr lang="pt-BR" sz="2400" dirty="0" smtClean="0"/>
+              <a:t>Acesso à recursos do aparelho</a:t>
+            </a:r>
+          </a:p>
+          <a:p>
+            <a:r>
+              <a:rPr lang="pt-BR" sz="2400" dirty="0" smtClean="0"/>
+              <a:t>Resistência à tecnologia</a:t>
+            </a:r>
             <a:endParaRPr lang="pt-BR" sz="2400" dirty="0" smtClean="0"/>
           </a:p>
         </p:txBody>
@@ -4334,10 +4350,16 @@
         </p:nvSpPr>
         <p:spPr/>
         <p:txBody>
-          <a:bodyPr/>
-          <a:lstStyle/>
-          <a:p>
-            <a:endParaRPr lang="pt-BR" dirty="0"/>
+          <a:bodyPr>
+            <a:normAutofit/>
+          </a:bodyPr>
+          <a:lstStyle/>
+          <a:p>
+            <a:r>
+              <a:rPr lang="pt-BR" sz="2400" dirty="0" smtClean="0"/>
+              <a:t>https://developers.google.com/web/fundamentals/</a:t>
+            </a:r>
+            <a:endParaRPr lang="pt-BR" sz="2400" dirty="0"/>
           </a:p>
         </p:txBody>
       </p:sp>
@@ -5073,7 +5095,6 @@
               <a:rPr lang="pt-BR" sz="2400" dirty="0" smtClean="0"/>
               <a:t>Descrever tipos de aplicações onde a abordagem pouco ou nada têm a contribuir</a:t>
             </a:r>
-            <a:endParaRPr lang="pt-BR" sz="2400" dirty="0" smtClean="0"/>
           </a:p>
         </p:txBody>
       </p:sp>

</xml_diff>

<commit_message>
Thu Jun 15 2017 12:02:18
</commit_message>
<xml_diff>
--- a/apresentacao.pptx
+++ b/apresentacao.pptx
@@ -5,26 +5,29 @@
     <p:sldMasterId id="2147483648" r:id="rId1"/>
   </p:sldMasterIdLst>
   <p:notesMasterIdLst>
-    <p:notesMasterId r:id="rId19"/>
+    <p:notesMasterId r:id="rId22"/>
   </p:notesMasterIdLst>
   <p:sldIdLst>
     <p:sldId id="256" r:id="rId2"/>
     <p:sldId id="257" r:id="rId3"/>
     <p:sldId id="258" r:id="rId4"/>
-    <p:sldId id="261" r:id="rId5"/>
-    <p:sldId id="262" r:id="rId6"/>
-    <p:sldId id="271" r:id="rId7"/>
-    <p:sldId id="259" r:id="rId8"/>
-    <p:sldId id="263" r:id="rId9"/>
-    <p:sldId id="264" r:id="rId10"/>
-    <p:sldId id="265" r:id="rId11"/>
-    <p:sldId id="272" r:id="rId12"/>
-    <p:sldId id="266" r:id="rId13"/>
-    <p:sldId id="270" r:id="rId14"/>
-    <p:sldId id="260" r:id="rId15"/>
-    <p:sldId id="267" r:id="rId16"/>
-    <p:sldId id="268" r:id="rId17"/>
-    <p:sldId id="269" r:id="rId18"/>
+    <p:sldId id="273" r:id="rId5"/>
+    <p:sldId id="261" r:id="rId6"/>
+    <p:sldId id="262" r:id="rId7"/>
+    <p:sldId id="271" r:id="rId8"/>
+    <p:sldId id="259" r:id="rId9"/>
+    <p:sldId id="263" r:id="rId10"/>
+    <p:sldId id="264" r:id="rId11"/>
+    <p:sldId id="265" r:id="rId12"/>
+    <p:sldId id="272" r:id="rId13"/>
+    <p:sldId id="266" r:id="rId14"/>
+    <p:sldId id="270" r:id="rId15"/>
+    <p:sldId id="274" r:id="rId16"/>
+    <p:sldId id="275" r:id="rId17"/>
+    <p:sldId id="260" r:id="rId18"/>
+    <p:sldId id="267" r:id="rId19"/>
+    <p:sldId id="268" r:id="rId20"/>
+    <p:sldId id="269" r:id="rId21"/>
   </p:sldIdLst>
   <p:sldSz cx="9144000" cy="6858000" type="screen4x3"/>
   <p:notesSz cx="6858000" cy="9144000"/>
@@ -209,7 +212,7 @@
             <a:fld id="{0730F96E-CD9F-47DE-9E3A-CF98BE122B94}" type="datetimeFigureOut">
               <a:rPr lang="pt-BR" smtClean="0"/>
               <a:pPr/>
-              <a:t>14/05/2017</a:t>
+              <a:t>15/06/2017</a:t>
             </a:fld>
             <a:endParaRPr lang="pt-BR"/>
           </a:p>
@@ -739,7 +742,7 @@
             <a:fld id="{194CB1D5-6381-4E76-AD57-B9022AD4A2C7}" type="datetime1">
               <a:rPr lang="pt-BR" smtClean="0"/>
               <a:pPr/>
-              <a:t>14/05/2017</a:t>
+              <a:t>15/06/2017</a:t>
             </a:fld>
             <a:endParaRPr lang="pt-BR"/>
           </a:p>
@@ -906,7 +909,7 @@
             <a:fld id="{70AC06B7-17CA-46C5-9115-9CCDC26EB0F6}" type="datetime1">
               <a:rPr lang="pt-BR" smtClean="0"/>
               <a:pPr/>
-              <a:t>14/05/2017</a:t>
+              <a:t>15/06/2017</a:t>
             </a:fld>
             <a:endParaRPr lang="pt-BR"/>
           </a:p>
@@ -1083,7 +1086,7 @@
             <a:fld id="{775CA797-804E-4AD7-A3C0-3795D50495EA}" type="datetime1">
               <a:rPr lang="pt-BR" smtClean="0"/>
               <a:pPr/>
-              <a:t>14/05/2017</a:t>
+              <a:t>15/06/2017</a:t>
             </a:fld>
             <a:endParaRPr lang="pt-BR"/>
           </a:p>
@@ -1250,7 +1253,7 @@
             <a:fld id="{4D0D9180-9CC1-4B9F-BD86-289B320B5737}" type="datetime1">
               <a:rPr lang="pt-BR" smtClean="0"/>
               <a:pPr/>
-              <a:t>14/05/2017</a:t>
+              <a:t>15/06/2017</a:t>
             </a:fld>
             <a:endParaRPr lang="pt-BR"/>
           </a:p>
@@ -1493,7 +1496,7 @@
             <a:fld id="{AC4D17E9-988B-4C37-B696-7B547BECE548}" type="datetime1">
               <a:rPr lang="pt-BR" smtClean="0"/>
               <a:pPr/>
-              <a:t>14/05/2017</a:t>
+              <a:t>15/06/2017</a:t>
             </a:fld>
             <a:endParaRPr lang="pt-BR"/>
           </a:p>
@@ -1778,7 +1781,7 @@
             <a:fld id="{50B1281A-4B9C-4B49-9B6F-25AA207B80D1}" type="datetime1">
               <a:rPr lang="pt-BR" smtClean="0"/>
               <a:pPr/>
-              <a:t>14/05/2017</a:t>
+              <a:t>15/06/2017</a:t>
             </a:fld>
             <a:endParaRPr lang="pt-BR"/>
           </a:p>
@@ -2197,7 +2200,7 @@
             <a:fld id="{EE4679D3-5732-4EAE-A664-C4FC7EA14FF8}" type="datetime1">
               <a:rPr lang="pt-BR" smtClean="0"/>
               <a:pPr/>
-              <a:t>14/05/2017</a:t>
+              <a:t>15/06/2017</a:t>
             </a:fld>
             <a:endParaRPr lang="pt-BR"/>
           </a:p>
@@ -2312,7 +2315,7 @@
             <a:fld id="{DD2B67A8-A89F-4660-9469-7C809E93377A}" type="datetime1">
               <a:rPr lang="pt-BR" smtClean="0"/>
               <a:pPr/>
-              <a:t>14/05/2017</a:t>
+              <a:t>15/06/2017</a:t>
             </a:fld>
             <a:endParaRPr lang="pt-BR"/>
           </a:p>
@@ -2404,7 +2407,7 @@
             <a:fld id="{5D952FB9-EC2D-4D24-B0DC-78BBD6D065F2}" type="datetime1">
               <a:rPr lang="pt-BR" smtClean="0"/>
               <a:pPr/>
-              <a:t>14/05/2017</a:t>
+              <a:t>15/06/2017</a:t>
             </a:fld>
             <a:endParaRPr lang="pt-BR"/>
           </a:p>
@@ -2678,7 +2681,7 @@
             <a:fld id="{7AB76327-70CD-43EA-9FC5-1226846EB383}" type="datetime1">
               <a:rPr lang="pt-BR" smtClean="0"/>
               <a:pPr/>
-              <a:t>14/05/2017</a:t>
+              <a:t>15/06/2017</a:t>
             </a:fld>
             <a:endParaRPr lang="pt-BR"/>
           </a:p>
@@ -2928,7 +2931,7 @@
             <a:fld id="{F4859177-8CEB-47E9-87D5-CA4581D77702}" type="datetime1">
               <a:rPr lang="pt-BR" smtClean="0"/>
               <a:pPr/>
-              <a:t>14/05/2017</a:t>
+              <a:t>15/06/2017</a:t>
             </a:fld>
             <a:endParaRPr lang="pt-BR"/>
           </a:p>
@@ -3138,7 +3141,7 @@
             <a:fld id="{6782A638-3448-44BC-9962-075E4BB902B1}" type="datetime1">
               <a:rPr lang="pt-BR" smtClean="0"/>
               <a:pPr/>
-              <a:t>14/05/2017</a:t>
+              <a:t>15/06/2017</a:t>
             </a:fld>
             <a:endParaRPr lang="pt-BR"/>
           </a:p>
@@ -3552,8 +3555,12 @@
               <a:buNone/>
             </a:pPr>
             <a:r>
+              <a:rPr lang="pt-BR" sz="4000" i="1" dirty="0" smtClean="0"/>
+              <a:t>Progressive Web Apps</a:t>
+            </a:r>
+            <a:r>
               <a:rPr lang="pt-BR" sz="4000" dirty="0" smtClean="0"/>
-              <a:t>Progressive Web Apps, uma alternativa para o desenvolvimento de aplicações móveis</a:t>
+              <a:t>, uma alternativa para o desenvolvimento de aplicações móveis</a:t>
             </a:r>
           </a:p>
           <a:p>
@@ -3663,16 +3670,8 @@
           <a:lstStyle/>
           <a:p>
             <a:r>
-              <a:rPr lang="pt-BR" i="1" dirty="0" err="1" smtClean="0"/>
-              <a:t>Service</a:t>
-            </a:r>
-            <a:r>
               <a:rPr lang="pt-BR" i="1" dirty="0" smtClean="0"/>
-              <a:t> </a:t>
-            </a:r>
-            <a:r>
-              <a:rPr lang="pt-BR" i="1" dirty="0" err="1" smtClean="0"/>
-              <a:t>Workers</a:t>
+              <a:t>Application Shell</a:t>
             </a:r>
             <a:endParaRPr lang="pt-BR" i="1" dirty="0"/>
           </a:p>
@@ -3695,11 +3694,22 @@
           <a:p>
             <a:r>
               <a:rPr lang="pt-BR" sz="2400" dirty="0" smtClean="0"/>
-              <a:t>Servidor de </a:t>
-            </a:r>
-            <a:r>
-              <a:rPr lang="pt-BR" sz="2400" i="1" dirty="0" err="1" smtClean="0"/>
-              <a:t>proxy</a:t>
+              <a:t>Modelo arquitetural</a:t>
+            </a:r>
+          </a:p>
+          <a:p>
+            <a:pPr lvl="1"/>
+            <a:r>
+              <a:rPr lang="pt-BR" sz="2400" dirty="0" smtClean="0"/>
+              <a:t>Arquivos de </a:t>
+            </a:r>
+            <a:r>
+              <a:rPr lang="pt-BR" sz="2400" i="1" dirty="0" smtClean="0"/>
+              <a:t>interface </a:t>
+            </a:r>
+            <a:r>
+              <a:rPr lang="pt-BR" sz="2400" dirty="0" smtClean="0"/>
+              <a:t>de usuário</a:t>
             </a:r>
             <a:r>
               <a:rPr lang="pt-BR" sz="2400" i="1" dirty="0" smtClean="0"/>
@@ -3707,40 +3717,38 @@
             </a:r>
             <a:r>
               <a:rPr lang="pt-BR" sz="2400" dirty="0" smtClean="0"/>
-              <a:t>de rede programável</a:t>
-            </a:r>
-          </a:p>
-          <a:p>
-            <a:pPr lvl="1"/>
-            <a:r>
-              <a:rPr lang="pt-BR" sz="2400" dirty="0" smtClean="0"/>
-              <a:t>Execução em segundo plano</a:t>
-            </a:r>
-          </a:p>
-          <a:p>
-            <a:pPr lvl="1"/>
-            <a:r>
-              <a:rPr lang="pt-BR" sz="2400" dirty="0" smtClean="0"/>
-              <a:t>Armazenamento em </a:t>
+              <a:t>armazenados em </a:t>
             </a:r>
             <a:r>
               <a:rPr lang="pt-BR" sz="2400" i="1" dirty="0" err="1" smtClean="0"/>
               <a:t>cache</a:t>
             </a:r>
-            <a:r>
-              <a:rPr lang="pt-BR" sz="2400" i="1" dirty="0" smtClean="0"/>
-              <a:t> </a:t>
-            </a:r>
-            <a:r>
-              <a:rPr lang="pt-BR" sz="2400" dirty="0" smtClean="0"/>
-              <a:t>dos arquivos estáticos</a:t>
-            </a:r>
+            <a:endParaRPr lang="pt-BR" sz="2400" dirty="0" smtClean="0"/>
           </a:p>
           <a:p>
             <a:pPr lvl="1"/>
             <a:r>
               <a:rPr lang="pt-BR" sz="2400" dirty="0" smtClean="0"/>
-              <a:t>Uso obrigatório de conexões seguras (HTTPS)</a:t>
+              <a:t>Dados dinâmicos sendo requisitados na </a:t>
+            </a:r>
+            <a:r>
+              <a:rPr lang="pt-BR" sz="2400" dirty="0" smtClean="0"/>
+              <a:t>rede</a:t>
+            </a:r>
+          </a:p>
+          <a:p>
+            <a:pPr lvl="1"/>
+            <a:r>
+              <a:rPr lang="pt-BR" sz="2400" dirty="0" smtClean="0"/>
+              <a:t>Carregamento rápido e confiável do aplicativo</a:t>
+            </a:r>
+            <a:endParaRPr lang="pt-BR" sz="2400" dirty="0" smtClean="0"/>
+          </a:p>
+          <a:p>
+            <a:pPr lvl="1"/>
+            <a:r>
+              <a:rPr lang="pt-BR" sz="2400" dirty="0" smtClean="0"/>
+              <a:t>Economia no uso de dados</a:t>
             </a:r>
             <a:endParaRPr lang="pt-BR" dirty="0"/>
           </a:p>
@@ -3811,36 +3819,89 @@
           <a:lstStyle/>
           <a:p>
             <a:r>
-              <a:rPr lang="pt-BR" dirty="0" smtClean="0"/>
-              <a:t>Ciclo de vida</a:t>
+              <a:rPr lang="pt-BR" i="1" dirty="0" err="1" smtClean="0"/>
+              <a:t>Service</a:t>
+            </a:r>
+            <a:r>
+              <a:rPr lang="pt-BR" i="1" dirty="0" smtClean="0"/>
+              <a:t> </a:t>
+            </a:r>
+            <a:r>
+              <a:rPr lang="pt-BR" i="1" dirty="0" err="1" smtClean="0"/>
+              <a:t>Workers</a:t>
+            </a:r>
+            <a:endParaRPr lang="pt-BR" i="1" dirty="0"/>
+          </a:p>
+        </p:txBody>
+      </p:sp>
+      <p:sp>
+        <p:nvSpPr>
+          <p:cNvPr id="3" name="Espaço Reservado para Conteúdo 2"/>
+          <p:cNvSpPr>
+            <a:spLocks noGrp="1"/>
+          </p:cNvSpPr>
+          <p:nvPr>
+            <p:ph idx="1"/>
+          </p:nvPr>
+        </p:nvSpPr>
+        <p:spPr/>
+        <p:txBody>
+          <a:bodyPr/>
+          <a:lstStyle/>
+          <a:p>
+            <a:r>
+              <a:rPr lang="pt-BR" sz="2400" dirty="0" smtClean="0"/>
+              <a:t>Servidor de </a:t>
+            </a:r>
+            <a:r>
+              <a:rPr lang="pt-BR" sz="2400" i="1" dirty="0" err="1" smtClean="0"/>
+              <a:t>proxy</a:t>
+            </a:r>
+            <a:r>
+              <a:rPr lang="pt-BR" sz="2400" i="1" dirty="0" smtClean="0"/>
+              <a:t> </a:t>
+            </a:r>
+            <a:r>
+              <a:rPr lang="pt-BR" sz="2400" dirty="0" smtClean="0"/>
+              <a:t>de rede programável</a:t>
+            </a:r>
+          </a:p>
+          <a:p>
+            <a:pPr lvl="1"/>
+            <a:r>
+              <a:rPr lang="pt-BR" sz="2400" dirty="0" smtClean="0"/>
+              <a:t>Execução em segundo plano</a:t>
+            </a:r>
+          </a:p>
+          <a:p>
+            <a:pPr lvl="1"/>
+            <a:r>
+              <a:rPr lang="pt-BR" sz="2400" dirty="0" smtClean="0"/>
+              <a:t>Armazenamento em </a:t>
+            </a:r>
+            <a:r>
+              <a:rPr lang="pt-BR" sz="2400" i="1" dirty="0" err="1" smtClean="0"/>
+              <a:t>cache</a:t>
+            </a:r>
+            <a:r>
+              <a:rPr lang="pt-BR" sz="2400" i="1" dirty="0" smtClean="0"/>
+              <a:t> </a:t>
+            </a:r>
+            <a:r>
+              <a:rPr lang="pt-BR" sz="2400" dirty="0" smtClean="0"/>
+              <a:t>dos arquivos estáticos</a:t>
+            </a:r>
+          </a:p>
+          <a:p>
+            <a:pPr lvl="1"/>
+            <a:r>
+              <a:rPr lang="pt-BR" sz="2400" dirty="0" smtClean="0"/>
+              <a:t>Uso obrigatório de conexões seguras (HTTPS)</a:t>
             </a:r>
             <a:endParaRPr lang="pt-BR" dirty="0"/>
           </a:p>
         </p:txBody>
       </p:sp>
-      <p:pic>
-        <p:nvPicPr>
-          <p:cNvPr id="5" name="Espaço Reservado para Conteúdo 4" descr="sw-lifecycle.png"/>
-          <p:cNvPicPr>
-            <a:picLocks noGrp="1" noChangeAspect="1"/>
-          </p:cNvPicPr>
-          <p:nvPr>
-            <p:ph idx="1"/>
-          </p:nvPr>
-        </p:nvPicPr>
-        <p:blipFill>
-          <a:blip r:embed="rId2"/>
-          <a:stretch>
-            <a:fillRect/>
-          </a:stretch>
-        </p:blipFill>
-        <p:spPr>
-          <a:xfrm>
-            <a:off x="2252857" y="1600200"/>
-            <a:ext cx="4638286" cy="4525963"/>
-          </a:xfrm>
-        </p:spPr>
-      </p:pic>
       <p:sp>
         <p:nvSpPr>
           <p:cNvPr id="4" name="Espaço Reservado para Número de Slide 3"/>
@@ -3906,77 +3967,36 @@
           <a:lstStyle/>
           <a:p>
             <a:r>
-              <a:rPr lang="pt-BR" i="1" dirty="0" smtClean="0"/>
-              <a:t>Web </a:t>
-            </a:r>
-            <a:r>
-              <a:rPr lang="pt-BR" i="1" dirty="0" err="1" smtClean="0"/>
-              <a:t>Manifest</a:t>
-            </a:r>
-            <a:endParaRPr lang="pt-BR" i="1" dirty="0"/>
-          </a:p>
-        </p:txBody>
-      </p:sp>
-      <p:sp>
-        <p:nvSpPr>
-          <p:cNvPr id="3" name="Espaço Reservado para Conteúdo 2"/>
-          <p:cNvSpPr>
-            <a:spLocks noGrp="1"/>
-          </p:cNvSpPr>
+              <a:rPr lang="pt-BR" dirty="0" smtClean="0"/>
+              <a:t>Ciclo de vida</a:t>
+            </a:r>
+            <a:endParaRPr lang="pt-BR" dirty="0"/>
+          </a:p>
+        </p:txBody>
+      </p:sp>
+      <p:pic>
+        <p:nvPicPr>
+          <p:cNvPr id="5" name="Espaço Reservado para Conteúdo 4" descr="sw-lifecycle.png"/>
+          <p:cNvPicPr>
+            <a:picLocks noGrp="1" noChangeAspect="1"/>
+          </p:cNvPicPr>
           <p:nvPr>
             <p:ph idx="1"/>
           </p:nvPr>
-        </p:nvSpPr>
-        <p:spPr/>
-        <p:txBody>
-          <a:bodyPr/>
-          <a:lstStyle/>
-          <a:p>
-            <a:r>
-              <a:rPr lang="pt-BR" sz="2400" dirty="0" smtClean="0"/>
-              <a:t>Arquivo JSON</a:t>
-            </a:r>
-          </a:p>
-          <a:p>
-            <a:pPr lvl="1"/>
-            <a:r>
-              <a:rPr lang="pt-BR" sz="2400" dirty="0" smtClean="0"/>
-              <a:t>Atalho na </a:t>
-            </a:r>
-            <a:r>
-              <a:rPr lang="pt-BR" sz="2400" i="1" dirty="0" err="1" smtClean="0"/>
-              <a:t>homescreen</a:t>
-            </a:r>
-            <a:r>
-              <a:rPr lang="pt-BR" sz="2400" i="1" dirty="0" smtClean="0"/>
-              <a:t> </a:t>
-            </a:r>
-            <a:r>
-              <a:rPr lang="pt-BR" sz="2400" dirty="0" smtClean="0"/>
-              <a:t>do aparelho</a:t>
-            </a:r>
-          </a:p>
-          <a:p>
-            <a:pPr lvl="1"/>
-            <a:r>
-              <a:rPr lang="pt-BR" sz="2400" dirty="0" smtClean="0"/>
-              <a:t>Definição de temas</a:t>
-            </a:r>
-          </a:p>
-          <a:p>
-            <a:pPr lvl="1"/>
-            <a:r>
-              <a:rPr lang="pt-BR" sz="2400" dirty="0" smtClean="0"/>
-              <a:t>Personalização do tipo </a:t>
-            </a:r>
-            <a:r>
-              <a:rPr lang="pt-BR" sz="2400" smtClean="0"/>
-              <a:t>de exibição</a:t>
-            </a:r>
-            <a:endParaRPr lang="pt-BR" dirty="0"/>
-          </a:p>
-        </p:txBody>
-      </p:sp>
+        </p:nvPicPr>
+        <p:blipFill>
+          <a:blip r:embed="rId2"/>
+          <a:stretch>
+            <a:fillRect/>
+          </a:stretch>
+        </p:blipFill>
+        <p:spPr>
+          <a:xfrm>
+            <a:off x="2252857" y="1600200"/>
+            <a:ext cx="4638286" cy="4525963"/>
+          </a:xfrm>
+        </p:spPr>
+      </p:pic>
       <p:sp>
         <p:nvSpPr>
           <p:cNvPr id="4" name="Espaço Reservado para Número de Slide 3"/>
@@ -4042,45 +4062,70 @@
           <a:lstStyle/>
           <a:p>
             <a:r>
-              <a:rPr lang="pt-BR" dirty="0" smtClean="0"/>
-              <a:t>Problemas</a:t>
+              <a:rPr lang="pt-BR" i="1" dirty="0" smtClean="0"/>
+              <a:t>Web </a:t>
+            </a:r>
+            <a:r>
+              <a:rPr lang="pt-BR" i="1" dirty="0" err="1" smtClean="0"/>
+              <a:t>Manifest</a:t>
+            </a:r>
+            <a:endParaRPr lang="pt-BR" i="1" dirty="0"/>
+          </a:p>
+        </p:txBody>
+      </p:sp>
+      <p:sp>
+        <p:nvSpPr>
+          <p:cNvPr id="3" name="Espaço Reservado para Conteúdo 2"/>
+          <p:cNvSpPr>
+            <a:spLocks noGrp="1"/>
+          </p:cNvSpPr>
+          <p:nvPr>
+            <p:ph idx="1"/>
+          </p:nvPr>
+        </p:nvSpPr>
+        <p:spPr/>
+        <p:txBody>
+          <a:bodyPr/>
+          <a:lstStyle/>
+          <a:p>
+            <a:r>
+              <a:rPr lang="pt-BR" sz="2400" dirty="0" smtClean="0"/>
+              <a:t>Arquivo JSON</a:t>
+            </a:r>
+          </a:p>
+          <a:p>
+            <a:pPr lvl="1"/>
+            <a:r>
+              <a:rPr lang="pt-BR" sz="2400" dirty="0" smtClean="0"/>
+              <a:t>Atalho na </a:t>
+            </a:r>
+            <a:r>
+              <a:rPr lang="pt-BR" sz="2400" i="1" dirty="0" err="1" smtClean="0"/>
+              <a:t>homescreen</a:t>
+            </a:r>
+            <a:r>
+              <a:rPr lang="pt-BR" sz="2400" i="1" dirty="0" smtClean="0"/>
+              <a:t> </a:t>
+            </a:r>
+            <a:r>
+              <a:rPr lang="pt-BR" sz="2400" dirty="0" smtClean="0"/>
+              <a:t>do aparelho</a:t>
+            </a:r>
+          </a:p>
+          <a:p>
+            <a:pPr lvl="1"/>
+            <a:r>
+              <a:rPr lang="pt-BR" sz="2400" dirty="0" smtClean="0"/>
+              <a:t>Definição de temas</a:t>
+            </a:r>
+          </a:p>
+          <a:p>
+            <a:pPr lvl="1"/>
+            <a:r>
+              <a:rPr lang="pt-BR" sz="2400" dirty="0" smtClean="0"/>
+              <a:t>Personalização do tipo de exibição</a:t>
             </a:r>
             <a:endParaRPr lang="pt-BR" dirty="0"/>
-          </a:p>
-        </p:txBody>
-      </p:sp>
-      <p:sp>
-        <p:nvSpPr>
-          <p:cNvPr id="3" name="Espaço Reservado para Conteúdo 2"/>
-          <p:cNvSpPr>
-            <a:spLocks noGrp="1"/>
-          </p:cNvSpPr>
-          <p:nvPr>
-            <p:ph idx="1"/>
-          </p:nvPr>
-        </p:nvSpPr>
-        <p:spPr/>
-        <p:txBody>
-          <a:bodyPr/>
-          <a:lstStyle/>
-          <a:p>
-            <a:r>
-              <a:rPr lang="pt-BR" sz="2400" dirty="0" smtClean="0"/>
-              <a:t>Compatibilidade</a:t>
-            </a:r>
-          </a:p>
-          <a:p>
-            <a:r>
-              <a:rPr lang="pt-BR" sz="2400" dirty="0" smtClean="0"/>
-              <a:t>Acesso à recursos do aparelho</a:t>
-            </a:r>
-          </a:p>
-          <a:p>
-            <a:r>
-              <a:rPr lang="pt-BR" sz="2400" dirty="0" smtClean="0"/>
-              <a:t>Resistência à tecnologia</a:t>
-            </a:r>
-            <a:endParaRPr lang="pt-BR" sz="2400" dirty="0" smtClean="0"/>
           </a:p>
         </p:txBody>
       </p:sp>
@@ -4140,7 +4185,7 @@
             <a:spLocks noGrp="1"/>
           </p:cNvSpPr>
           <p:nvPr>
-            <p:ph type="ctrTitle"/>
+            <p:ph type="title"/>
           </p:nvPr>
         </p:nvSpPr>
         <p:spPr/>
@@ -4150,7 +4195,7 @@
           <a:p>
             <a:r>
               <a:rPr lang="pt-BR" dirty="0" smtClean="0"/>
-              <a:t>III – Conclusão</a:t>
+              <a:t>Problemas</a:t>
             </a:r>
             <a:endParaRPr lang="pt-BR" dirty="0"/>
           </a:p>
@@ -4158,20 +4203,35 @@
       </p:sp>
       <p:sp>
         <p:nvSpPr>
-          <p:cNvPr id="3" name="Subtítulo 2"/>
-          <p:cNvSpPr>
-            <a:spLocks noGrp="1"/>
-          </p:cNvSpPr>
-          <p:nvPr>
-            <p:ph type="subTitle" idx="1"/>
-          </p:nvPr>
-        </p:nvSpPr>
-        <p:spPr/>
-        <p:txBody>
-          <a:bodyPr/>
-          <a:lstStyle/>
-          <a:p>
-            <a:endParaRPr lang="pt-BR" dirty="0"/>
+          <p:cNvPr id="3" name="Espaço Reservado para Conteúdo 2"/>
+          <p:cNvSpPr>
+            <a:spLocks noGrp="1"/>
+          </p:cNvSpPr>
+          <p:nvPr>
+            <p:ph idx="1"/>
+          </p:nvPr>
+        </p:nvSpPr>
+        <p:spPr/>
+        <p:txBody>
+          <a:bodyPr/>
+          <a:lstStyle/>
+          <a:p>
+            <a:r>
+              <a:rPr lang="pt-BR" sz="2400" dirty="0" smtClean="0"/>
+              <a:t>Compatibilidade</a:t>
+            </a:r>
+          </a:p>
+          <a:p>
+            <a:r>
+              <a:rPr lang="pt-BR" sz="2400" dirty="0" smtClean="0"/>
+              <a:t>Acesso à recursos do aparelho</a:t>
+            </a:r>
+          </a:p>
+          <a:p>
+            <a:r>
+              <a:rPr lang="pt-BR" sz="2400" dirty="0" smtClean="0"/>
+              <a:t>Resistência à tecnologia</a:t>
+            </a:r>
           </a:p>
         </p:txBody>
       </p:sp>
@@ -4241,7 +4301,7 @@
           <a:p>
             <a:r>
               <a:rPr lang="pt-BR" dirty="0" smtClean="0"/>
-              <a:t>Cronograma</a:t>
+              <a:t>Metodologia</a:t>
             </a:r>
             <a:endParaRPr lang="pt-BR" dirty="0"/>
           </a:p>
@@ -4259,10 +4319,44 @@
         </p:nvSpPr>
         <p:spPr/>
         <p:txBody>
-          <a:bodyPr/>
-          <a:lstStyle/>
-          <a:p>
-            <a:endParaRPr lang="pt-BR"/>
+          <a:bodyPr>
+            <a:normAutofit/>
+          </a:bodyPr>
+          <a:lstStyle/>
+          <a:p>
+            <a:r>
+              <a:rPr lang="pt-BR" sz="2400" dirty="0" smtClean="0"/>
+              <a:t>Alguns métodos qualitativos serão utilizados como critério para avaliar o resultado do uso dos </a:t>
+            </a:r>
+            <a:r>
+              <a:rPr lang="pt-BR" sz="2400" i="1" dirty="0" smtClean="0"/>
+              <a:t>progressive web apps</a:t>
+            </a:r>
+          </a:p>
+          <a:p>
+            <a:pPr lvl="1"/>
+            <a:r>
+              <a:rPr lang="pt-BR" sz="2400" dirty="0" smtClean="0"/>
+              <a:t>Escolha dos cenários propícios para a adoção da tecnologia</a:t>
+            </a:r>
+          </a:p>
+          <a:p>
+            <a:pPr lvl="1"/>
+            <a:r>
+              <a:rPr lang="pt-BR" sz="2400" dirty="0" smtClean="0"/>
+              <a:t>Elenco de critérios para avaliar comparativamente a solução empregada</a:t>
+            </a:r>
+          </a:p>
+          <a:p>
+            <a:pPr lvl="1"/>
+            <a:r>
+              <a:rPr lang="pt-BR" sz="2400" dirty="0" smtClean="0"/>
+              <a:t>Análise sucinta dos resultados</a:t>
+            </a:r>
+          </a:p>
+          <a:p>
+            <a:pPr lvl="1"/>
+            <a:endParaRPr lang="pt-BR" sz="2000" dirty="0"/>
           </a:p>
         </p:txBody>
       </p:sp>
@@ -4332,7 +4426,7 @@
           <a:p>
             <a:r>
               <a:rPr lang="pt-BR" dirty="0" smtClean="0"/>
-              <a:t>Referências</a:t>
+              <a:t>Metodologia</a:t>
             </a:r>
             <a:endParaRPr lang="pt-BR" dirty="0"/>
           </a:p>
@@ -4355,11 +4449,26 @@
           </a:bodyPr>
           <a:lstStyle/>
           <a:p>
-            <a:r>
-              <a:rPr lang="pt-BR" sz="2400" dirty="0" smtClean="0"/>
-              <a:t>https://developers.google.com/web/fundamentals/</a:t>
-            </a:r>
-            <a:endParaRPr lang="pt-BR" sz="2400" dirty="0"/>
+            <a:endParaRPr lang="pt-BR" sz="2400" dirty="0" smtClean="0"/>
+          </a:p>
+          <a:p>
+            <a:r>
+              <a:rPr lang="pt-BR" sz="2400" dirty="0" smtClean="0"/>
+              <a:t>Embasamento teórico</a:t>
+            </a:r>
+          </a:p>
+          <a:p>
+            <a:r>
+              <a:rPr lang="pt-BR" sz="2400" dirty="0" smtClean="0"/>
+              <a:t>Estudo comparativo da abordagem</a:t>
+            </a:r>
+          </a:p>
+          <a:p>
+            <a:r>
+              <a:rPr lang="pt-BR" sz="2400" dirty="0" smtClean="0"/>
+              <a:t>Posicionamento conclusivo</a:t>
+            </a:r>
+            <a:endParaRPr lang="pt-BR" sz="2000" dirty="0"/>
           </a:p>
         </p:txBody>
       </p:sp>
@@ -4429,7 +4538,7 @@
           <a:p>
             <a:r>
               <a:rPr lang="pt-BR" dirty="0" smtClean="0"/>
-              <a:t>Obrigado pela atenção.</a:t>
+              <a:t>III – Conclusão</a:t>
             </a:r>
             <a:endParaRPr lang="pt-BR" dirty="0"/>
           </a:p>
@@ -4450,7 +4559,7 @@
           <a:bodyPr/>
           <a:lstStyle/>
           <a:p>
-            <a:endParaRPr lang="pt-BR"/>
+            <a:endParaRPr lang="pt-BR" dirty="0"/>
           </a:p>
         </p:txBody>
       </p:sp>
@@ -4473,6 +4582,477 @@
               <a:rPr lang="pt-BR" smtClean="0"/>
               <a:pPr/>
               <a:t>17</a:t>
+            </a:fld>
+            <a:endParaRPr lang="pt-BR"/>
+          </a:p>
+        </p:txBody>
+      </p:sp>
+    </p:spTree>
+  </p:cSld>
+  <p:clrMapOvr>
+    <a:masterClrMapping/>
+  </p:clrMapOvr>
+</p:sld>
+</file>
+
+<file path=ppt/slides/slide18.xml><?xml version="1.0" encoding="utf-8"?>
+<p:sld xmlns:a="http://schemas.openxmlformats.org/drawingml/2006/main" xmlns:r="http://schemas.openxmlformats.org/officeDocument/2006/relationships" xmlns:p="http://schemas.openxmlformats.org/presentationml/2006/main">
+  <p:cSld>
+    <p:spTree>
+      <p:nvGrpSpPr>
+        <p:cNvPr id="1" name=""/>
+        <p:cNvGrpSpPr/>
+        <p:nvPr/>
+      </p:nvGrpSpPr>
+      <p:grpSpPr>
+        <a:xfrm>
+          <a:off x="0" y="0"/>
+          <a:ext cx="0" cy="0"/>
+          <a:chOff x="0" y="0"/>
+          <a:chExt cx="0" cy="0"/>
+        </a:xfrm>
+      </p:grpSpPr>
+      <p:sp>
+        <p:nvSpPr>
+          <p:cNvPr id="2" name="Título 1"/>
+          <p:cNvSpPr>
+            <a:spLocks noGrp="1"/>
+          </p:cNvSpPr>
+          <p:nvPr>
+            <p:ph type="title"/>
+          </p:nvPr>
+        </p:nvSpPr>
+        <p:spPr/>
+        <p:txBody>
+          <a:bodyPr/>
+          <a:lstStyle/>
+          <a:p>
+            <a:r>
+              <a:rPr lang="pt-BR" dirty="0" smtClean="0"/>
+              <a:t>Cronograma</a:t>
+            </a:r>
+            <a:endParaRPr lang="pt-BR" dirty="0"/>
+          </a:p>
+        </p:txBody>
+      </p:sp>
+      <p:graphicFrame>
+        <p:nvGraphicFramePr>
+          <p:cNvPr id="5" name="Espaço Reservado para Conteúdo 4"/>
+          <p:cNvGraphicFramePr>
+            <a:graphicFrameLocks noGrp="1"/>
+          </p:cNvGraphicFramePr>
+          <p:nvPr>
+            <p:ph idx="1"/>
+          </p:nvPr>
+        </p:nvGraphicFramePr>
+        <p:xfrm>
+          <a:off x="457200" y="1600200"/>
+          <a:ext cx="8229600" cy="5034280"/>
+        </p:xfrm>
+        <a:graphic>
+          <a:graphicData uri="http://schemas.openxmlformats.org/drawingml/2006/table">
+            <a:tbl>
+              <a:tblPr firstRow="1" bandRow="1">
+                <a:tableStyleId>{5940675A-B579-460E-94D1-54222C63F5DA}</a:tableStyleId>
+              </a:tblPr>
+              <a:tblGrid>
+                <a:gridCol w="2057400"/>
+                <a:gridCol w="2057400"/>
+                <a:gridCol w="2057400"/>
+                <a:gridCol w="2057400"/>
+              </a:tblGrid>
+              <a:tr h="370840">
+                <a:tc>
+                  <a:txBody>
+                    <a:bodyPr/>
+                    <a:lstStyle/>
+                    <a:p>
+                      <a:pPr algn="ctr"/>
+                      <a:r>
+                        <a:rPr lang="pt-BR" dirty="0" smtClean="0"/>
+                        <a:t>Atividades</a:t>
+                      </a:r>
+                      <a:endParaRPr lang="pt-BR" dirty="0"/>
+                    </a:p>
+                  </a:txBody>
+                  <a:tcPr/>
+                </a:tc>
+                <a:tc>
+                  <a:txBody>
+                    <a:bodyPr/>
+                    <a:lstStyle/>
+                    <a:p>
+                      <a:pPr algn="ctr"/>
+                      <a:r>
+                        <a:rPr lang="pt-BR" dirty="0" smtClean="0"/>
+                        <a:t>Resultados</a:t>
+                      </a:r>
+                      <a:endParaRPr lang="pt-BR" dirty="0"/>
+                    </a:p>
+                  </a:txBody>
+                  <a:tcPr/>
+                </a:tc>
+                <a:tc>
+                  <a:txBody>
+                    <a:bodyPr/>
+                    <a:lstStyle/>
+                    <a:p>
+                      <a:pPr algn="ctr"/>
+                      <a:r>
+                        <a:rPr lang="pt-BR" dirty="0" smtClean="0"/>
+                        <a:t>Início previsto</a:t>
+                      </a:r>
+                      <a:endParaRPr lang="pt-BR" dirty="0"/>
+                    </a:p>
+                  </a:txBody>
+                  <a:tcPr/>
+                </a:tc>
+                <a:tc>
+                  <a:txBody>
+                    <a:bodyPr/>
+                    <a:lstStyle/>
+                    <a:p>
+                      <a:pPr algn="ctr"/>
+                      <a:r>
+                        <a:rPr lang="pt-BR" dirty="0" smtClean="0"/>
+                        <a:t>Término previsto</a:t>
+                      </a:r>
+                      <a:endParaRPr lang="pt-BR" dirty="0"/>
+                    </a:p>
+                  </a:txBody>
+                  <a:tcPr/>
+                </a:tc>
+              </a:tr>
+              <a:tr h="370840">
+                <a:tc>
+                  <a:txBody>
+                    <a:bodyPr/>
+                    <a:lstStyle/>
+                    <a:p>
+                      <a:pPr algn="ctr"/>
+                      <a:r>
+                        <a:rPr lang="pt-BR" dirty="0" smtClean="0"/>
+                        <a:t>Estudo bibliográfico</a:t>
+                      </a:r>
+                      <a:endParaRPr lang="pt-BR" dirty="0"/>
+                    </a:p>
+                  </a:txBody>
+                  <a:tcPr/>
+                </a:tc>
+                <a:tc>
+                  <a:txBody>
+                    <a:bodyPr/>
+                    <a:lstStyle/>
+                    <a:p>
+                      <a:pPr algn="ctr"/>
+                      <a:r>
+                        <a:rPr lang="pt-BR" dirty="0" smtClean="0"/>
+                        <a:t>Conhecimento</a:t>
+                      </a:r>
+                      <a:r>
+                        <a:rPr lang="pt-BR" baseline="0" dirty="0" smtClean="0"/>
+                        <a:t> a respeito de </a:t>
+                      </a:r>
+                      <a:r>
+                        <a:rPr lang="pt-BR" i="1" baseline="0" dirty="0" smtClean="0"/>
+                        <a:t>progressive web apps.</a:t>
+                      </a:r>
+                      <a:endParaRPr lang="pt-BR" dirty="0"/>
+                    </a:p>
+                  </a:txBody>
+                  <a:tcPr/>
+                </a:tc>
+                <a:tc>
+                  <a:txBody>
+                    <a:bodyPr/>
+                    <a:lstStyle/>
+                    <a:p>
+                      <a:pPr algn="ctr"/>
+                      <a:r>
+                        <a:rPr lang="pt-BR" dirty="0" smtClean="0"/>
+                        <a:t>01/08/2017</a:t>
+                      </a:r>
+                      <a:endParaRPr lang="pt-BR" dirty="0"/>
+                    </a:p>
+                  </a:txBody>
+                  <a:tcPr/>
+                </a:tc>
+                <a:tc>
+                  <a:txBody>
+                    <a:bodyPr/>
+                    <a:lstStyle/>
+                    <a:p>
+                      <a:pPr algn="ctr"/>
+                      <a:r>
+                        <a:rPr lang="pt-BR" dirty="0" smtClean="0"/>
+                        <a:t>31/08/2017</a:t>
+                      </a:r>
+                      <a:endParaRPr lang="pt-BR" dirty="0"/>
+                    </a:p>
+                  </a:txBody>
+                  <a:tcPr/>
+                </a:tc>
+              </a:tr>
+              <a:tr h="370840">
+                <a:tc>
+                  <a:txBody>
+                    <a:bodyPr/>
+                    <a:lstStyle/>
+                    <a:p>
+                      <a:pPr algn="ctr"/>
+                      <a:r>
+                        <a:rPr lang="pt-BR" dirty="0" smtClean="0"/>
+                        <a:t>Desenvolvimento dos testes comparativos</a:t>
+                      </a:r>
+                      <a:endParaRPr lang="pt-BR" dirty="0"/>
+                    </a:p>
+                  </a:txBody>
+                  <a:tcPr/>
+                </a:tc>
+                <a:tc>
+                  <a:txBody>
+                    <a:bodyPr/>
+                    <a:lstStyle/>
+                    <a:p>
+                      <a:pPr algn="ctr"/>
+                      <a:r>
+                        <a:rPr lang="pt-BR" dirty="0" smtClean="0"/>
+                        <a:t>Executar</a:t>
+                      </a:r>
+                      <a:r>
+                        <a:rPr lang="pt-BR" baseline="0" dirty="0" smtClean="0"/>
+                        <a:t> os testes necessários para se comparar as duas abordagens de desenvolvimento estudadas.</a:t>
+                      </a:r>
+                      <a:endParaRPr lang="pt-BR" dirty="0"/>
+                    </a:p>
+                  </a:txBody>
+                  <a:tcPr/>
+                </a:tc>
+                <a:tc>
+                  <a:txBody>
+                    <a:bodyPr/>
+                    <a:lstStyle/>
+                    <a:p>
+                      <a:pPr algn="ctr"/>
+                      <a:r>
+                        <a:rPr lang="pt-BR" dirty="0" smtClean="0"/>
+                        <a:t>01/09/2017</a:t>
+                      </a:r>
+                      <a:endParaRPr lang="pt-BR" dirty="0"/>
+                    </a:p>
+                  </a:txBody>
+                  <a:tcPr/>
+                </a:tc>
+                <a:tc>
+                  <a:txBody>
+                    <a:bodyPr/>
+                    <a:lstStyle/>
+                    <a:p>
+                      <a:pPr algn="ctr"/>
+                      <a:r>
+                        <a:rPr lang="pt-BR" dirty="0" smtClean="0"/>
+                        <a:t>31/10/2017</a:t>
+                      </a:r>
+                      <a:endParaRPr lang="pt-BR" dirty="0"/>
+                    </a:p>
+                  </a:txBody>
+                  <a:tcPr/>
+                </a:tc>
+              </a:tr>
+              <a:tr h="370840">
+                <a:tc>
+                  <a:txBody>
+                    <a:bodyPr/>
+                    <a:lstStyle/>
+                    <a:p>
+                      <a:pPr algn="ctr"/>
+                      <a:r>
+                        <a:rPr lang="pt-BR" dirty="0" smtClean="0"/>
+                        <a:t>Resultados e limitações da solução</a:t>
+                      </a:r>
+                      <a:endParaRPr lang="pt-BR" dirty="0"/>
+                    </a:p>
+                  </a:txBody>
+                  <a:tcPr/>
+                </a:tc>
+                <a:tc>
+                  <a:txBody>
+                    <a:bodyPr/>
+                    <a:lstStyle/>
+                    <a:p>
+                      <a:pPr algn="ctr"/>
+                      <a:r>
+                        <a:rPr lang="pt-BR" dirty="0" smtClean="0"/>
+                        <a:t>Resultado através dos testes obtidos e abordagens onde os </a:t>
+                      </a:r>
+                      <a:r>
+                        <a:rPr lang="pt-BR" i="1" dirty="0" smtClean="0"/>
+                        <a:t>progressive</a:t>
+                      </a:r>
+                      <a:r>
+                        <a:rPr lang="pt-BR" i="1" baseline="0" dirty="0" smtClean="0"/>
+                        <a:t> web apps </a:t>
+                      </a:r>
+                      <a:r>
+                        <a:rPr lang="pt-BR" i="0" baseline="0" dirty="0" smtClean="0"/>
+                        <a:t>pouco ou nada contribuem.</a:t>
+                      </a:r>
+                      <a:endParaRPr lang="pt-BR" dirty="0"/>
+                    </a:p>
+                  </a:txBody>
+                  <a:tcPr/>
+                </a:tc>
+                <a:tc>
+                  <a:txBody>
+                    <a:bodyPr/>
+                    <a:lstStyle/>
+                    <a:p>
+                      <a:pPr algn="ctr"/>
+                      <a:r>
+                        <a:rPr lang="pt-BR" dirty="0" smtClean="0"/>
+                        <a:t>01/11/2017</a:t>
+                      </a:r>
+                      <a:endParaRPr lang="pt-BR" dirty="0"/>
+                    </a:p>
+                  </a:txBody>
+                  <a:tcPr/>
+                </a:tc>
+                <a:tc>
+                  <a:txBody>
+                    <a:bodyPr/>
+                    <a:lstStyle/>
+                    <a:p>
+                      <a:pPr algn="ctr"/>
+                      <a:r>
+                        <a:rPr lang="pt-BR" dirty="0" smtClean="0"/>
+                        <a:t>30/11/2017</a:t>
+                      </a:r>
+                      <a:endParaRPr lang="pt-BR" dirty="0"/>
+                    </a:p>
+                  </a:txBody>
+                  <a:tcPr/>
+                </a:tc>
+              </a:tr>
+            </a:tbl>
+          </a:graphicData>
+        </a:graphic>
+      </p:graphicFrame>
+      <p:sp>
+        <p:nvSpPr>
+          <p:cNvPr id="4" name="Espaço Reservado para Número de Slide 3"/>
+          <p:cNvSpPr>
+            <a:spLocks noGrp="1"/>
+          </p:cNvSpPr>
+          <p:nvPr>
+            <p:ph type="sldNum" sz="quarter" idx="12"/>
+          </p:nvPr>
+        </p:nvSpPr>
+        <p:spPr/>
+        <p:txBody>
+          <a:bodyPr/>
+          <a:lstStyle/>
+          <a:p>
+            <a:fld id="{7606F037-5F0B-48DD-A241-E3C6F3921244}" type="slidenum">
+              <a:rPr lang="pt-BR" smtClean="0"/>
+              <a:pPr/>
+              <a:t>18</a:t>
+            </a:fld>
+            <a:endParaRPr lang="pt-BR"/>
+          </a:p>
+        </p:txBody>
+      </p:sp>
+    </p:spTree>
+  </p:cSld>
+  <p:clrMapOvr>
+    <a:masterClrMapping/>
+  </p:clrMapOvr>
+</p:sld>
+</file>
+
+<file path=ppt/slides/slide19.xml><?xml version="1.0" encoding="utf-8"?>
+<p:sld xmlns:a="http://schemas.openxmlformats.org/drawingml/2006/main" xmlns:r="http://schemas.openxmlformats.org/officeDocument/2006/relationships" xmlns:p="http://schemas.openxmlformats.org/presentationml/2006/main">
+  <p:cSld>
+    <p:spTree>
+      <p:nvGrpSpPr>
+        <p:cNvPr id="1" name=""/>
+        <p:cNvGrpSpPr/>
+        <p:nvPr/>
+      </p:nvGrpSpPr>
+      <p:grpSpPr>
+        <a:xfrm>
+          <a:off x="0" y="0"/>
+          <a:ext cx="0" cy="0"/>
+          <a:chOff x="0" y="0"/>
+          <a:chExt cx="0" cy="0"/>
+        </a:xfrm>
+      </p:grpSpPr>
+      <p:sp>
+        <p:nvSpPr>
+          <p:cNvPr id="2" name="Título 1"/>
+          <p:cNvSpPr>
+            <a:spLocks noGrp="1"/>
+          </p:cNvSpPr>
+          <p:nvPr>
+            <p:ph type="title"/>
+          </p:nvPr>
+        </p:nvSpPr>
+        <p:spPr/>
+        <p:txBody>
+          <a:bodyPr/>
+          <a:lstStyle/>
+          <a:p>
+            <a:r>
+              <a:rPr lang="pt-BR" dirty="0" smtClean="0"/>
+              <a:t>Referências</a:t>
+            </a:r>
+            <a:endParaRPr lang="pt-BR" dirty="0"/>
+          </a:p>
+        </p:txBody>
+      </p:sp>
+      <p:sp>
+        <p:nvSpPr>
+          <p:cNvPr id="3" name="Espaço Reservado para Conteúdo 2"/>
+          <p:cNvSpPr>
+            <a:spLocks noGrp="1"/>
+          </p:cNvSpPr>
+          <p:nvPr>
+            <p:ph idx="1"/>
+          </p:nvPr>
+        </p:nvSpPr>
+        <p:spPr/>
+        <p:txBody>
+          <a:bodyPr>
+            <a:normAutofit/>
+          </a:bodyPr>
+          <a:lstStyle/>
+          <a:p>
+            <a:r>
+              <a:rPr lang="pt-BR" sz="2400" dirty="0" smtClean="0"/>
+              <a:t>https://developers.google.com/web/fundamentals/</a:t>
+            </a:r>
+            <a:endParaRPr lang="pt-BR" sz="2400" dirty="0"/>
+          </a:p>
+        </p:txBody>
+      </p:sp>
+      <p:sp>
+        <p:nvSpPr>
+          <p:cNvPr id="4" name="Espaço Reservado para Número de Slide 3"/>
+          <p:cNvSpPr>
+            <a:spLocks noGrp="1"/>
+          </p:cNvSpPr>
+          <p:nvPr>
+            <p:ph type="sldNum" sz="quarter" idx="12"/>
+          </p:nvPr>
+        </p:nvSpPr>
+        <p:spPr/>
+        <p:txBody>
+          <a:bodyPr/>
+          <a:lstStyle/>
+          <a:p>
+            <a:fld id="{7606F037-5F0B-48DD-A241-E3C6F3921244}" type="slidenum">
+              <a:rPr lang="pt-BR" smtClean="0"/>
+              <a:pPr/>
+              <a:t>19</a:t>
             </a:fld>
             <a:endParaRPr lang="pt-BR"/>
           </a:p>
@@ -4644,6 +5224,97 @@
 </p:sld>
 </file>
 
+<file path=ppt/slides/slide20.xml><?xml version="1.0" encoding="utf-8"?>
+<p:sld xmlns:a="http://schemas.openxmlformats.org/drawingml/2006/main" xmlns:r="http://schemas.openxmlformats.org/officeDocument/2006/relationships" xmlns:p="http://schemas.openxmlformats.org/presentationml/2006/main">
+  <p:cSld>
+    <p:spTree>
+      <p:nvGrpSpPr>
+        <p:cNvPr id="1" name=""/>
+        <p:cNvGrpSpPr/>
+        <p:nvPr/>
+      </p:nvGrpSpPr>
+      <p:grpSpPr>
+        <a:xfrm>
+          <a:off x="0" y="0"/>
+          <a:ext cx="0" cy="0"/>
+          <a:chOff x="0" y="0"/>
+          <a:chExt cx="0" cy="0"/>
+        </a:xfrm>
+      </p:grpSpPr>
+      <p:sp>
+        <p:nvSpPr>
+          <p:cNvPr id="2" name="Título 1"/>
+          <p:cNvSpPr>
+            <a:spLocks noGrp="1"/>
+          </p:cNvSpPr>
+          <p:nvPr>
+            <p:ph type="ctrTitle"/>
+          </p:nvPr>
+        </p:nvSpPr>
+        <p:spPr/>
+        <p:txBody>
+          <a:bodyPr/>
+          <a:lstStyle/>
+          <a:p>
+            <a:r>
+              <a:rPr lang="pt-BR" dirty="0" smtClean="0"/>
+              <a:t>Obrigado pela atenção.</a:t>
+            </a:r>
+            <a:endParaRPr lang="pt-BR" dirty="0"/>
+          </a:p>
+        </p:txBody>
+      </p:sp>
+      <p:sp>
+        <p:nvSpPr>
+          <p:cNvPr id="3" name="Subtítulo 2"/>
+          <p:cNvSpPr>
+            <a:spLocks noGrp="1"/>
+          </p:cNvSpPr>
+          <p:nvPr>
+            <p:ph type="subTitle" idx="1"/>
+          </p:nvPr>
+        </p:nvSpPr>
+        <p:spPr/>
+        <p:txBody>
+          <a:bodyPr/>
+          <a:lstStyle/>
+          <a:p>
+            <a:endParaRPr lang="pt-BR"/>
+          </a:p>
+        </p:txBody>
+      </p:sp>
+      <p:sp>
+        <p:nvSpPr>
+          <p:cNvPr id="4" name="Espaço Reservado para Número de Slide 3"/>
+          <p:cNvSpPr>
+            <a:spLocks noGrp="1"/>
+          </p:cNvSpPr>
+          <p:nvPr>
+            <p:ph type="sldNum" sz="quarter" idx="12"/>
+          </p:nvPr>
+        </p:nvSpPr>
+        <p:spPr/>
+        <p:txBody>
+          <a:bodyPr/>
+          <a:lstStyle/>
+          <a:p>
+            <a:fld id="{7606F037-5F0B-48DD-A241-E3C6F3921244}" type="slidenum">
+              <a:rPr lang="pt-BR" smtClean="0"/>
+              <a:pPr/>
+              <a:t>20</a:t>
+            </a:fld>
+            <a:endParaRPr lang="pt-BR"/>
+          </a:p>
+        </p:txBody>
+      </p:sp>
+    </p:spTree>
+  </p:cSld>
+  <p:clrMapOvr>
+    <a:masterClrMapping/>
+  </p:clrMapOvr>
+</p:sld>
+</file>
+
 <file path=ppt/slides/slide3.xml><?xml version="1.0" encoding="utf-8"?>
 <p:sld xmlns:a="http://schemas.openxmlformats.org/drawingml/2006/main" xmlns:r="http://schemas.openxmlformats.org/officeDocument/2006/relationships" xmlns:p="http://schemas.openxmlformats.org/presentationml/2006/main">
   <p:cSld>
@@ -4759,7 +5430,7 @@
             <a:spLocks noGrp="1"/>
           </p:cNvSpPr>
           <p:nvPr>
-            <p:ph type="title"/>
+            <p:ph type="ctrTitle"/>
           </p:nvPr>
         </p:nvSpPr>
         <p:spPr/>
@@ -4769,7 +5440,7 @@
           <a:p>
             <a:r>
               <a:rPr lang="pt-BR" dirty="0" smtClean="0"/>
-              <a:t>Soluções Nativas</a:t>
+              <a:t>Nativo x Web</a:t>
             </a:r>
             <a:endParaRPr lang="pt-BR" dirty="0"/>
           </a:p>
@@ -4777,76 +5448,20 @@
       </p:sp>
       <p:sp>
         <p:nvSpPr>
-          <p:cNvPr id="3" name="Espaço Reservado para Conteúdo 2"/>
-          <p:cNvSpPr>
-            <a:spLocks noGrp="1"/>
-          </p:cNvSpPr>
-          <p:nvPr>
-            <p:ph idx="1"/>
-          </p:nvPr>
-        </p:nvSpPr>
-        <p:spPr/>
-        <p:txBody>
-          <a:bodyPr>
-            <a:normAutofit/>
-          </a:bodyPr>
-          <a:lstStyle/>
-          <a:p>
-            <a:r>
-              <a:rPr lang="pt-BR" sz="2400" dirty="0" smtClean="0"/>
-              <a:t>Vantagens</a:t>
-            </a:r>
-          </a:p>
-          <a:p>
-            <a:pPr lvl="1"/>
-            <a:r>
-              <a:rPr lang="pt-BR" sz="2400" dirty="0" smtClean="0"/>
-              <a:t>Bom desempenho</a:t>
-            </a:r>
-          </a:p>
-          <a:p>
-            <a:pPr lvl="1"/>
-            <a:r>
-              <a:rPr lang="pt-BR" sz="2400" dirty="0" smtClean="0"/>
-              <a:t>Funcionamento </a:t>
-            </a:r>
-            <a:r>
-              <a:rPr lang="pt-BR" sz="2400" i="1" dirty="0" smtClean="0"/>
-              <a:t>off-line</a:t>
-            </a:r>
-          </a:p>
-          <a:p>
-            <a:r>
-              <a:rPr lang="pt-BR" sz="2400" dirty="0" smtClean="0"/>
-              <a:t>Desvantagens</a:t>
-            </a:r>
-          </a:p>
-          <a:p>
-            <a:pPr lvl="1"/>
-            <a:r>
-              <a:rPr lang="pt-BR" sz="2400" dirty="0" smtClean="0"/>
-              <a:t>Uso burocratizado</a:t>
-            </a:r>
-          </a:p>
-          <a:p>
-            <a:pPr lvl="1"/>
-            <a:r>
-              <a:rPr lang="pt-BR" sz="2400" dirty="0" smtClean="0"/>
-              <a:t>Queda no número de </a:t>
-            </a:r>
-            <a:r>
-              <a:rPr lang="pt-BR" sz="2400" i="1" dirty="0" smtClean="0"/>
-              <a:t>downloads</a:t>
-            </a:r>
-            <a:endParaRPr lang="pt-BR" sz="2400" dirty="0" smtClean="0"/>
-          </a:p>
-          <a:p>
-            <a:pPr lvl="1"/>
-            <a:r>
-              <a:rPr lang="pt-BR" sz="2400" dirty="0" smtClean="0"/>
-              <a:t>Alto custo no desenvolvimento</a:t>
-            </a:r>
-            <a:endParaRPr lang="pt-BR" sz="2400" dirty="0"/>
+          <p:cNvPr id="3" name="Subtítulo 2"/>
+          <p:cNvSpPr>
+            <a:spLocks noGrp="1"/>
+          </p:cNvSpPr>
+          <p:nvPr>
+            <p:ph type="subTitle" idx="1"/>
+          </p:nvPr>
+        </p:nvSpPr>
+        <p:spPr/>
+        <p:txBody>
+          <a:bodyPr/>
+          <a:lstStyle/>
+          <a:p>
+            <a:endParaRPr lang="pt-BR"/>
           </a:p>
         </p:txBody>
       </p:sp>
@@ -4915,14 +5530,10 @@
           <a:lstStyle/>
           <a:p>
             <a:r>
-              <a:rPr lang="pt-BR" i="1" dirty="0" smtClean="0"/>
-              <a:t>Web apps </a:t>
-            </a:r>
-            <a:r>
               <a:rPr lang="pt-BR" dirty="0" smtClean="0"/>
-              <a:t>tradicionais</a:t>
-            </a:r>
-            <a:endParaRPr lang="pt-BR" i="1" dirty="0"/>
+              <a:t>Soluções Nativas</a:t>
+            </a:r>
+            <a:endParaRPr lang="pt-BR" dirty="0"/>
           </a:p>
         </p:txBody>
       </p:sp>
@@ -4952,14 +5563,30 @@
             <a:pPr lvl="1"/>
             <a:r>
               <a:rPr lang="pt-BR" sz="2400" dirty="0" smtClean="0"/>
-              <a:t>Podem ser utilizados sem instalação</a:t>
+              <a:t>Bom </a:t>
+            </a:r>
+            <a:r>
+              <a:rPr lang="pt-BR" sz="2400" dirty="0" smtClean="0"/>
+              <a:t>desempenho</a:t>
             </a:r>
           </a:p>
           <a:p>
             <a:pPr lvl="1"/>
             <a:r>
               <a:rPr lang="pt-BR" sz="2400" dirty="0" smtClean="0"/>
-              <a:t>Menor custo de desenvolvimento</a:t>
+              <a:t>Acesso à recursos do aparelho</a:t>
+            </a:r>
+            <a:endParaRPr lang="pt-BR" sz="2400" dirty="0" smtClean="0"/>
+          </a:p>
+          <a:p>
+            <a:pPr lvl="1"/>
+            <a:r>
+              <a:rPr lang="pt-BR" sz="2400" dirty="0" smtClean="0"/>
+              <a:t>Funcionamento </a:t>
+            </a:r>
+            <a:r>
+              <a:rPr lang="pt-BR" sz="2400" i="1" dirty="0" smtClean="0"/>
+              <a:t>off-line</a:t>
             </a:r>
           </a:p>
           <a:p>
@@ -4972,21 +5599,22 @@
             <a:pPr lvl="1"/>
             <a:r>
               <a:rPr lang="pt-BR" sz="2400" dirty="0" smtClean="0"/>
-              <a:t>Dependente de conexão com a rede</a:t>
+              <a:t>Uso </a:t>
+            </a:r>
+            <a:r>
+              <a:rPr lang="pt-BR" sz="2400" dirty="0" smtClean="0"/>
+              <a:t>burocratizado</a:t>
             </a:r>
           </a:p>
           <a:p>
             <a:pPr lvl="1"/>
             <a:r>
               <a:rPr lang="pt-BR" sz="2400" dirty="0" smtClean="0"/>
-              <a:t>Desempenho inferior</a:t>
-            </a:r>
-          </a:p>
-          <a:p>
-            <a:pPr lvl="1"/>
-            <a:r>
-              <a:rPr lang="pt-BR" sz="2400" dirty="0" smtClean="0"/>
-              <a:t>Dificuldade no acesso à recursos do aparelho</a:t>
+              <a:t>Alto </a:t>
+            </a:r>
+            <a:r>
+              <a:rPr lang="pt-BR" sz="2400" dirty="0" smtClean="0"/>
+              <a:t>custo no desenvolvimento</a:t>
             </a:r>
             <a:endParaRPr lang="pt-BR" sz="2400" dirty="0"/>
           </a:p>
@@ -5057,10 +5685,14 @@
           <a:lstStyle/>
           <a:p>
             <a:r>
+              <a:rPr lang="pt-BR" i="1" dirty="0" smtClean="0"/>
+              <a:t>Web apps </a:t>
+            </a:r>
+            <a:r>
               <a:rPr lang="pt-BR" dirty="0" smtClean="0"/>
-              <a:t>Objetivos</a:t>
-            </a:r>
-            <a:endParaRPr lang="pt-BR" dirty="0"/>
+              <a:t>tradicionais</a:t>
+            </a:r>
+            <a:endParaRPr lang="pt-BR" i="1" dirty="0"/>
           </a:p>
         </p:txBody>
       </p:sp>
@@ -5083,18 +5715,50 @@
           <a:p>
             <a:r>
               <a:rPr lang="pt-BR" sz="2400" dirty="0" smtClean="0"/>
-              <a:t>Apresentar as tecnologias que compõem um </a:t>
-            </a:r>
-            <a:r>
-              <a:rPr lang="pt-BR" sz="2400" i="1" dirty="0" smtClean="0"/>
-              <a:t>progressive web app</a:t>
-            </a:r>
-          </a:p>
-          <a:p>
-            <a:r>
-              <a:rPr lang="pt-BR" sz="2400" dirty="0" smtClean="0"/>
-              <a:t>Descrever tipos de aplicações onde a abordagem pouco ou nada têm a contribuir</a:t>
-            </a:r>
+              <a:t>Vantagens</a:t>
+            </a:r>
+          </a:p>
+          <a:p>
+            <a:pPr lvl="1"/>
+            <a:r>
+              <a:rPr lang="pt-BR" sz="2400" dirty="0" smtClean="0"/>
+              <a:t>Podem ser utilizados sem instalação</a:t>
+            </a:r>
+          </a:p>
+          <a:p>
+            <a:pPr lvl="1"/>
+            <a:r>
+              <a:rPr lang="pt-BR" sz="2400" dirty="0" smtClean="0"/>
+              <a:t>Menor custo de desenvolvimento</a:t>
+            </a:r>
+          </a:p>
+          <a:p>
+            <a:r>
+              <a:rPr lang="pt-BR" sz="2400" dirty="0" smtClean="0"/>
+              <a:t>Desvantagens</a:t>
+            </a:r>
+          </a:p>
+          <a:p>
+            <a:pPr lvl="1"/>
+            <a:r>
+              <a:rPr lang="pt-BR" sz="2400" dirty="0" smtClean="0"/>
+              <a:t>Dependente de conexão com a rede</a:t>
+            </a:r>
+          </a:p>
+          <a:p>
+            <a:pPr lvl="1"/>
+            <a:r>
+              <a:rPr lang="pt-BR" sz="2400" dirty="0" smtClean="0"/>
+              <a:t>Desempenho inferior</a:t>
+            </a:r>
+          </a:p>
+          <a:p>
+            <a:pPr lvl="1"/>
+            <a:r>
+              <a:rPr lang="pt-BR" sz="2400" dirty="0" smtClean="0"/>
+              <a:t>Dificuldade no acesso à recursos do aparelho</a:t>
+            </a:r>
+            <a:endParaRPr lang="pt-BR" sz="2400" dirty="0"/>
           </a:p>
         </p:txBody>
       </p:sp>
@@ -5154,7 +5818,7 @@
             <a:spLocks noGrp="1"/>
           </p:cNvSpPr>
           <p:nvPr>
-            <p:ph type="ctrTitle"/>
+            <p:ph type="title"/>
           </p:nvPr>
         </p:nvSpPr>
         <p:spPr/>
@@ -5164,7 +5828,7 @@
           <a:p>
             <a:r>
               <a:rPr lang="pt-BR" dirty="0" smtClean="0"/>
-              <a:t>II – Referencial Teórico</a:t>
+              <a:t>Objetivos</a:t>
             </a:r>
             <a:endParaRPr lang="pt-BR" dirty="0"/>
           </a:p>
@@ -5172,20 +5836,67 @@
       </p:sp>
       <p:sp>
         <p:nvSpPr>
-          <p:cNvPr id="3" name="Subtítulo 2"/>
-          <p:cNvSpPr>
-            <a:spLocks noGrp="1"/>
-          </p:cNvSpPr>
-          <p:nvPr>
-            <p:ph type="subTitle" idx="1"/>
-          </p:nvPr>
-        </p:nvSpPr>
-        <p:spPr/>
-        <p:txBody>
-          <a:bodyPr/>
-          <a:lstStyle/>
-          <a:p>
-            <a:endParaRPr lang="pt-BR"/>
+          <p:cNvPr id="3" name="Espaço Reservado para Conteúdo 2"/>
+          <p:cNvSpPr>
+            <a:spLocks noGrp="1"/>
+          </p:cNvSpPr>
+          <p:nvPr>
+            <p:ph idx="1"/>
+          </p:nvPr>
+        </p:nvSpPr>
+        <p:spPr/>
+        <p:txBody>
+          <a:bodyPr>
+            <a:normAutofit/>
+          </a:bodyPr>
+          <a:lstStyle/>
+          <a:p>
+            <a:r>
+              <a:rPr lang="pt-BR" sz="2400" dirty="0" smtClean="0"/>
+              <a:t>Apresentar as tecnologias que compõem um </a:t>
+            </a:r>
+            <a:r>
+              <a:rPr lang="pt-BR" sz="2400" i="1" dirty="0" smtClean="0"/>
+              <a:t>progressive web </a:t>
+            </a:r>
+            <a:r>
+              <a:rPr lang="pt-BR" sz="2400" i="1" dirty="0" smtClean="0"/>
+              <a:t>app</a:t>
+            </a:r>
+          </a:p>
+          <a:p>
+            <a:pPr lvl="0"/>
+            <a:r>
+              <a:rPr lang="pt-BR" sz="2400" dirty="0" smtClean="0"/>
+              <a:t>Destacar alguns parâmetros/critérios para a avaliação do grau de conformidade de soluções </a:t>
+            </a:r>
+            <a:r>
+              <a:rPr lang="pt-BR" sz="2400" dirty="0" err="1" smtClean="0"/>
+              <a:t>PWAs</a:t>
+            </a:r>
+            <a:r>
+              <a:rPr lang="pt-BR" sz="2400" dirty="0" smtClean="0"/>
+              <a:t> em relação à aplicações </a:t>
+            </a:r>
+            <a:r>
+              <a:rPr lang="pt-BR" sz="2400" dirty="0" smtClean="0"/>
+              <a:t>nativas</a:t>
+            </a:r>
+            <a:endParaRPr lang="pt-BR" sz="2400" i="1" dirty="0" smtClean="0"/>
+          </a:p>
+          <a:p>
+            <a:r>
+              <a:rPr lang="pt-BR" sz="2400" dirty="0" smtClean="0"/>
+              <a:t>Descrever </a:t>
+            </a:r>
+            <a:r>
+              <a:rPr lang="pt-BR" sz="2400" dirty="0" smtClean="0"/>
+              <a:t>os tipos </a:t>
+            </a:r>
+            <a:r>
+              <a:rPr lang="pt-BR" sz="2400" dirty="0" smtClean="0"/>
+              <a:t>de aplicações onde a abordagem pouco ou nada têm a contribuir</a:t>
+            </a:r>
           </a:p>
         </p:txBody>
       </p:sp>
@@ -5245,93 +5956,38 @@
             <a:spLocks noGrp="1"/>
           </p:cNvSpPr>
           <p:nvPr>
-            <p:ph type="title"/>
-          </p:nvPr>
-        </p:nvSpPr>
-        <p:spPr/>
-        <p:txBody>
-          <a:bodyPr/>
-          <a:lstStyle/>
-          <a:p>
-            <a:r>
-              <a:rPr lang="pt-BR" i="1" dirty="0" smtClean="0"/>
-              <a:t>Progressive Web Apps</a:t>
-            </a:r>
-            <a:endParaRPr lang="pt-BR" i="1" dirty="0"/>
-          </a:p>
-        </p:txBody>
-      </p:sp>
-      <p:sp>
-        <p:nvSpPr>
-          <p:cNvPr id="3" name="Espaço Reservado para Conteúdo 2"/>
-          <p:cNvSpPr>
-            <a:spLocks noGrp="1"/>
-          </p:cNvSpPr>
-          <p:nvPr>
-            <p:ph idx="1"/>
-          </p:nvPr>
-        </p:nvSpPr>
-        <p:spPr/>
-        <p:txBody>
-          <a:bodyPr/>
-          <a:lstStyle/>
-          <a:p>
-            <a:r>
-              <a:rPr lang="pt-BR" sz="2400" dirty="0" smtClean="0"/>
-              <a:t>Conjunto de tecnologias</a:t>
-            </a:r>
-          </a:p>
-          <a:p>
-            <a:pPr lvl="1"/>
-            <a:r>
-              <a:rPr lang="pt-BR" sz="2400" dirty="0" smtClean="0"/>
-              <a:t>Visual de aplicativos nativos</a:t>
-            </a:r>
-          </a:p>
-          <a:p>
-            <a:pPr lvl="1"/>
-            <a:r>
-              <a:rPr lang="pt-BR" sz="2400" dirty="0" smtClean="0"/>
-              <a:t>Carregamento rápido e confiável</a:t>
-            </a:r>
-          </a:p>
-          <a:p>
-            <a:pPr lvl="1"/>
-            <a:r>
-              <a:rPr lang="pt-BR" sz="2400" dirty="0" smtClean="0"/>
-              <a:t>Seguro</a:t>
-            </a:r>
-          </a:p>
-          <a:p>
-            <a:pPr lvl="1"/>
-            <a:r>
-              <a:rPr lang="pt-BR" sz="2400" dirty="0" err="1" smtClean="0"/>
-              <a:t>Indexável</a:t>
-            </a:r>
-            <a:endParaRPr lang="pt-BR" sz="2400" dirty="0" smtClean="0"/>
-          </a:p>
-          <a:p>
-            <a:pPr lvl="1"/>
-            <a:r>
-              <a:rPr lang="pt-BR" sz="2400" dirty="0" smtClean="0"/>
-              <a:t>Ícone de atalho na </a:t>
-            </a:r>
-            <a:r>
-              <a:rPr lang="pt-BR" sz="2400" i="1" dirty="0" err="1" smtClean="0"/>
-              <a:t>homescreen</a:t>
-            </a:r>
-            <a:r>
-              <a:rPr lang="pt-BR" sz="2400" i="1" dirty="0" smtClean="0"/>
-              <a:t> </a:t>
-            </a:r>
-            <a:r>
-              <a:rPr lang="pt-BR" sz="2400" dirty="0" smtClean="0"/>
-              <a:t>do aparelho</a:t>
-            </a:r>
-          </a:p>
-          <a:p>
-            <a:pPr lvl="1"/>
+            <p:ph type="ctrTitle"/>
+          </p:nvPr>
+        </p:nvSpPr>
+        <p:spPr/>
+        <p:txBody>
+          <a:bodyPr/>
+          <a:lstStyle/>
+          <a:p>
+            <a:r>
+              <a:rPr lang="pt-BR" dirty="0" smtClean="0"/>
+              <a:t>II – Referencial Teórico</a:t>
+            </a:r>
             <a:endParaRPr lang="pt-BR" dirty="0"/>
+          </a:p>
+        </p:txBody>
+      </p:sp>
+      <p:sp>
+        <p:nvSpPr>
+          <p:cNvPr id="3" name="Subtítulo 2"/>
+          <p:cNvSpPr>
+            <a:spLocks noGrp="1"/>
+          </p:cNvSpPr>
+          <p:nvPr>
+            <p:ph type="subTitle" idx="1"/>
+          </p:nvPr>
+        </p:nvSpPr>
+        <p:spPr/>
+        <p:txBody>
+          <a:bodyPr/>
+          <a:lstStyle/>
+          <a:p>
+            <a:endParaRPr lang="pt-BR"/>
           </a:p>
         </p:txBody>
       </p:sp>
@@ -5401,7 +6057,7 @@
           <a:p>
             <a:r>
               <a:rPr lang="pt-BR" i="1" dirty="0" smtClean="0"/>
-              <a:t>Application Shell</a:t>
+              <a:t>Progressive Web Apps</a:t>
             </a:r>
             <a:endParaRPr lang="pt-BR" i="1" dirty="0"/>
           </a:p>
@@ -5424,46 +6080,59 @@
           <a:p>
             <a:r>
               <a:rPr lang="pt-BR" sz="2400" dirty="0" smtClean="0"/>
-              <a:t>Modelo arquitetural</a:t>
+              <a:t>Conjunto de tecnologias</a:t>
             </a:r>
           </a:p>
           <a:p>
             <a:pPr lvl="1"/>
             <a:r>
               <a:rPr lang="pt-BR" sz="2400" dirty="0" smtClean="0"/>
-              <a:t>Arquivos de </a:t>
+              <a:t>Visual de aplicativos nativos</a:t>
+            </a:r>
+          </a:p>
+          <a:p>
+            <a:pPr lvl="1"/>
+            <a:r>
+              <a:rPr lang="pt-BR" sz="2400" dirty="0" smtClean="0"/>
+              <a:t>Carregamento rápido e confiável</a:t>
+            </a:r>
+          </a:p>
+          <a:p>
+            <a:pPr lvl="1"/>
+            <a:r>
+              <a:rPr lang="pt-BR" sz="2400" dirty="0" smtClean="0"/>
+              <a:t>Seguro</a:t>
+            </a:r>
+          </a:p>
+          <a:p>
+            <a:pPr lvl="1"/>
+            <a:r>
+              <a:rPr lang="pt-BR" sz="2400" dirty="0" err="1" smtClean="0"/>
+              <a:t>Indexável</a:t>
+            </a:r>
+            <a:endParaRPr lang="pt-BR" sz="2400" dirty="0" smtClean="0"/>
+          </a:p>
+          <a:p>
+            <a:pPr lvl="1"/>
+            <a:r>
+              <a:rPr lang="pt-BR" sz="2400" dirty="0" smtClean="0"/>
+              <a:t>Ícone de atalho na </a:t>
             </a:r>
             <a:r>
               <a:rPr lang="pt-BR" sz="2400" i="1" dirty="0" err="1" smtClean="0"/>
-              <a:t>user</a:t>
+              <a:t>homescreen</a:t>
             </a:r>
             <a:r>
               <a:rPr lang="pt-BR" sz="2400" i="1" dirty="0" smtClean="0"/>
-              <a:t> interface </a:t>
-            </a:r>
-            <a:r>
-              <a:rPr lang="pt-BR" sz="2400" dirty="0" smtClean="0"/>
-              <a:t>armazenados em </a:t>
-            </a:r>
-            <a:r>
-              <a:rPr lang="pt-BR" sz="2400" i="1" dirty="0" err="1" smtClean="0"/>
-              <a:t>cache</a:t>
-            </a:r>
-            <a:endParaRPr lang="pt-BR" sz="2400" dirty="0" smtClean="0"/>
+              <a:t> </a:t>
+            </a:r>
+            <a:r>
+              <a:rPr lang="pt-BR" sz="2400" dirty="0" smtClean="0"/>
+              <a:t>do aparelho</a:t>
+            </a:r>
           </a:p>
           <a:p>
             <a:pPr lvl="1"/>
-            <a:r>
-              <a:rPr lang="pt-BR" sz="2400" dirty="0" smtClean="0"/>
-              <a:t>Dados dinâmicos sendo requisitados na rede</a:t>
-            </a:r>
-          </a:p>
-          <a:p>
-            <a:pPr lvl="1"/>
-            <a:r>
-              <a:rPr lang="pt-BR" sz="2400" dirty="0" smtClean="0"/>
-              <a:t>Economia no uso de dados</a:t>
-            </a:r>
             <a:endParaRPr lang="pt-BR" dirty="0"/>
           </a:p>
         </p:txBody>

</xml_diff>

<commit_message>
Sat Jun 17 2017 18:16:19
</commit_message>
<xml_diff>
--- a/apresentacao.pptx
+++ b/apresentacao.pptx
@@ -5,7 +5,7 @@
     <p:sldMasterId id="2147483648" r:id="rId1"/>
   </p:sldMasterIdLst>
   <p:notesMasterIdLst>
-    <p:notesMasterId r:id="rId22"/>
+    <p:notesMasterId r:id="rId20"/>
   </p:notesMasterIdLst>
   <p:sldIdLst>
     <p:sldId id="256" r:id="rId2"/>
@@ -15,19 +15,17 @@
     <p:sldId id="261" r:id="rId6"/>
     <p:sldId id="262" r:id="rId7"/>
     <p:sldId id="271" r:id="rId8"/>
-    <p:sldId id="259" r:id="rId9"/>
-    <p:sldId id="263" r:id="rId10"/>
-    <p:sldId id="264" r:id="rId11"/>
+    <p:sldId id="276" r:id="rId9"/>
+    <p:sldId id="259" r:id="rId10"/>
+    <p:sldId id="263" r:id="rId11"/>
     <p:sldId id="265" r:id="rId12"/>
     <p:sldId id="272" r:id="rId13"/>
-    <p:sldId id="266" r:id="rId14"/>
-    <p:sldId id="270" r:id="rId15"/>
-    <p:sldId id="274" r:id="rId16"/>
+    <p:sldId id="270" r:id="rId14"/>
+    <p:sldId id="260" r:id="rId15"/>
+    <p:sldId id="267" r:id="rId16"/>
     <p:sldId id="275" r:id="rId17"/>
-    <p:sldId id="260" r:id="rId18"/>
-    <p:sldId id="267" r:id="rId19"/>
-    <p:sldId id="268" r:id="rId20"/>
-    <p:sldId id="269" r:id="rId21"/>
+    <p:sldId id="268" r:id="rId18"/>
+    <p:sldId id="269" r:id="rId19"/>
   </p:sldIdLst>
   <p:sldSz cx="9144000" cy="6858000" type="screen4x3"/>
   <p:notesSz cx="6858000" cy="9144000"/>
@@ -212,7 +210,7 @@
             <a:fld id="{0730F96E-CD9F-47DE-9E3A-CF98BE122B94}" type="datetimeFigureOut">
               <a:rPr lang="pt-BR" smtClean="0"/>
               <a:pPr/>
-              <a:t>15/06/2017</a:t>
+              <a:t>17/06/2017</a:t>
             </a:fld>
             <a:endParaRPr lang="pt-BR"/>
           </a:p>
@@ -742,7 +740,7 @@
             <a:fld id="{194CB1D5-6381-4E76-AD57-B9022AD4A2C7}" type="datetime1">
               <a:rPr lang="pt-BR" smtClean="0"/>
               <a:pPr/>
-              <a:t>15/06/2017</a:t>
+              <a:t>17/06/2017</a:t>
             </a:fld>
             <a:endParaRPr lang="pt-BR"/>
           </a:p>
@@ -909,7 +907,7 @@
             <a:fld id="{70AC06B7-17CA-46C5-9115-9CCDC26EB0F6}" type="datetime1">
               <a:rPr lang="pt-BR" smtClean="0"/>
               <a:pPr/>
-              <a:t>15/06/2017</a:t>
+              <a:t>17/06/2017</a:t>
             </a:fld>
             <a:endParaRPr lang="pt-BR"/>
           </a:p>
@@ -1086,7 +1084,7 @@
             <a:fld id="{775CA797-804E-4AD7-A3C0-3795D50495EA}" type="datetime1">
               <a:rPr lang="pt-BR" smtClean="0"/>
               <a:pPr/>
-              <a:t>15/06/2017</a:t>
+              <a:t>17/06/2017</a:t>
             </a:fld>
             <a:endParaRPr lang="pt-BR"/>
           </a:p>
@@ -1253,7 +1251,7 @@
             <a:fld id="{4D0D9180-9CC1-4B9F-BD86-289B320B5737}" type="datetime1">
               <a:rPr lang="pt-BR" smtClean="0"/>
               <a:pPr/>
-              <a:t>15/06/2017</a:t>
+              <a:t>17/06/2017</a:t>
             </a:fld>
             <a:endParaRPr lang="pt-BR"/>
           </a:p>
@@ -1496,7 +1494,7 @@
             <a:fld id="{AC4D17E9-988B-4C37-B696-7B547BECE548}" type="datetime1">
               <a:rPr lang="pt-BR" smtClean="0"/>
               <a:pPr/>
-              <a:t>15/06/2017</a:t>
+              <a:t>17/06/2017</a:t>
             </a:fld>
             <a:endParaRPr lang="pt-BR"/>
           </a:p>
@@ -1781,7 +1779,7 @@
             <a:fld id="{50B1281A-4B9C-4B49-9B6F-25AA207B80D1}" type="datetime1">
               <a:rPr lang="pt-BR" smtClean="0"/>
               <a:pPr/>
-              <a:t>15/06/2017</a:t>
+              <a:t>17/06/2017</a:t>
             </a:fld>
             <a:endParaRPr lang="pt-BR"/>
           </a:p>
@@ -2200,7 +2198,7 @@
             <a:fld id="{EE4679D3-5732-4EAE-A664-C4FC7EA14FF8}" type="datetime1">
               <a:rPr lang="pt-BR" smtClean="0"/>
               <a:pPr/>
-              <a:t>15/06/2017</a:t>
+              <a:t>17/06/2017</a:t>
             </a:fld>
             <a:endParaRPr lang="pt-BR"/>
           </a:p>
@@ -2315,7 +2313,7 @@
             <a:fld id="{DD2B67A8-A89F-4660-9469-7C809E93377A}" type="datetime1">
               <a:rPr lang="pt-BR" smtClean="0"/>
               <a:pPr/>
-              <a:t>15/06/2017</a:t>
+              <a:t>17/06/2017</a:t>
             </a:fld>
             <a:endParaRPr lang="pt-BR"/>
           </a:p>
@@ -2407,7 +2405,7 @@
             <a:fld id="{5D952FB9-EC2D-4D24-B0DC-78BBD6D065F2}" type="datetime1">
               <a:rPr lang="pt-BR" smtClean="0"/>
               <a:pPr/>
-              <a:t>15/06/2017</a:t>
+              <a:t>17/06/2017</a:t>
             </a:fld>
             <a:endParaRPr lang="pt-BR"/>
           </a:p>
@@ -2681,7 +2679,7 @@
             <a:fld id="{7AB76327-70CD-43EA-9FC5-1226846EB383}" type="datetime1">
               <a:rPr lang="pt-BR" smtClean="0"/>
               <a:pPr/>
-              <a:t>15/06/2017</a:t>
+              <a:t>17/06/2017</a:t>
             </a:fld>
             <a:endParaRPr lang="pt-BR"/>
           </a:p>
@@ -2931,7 +2929,7 @@
             <a:fld id="{F4859177-8CEB-47E9-87D5-CA4581D77702}" type="datetime1">
               <a:rPr lang="pt-BR" smtClean="0"/>
               <a:pPr/>
-              <a:t>15/06/2017</a:t>
+              <a:t>17/06/2017</a:t>
             </a:fld>
             <a:endParaRPr lang="pt-BR"/>
           </a:p>
@@ -3141,7 +3139,7 @@
             <a:fld id="{6782A638-3448-44BC-9962-075E4BB902B1}" type="datetime1">
               <a:rPr lang="pt-BR" smtClean="0"/>
               <a:pPr/>
-              <a:t>15/06/2017</a:t>
+              <a:t>17/06/2017</a:t>
             </a:fld>
             <a:endParaRPr lang="pt-BR"/>
           </a:p>
@@ -3629,11 +3627,47 @@
           </a:p>
         </p:txBody>
       </p:sp>
+      <p:pic>
+        <p:nvPicPr>
+          <p:cNvPr id="5" name="Picture" descr="https://lh6.googleusercontent.com/Oeqrb8RwJRCAQ_-7gXnj3kjQ5OLUTKFX14h9rXgIsBwOL5x7HI0UfDUzzEEHfEyS_3bWZIOJm62_Vz_KRgA6vvjHnQLJNza8genuCBgp5s8UeiBO4Lm3uvpprtdmnitseQp8Zso"/>
+          <p:cNvPicPr/>
+          <p:nvPr/>
+        </p:nvPicPr>
+        <p:blipFill>
+          <a:blip r:embed="rId2"/>
+          <a:stretch>
+            <a:fillRect/>
+          </a:stretch>
+        </p:blipFill>
+        <p:spPr bwMode="auto">
+          <a:xfrm>
+            <a:off x="142844" y="5214950"/>
+            <a:ext cx="1583690" cy="1494790"/>
+          </a:xfrm>
+          <a:prstGeom prst="rect">
+            <a:avLst/>
+          </a:prstGeom>
+          <a:noFill/>
+          <a:ln w="9525">
+            <a:noFill/>
+            <a:miter lim="800000"/>
+            <a:headEnd/>
+            <a:tailEnd/>
+          </a:ln>
+        </p:spPr>
+      </p:pic>
     </p:spTree>
   </p:cSld>
   <p:clrMapOvr>
     <a:masterClrMapping/>
   </p:clrMapOvr>
+  <p:timing>
+    <p:tnLst>
+      <p:par>
+        <p:cTn id="1" dur="indefinite" restart="never" nodeType="tmRoot"/>
+      </p:par>
+    </p:tnLst>
+  </p:timing>
 </p:sld>
 </file>
 
@@ -3671,7 +3705,7 @@
           <a:p>
             <a:r>
               <a:rPr lang="pt-BR" i="1" dirty="0" smtClean="0"/>
-              <a:t>Application Shell</a:t>
+              <a:t>Progressive Web Apps</a:t>
             </a:r>
             <a:endParaRPr lang="pt-BR" i="1" dirty="0"/>
           </a:p>
@@ -3694,22 +3728,65 @@
           <a:p>
             <a:r>
               <a:rPr lang="pt-BR" sz="2400" dirty="0" smtClean="0"/>
-              <a:t>Modelo arquitetural</a:t>
+              <a:t>Conjunto de tecnologias</a:t>
             </a:r>
           </a:p>
           <a:p>
             <a:pPr lvl="1"/>
             <a:r>
               <a:rPr lang="pt-BR" sz="2400" dirty="0" smtClean="0"/>
-              <a:t>Arquivos de </a:t>
+              <a:t>Visual de aplicativos nativos</a:t>
+            </a:r>
+          </a:p>
+          <a:p>
+            <a:pPr lvl="1"/>
+            <a:r>
+              <a:rPr lang="pt-BR" sz="2400" dirty="0" smtClean="0"/>
+              <a:t>Carregamento rápido e </a:t>
+            </a:r>
+            <a:r>
+              <a:rPr lang="pt-BR" sz="2400" dirty="0" smtClean="0"/>
+              <a:t>confiável (</a:t>
             </a:r>
             <a:r>
               <a:rPr lang="pt-BR" sz="2400" i="1" dirty="0" smtClean="0"/>
-              <a:t>interface </a:t>
-            </a:r>
-            <a:r>
-              <a:rPr lang="pt-BR" sz="2400" dirty="0" smtClean="0"/>
-              <a:t>de usuário</a:t>
+              <a:t>application </a:t>
+            </a:r>
+            <a:r>
+              <a:rPr lang="pt-BR" sz="2400" i="1" dirty="0" err="1" smtClean="0"/>
+              <a:t>shell</a:t>
+            </a:r>
+            <a:r>
+              <a:rPr lang="pt-BR" sz="2400" dirty="0" smtClean="0"/>
+              <a:t>)</a:t>
+            </a:r>
+            <a:endParaRPr lang="pt-BR" sz="2400" dirty="0" smtClean="0"/>
+          </a:p>
+          <a:p>
+            <a:pPr lvl="1"/>
+            <a:r>
+              <a:rPr lang="pt-BR" sz="2400" dirty="0" smtClean="0"/>
+              <a:t>Seguro (uso obrigatório de HTTPS)</a:t>
+            </a:r>
+            <a:endParaRPr lang="pt-BR" sz="2400" dirty="0" smtClean="0"/>
+          </a:p>
+          <a:p>
+            <a:pPr lvl="1"/>
+            <a:r>
+              <a:rPr lang="pt-BR" sz="2400" dirty="0" err="1" smtClean="0"/>
+              <a:t>Indexável</a:t>
+            </a:r>
+            <a:endParaRPr lang="pt-BR" sz="2400" dirty="0" smtClean="0"/>
+          </a:p>
+          <a:p>
+            <a:pPr lvl="1"/>
+            <a:r>
+              <a:rPr lang="pt-BR" sz="2400" dirty="0" smtClean="0"/>
+              <a:t>Ícone de atalho na </a:t>
+            </a:r>
+            <a:r>
+              <a:rPr lang="pt-BR" sz="2400" i="1" dirty="0" err="1" smtClean="0"/>
+              <a:t>homescreen</a:t>
             </a:r>
             <a:r>
               <a:rPr lang="pt-BR" sz="2400" i="1" dirty="0" smtClean="0"/>
@@ -3717,39 +3794,55 @@
             </a:r>
             <a:r>
               <a:rPr lang="pt-BR" sz="2400" dirty="0" smtClean="0"/>
-              <a:t>armazenados em </a:t>
+              <a:t>do </a:t>
+            </a:r>
+            <a:r>
+              <a:rPr lang="pt-BR" sz="2400" dirty="0" smtClean="0"/>
+              <a:t>aparelho (</a:t>
+            </a:r>
+            <a:r>
+              <a:rPr lang="pt-BR" sz="2400" i="1" dirty="0" smtClean="0"/>
+              <a:t>web </a:t>
             </a:r>
             <a:r>
               <a:rPr lang="pt-BR" sz="2400" i="1" dirty="0" err="1" smtClean="0"/>
-              <a:t>cache</a:t>
+              <a:t>manifest</a:t>
+            </a:r>
+            <a:r>
+              <a:rPr lang="pt-BR" sz="2400" dirty="0" smtClean="0"/>
+              <a:t>)</a:t>
+            </a:r>
+          </a:p>
+          <a:p>
+            <a:pPr lvl="1"/>
+            <a:r>
+              <a:rPr lang="pt-BR" sz="2400" dirty="0" smtClean="0"/>
+              <a:t>Funcionamento </a:t>
+            </a:r>
+            <a:r>
+              <a:rPr lang="pt-BR" sz="2400" i="1" dirty="0" smtClean="0"/>
+              <a:t>off-line </a:t>
+            </a:r>
+            <a:r>
+              <a:rPr lang="pt-BR" sz="2400" dirty="0" smtClean="0"/>
+              <a:t>(</a:t>
+            </a:r>
+            <a:r>
+              <a:rPr lang="pt-BR" sz="2400" i="1" dirty="0" smtClean="0"/>
+              <a:t>service </a:t>
+            </a:r>
+            <a:r>
+              <a:rPr lang="pt-BR" sz="2400" i="1" dirty="0" err="1" smtClean="0"/>
+              <a:t>workers</a:t>
+            </a:r>
+            <a:r>
+              <a:rPr lang="pt-BR" sz="2400" dirty="0" smtClean="0"/>
+              <a:t>)</a:t>
             </a:r>
             <a:endParaRPr lang="pt-BR" sz="2400" dirty="0" smtClean="0"/>
           </a:p>
           <a:p>
             <a:pPr lvl="1"/>
-            <a:r>
-              <a:rPr lang="pt-BR" sz="2400" dirty="0" smtClean="0"/>
-              <a:t>Dados dinâmicos sendo requisitados na </a:t>
-            </a:r>
-            <a:r>
-              <a:rPr lang="pt-BR" sz="2400" dirty="0" smtClean="0"/>
-              <a:t>rede</a:t>
-            </a:r>
-          </a:p>
-          <a:p>
-            <a:pPr lvl="1"/>
-            <a:r>
-              <a:rPr lang="pt-BR" sz="2400" dirty="0" smtClean="0"/>
-              <a:t>Carregamento rápido e confiável do aplicativo</a:t>
-            </a:r>
-            <a:endParaRPr lang="pt-BR" sz="2400" dirty="0" smtClean="0"/>
-          </a:p>
-          <a:p>
-            <a:pPr lvl="1"/>
-            <a:r>
-              <a:rPr lang="pt-BR" sz="2400" dirty="0" smtClean="0"/>
-              <a:t>Economia no uso de dados</a:t>
-            </a:r>
             <a:endParaRPr lang="pt-BR" dirty="0"/>
           </a:p>
         </p:txBody>
@@ -3778,11 +3871,42 @@
           </a:p>
         </p:txBody>
       </p:sp>
+      <p:pic>
+        <p:nvPicPr>
+          <p:cNvPr id="5" name="Imagem 4" descr="img3.png"/>
+          <p:cNvPicPr>
+            <a:picLocks noChangeAspect="1"/>
+          </p:cNvPicPr>
+          <p:nvPr/>
+        </p:nvPicPr>
+        <p:blipFill>
+          <a:blip r:embed="rId2"/>
+          <a:stretch>
+            <a:fillRect/>
+          </a:stretch>
+        </p:blipFill>
+        <p:spPr>
+          <a:xfrm>
+            <a:off x="144000" y="5216400"/>
+            <a:ext cx="1440000" cy="1440000"/>
+          </a:xfrm>
+          <a:prstGeom prst="rect">
+            <a:avLst/>
+          </a:prstGeom>
+        </p:spPr>
+      </p:pic>
     </p:spTree>
   </p:cSld>
   <p:clrMapOvr>
     <a:masterClrMapping/>
   </p:clrMapOvr>
+  <p:timing>
+    <p:tnLst>
+      <p:par>
+        <p:cTn id="1" dur="indefinite" restart="never" nodeType="tmRoot"/>
+      </p:par>
+    </p:tnLst>
+  </p:timing>
 </p:sld>
 </file>
 
@@ -3851,7 +3975,22 @@
           <a:p>
             <a:r>
               <a:rPr lang="pt-BR" sz="2400" dirty="0" smtClean="0"/>
-              <a:t>Servidor de </a:t>
+              <a:t>Conceito</a:t>
+            </a:r>
+          </a:p>
+          <a:p>
+            <a:pPr lvl="1"/>
+            <a:r>
+              <a:rPr lang="pt-BR" sz="2400" dirty="0" smtClean="0"/>
+              <a:t>Atua como um s</a:t>
+            </a:r>
+            <a:r>
+              <a:rPr lang="pt-BR" sz="2400" dirty="0" smtClean="0"/>
+              <a:t>ervidor </a:t>
+            </a:r>
+            <a:r>
+              <a:rPr lang="pt-BR" sz="2400" dirty="0" smtClean="0"/>
+              <a:t>de </a:t>
             </a:r>
             <a:r>
               <a:rPr lang="pt-BR" sz="2400" i="1" dirty="0" err="1" smtClean="0"/>
@@ -3863,15 +4002,31 @@
             </a:r>
             <a:r>
               <a:rPr lang="pt-BR" sz="2400" dirty="0" smtClean="0"/>
-              <a:t>de rede programável</a:t>
-            </a:r>
+              <a:t>de rede </a:t>
+            </a:r>
+            <a:r>
+              <a:rPr lang="pt-BR" sz="2400" dirty="0" smtClean="0"/>
+              <a:t>programável</a:t>
+            </a:r>
+          </a:p>
+          <a:p>
+            <a:r>
+              <a:rPr lang="pt-BR" sz="2400" dirty="0" smtClean="0"/>
+              <a:t>Funcionalidades</a:t>
+            </a:r>
+            <a:endParaRPr lang="pt-BR" sz="2400" dirty="0" smtClean="0"/>
           </a:p>
           <a:p>
             <a:pPr lvl="1"/>
             <a:r>
               <a:rPr lang="pt-BR" sz="2400" dirty="0" smtClean="0"/>
-              <a:t>Execução em segundo plano</a:t>
-            </a:r>
+              <a:t>Execução em segundo </a:t>
+            </a:r>
+            <a:r>
+              <a:rPr lang="pt-BR" sz="2400" dirty="0" smtClean="0"/>
+              <a:t>plano do aplicativo</a:t>
+            </a:r>
+            <a:endParaRPr lang="pt-BR" sz="2400" dirty="0" smtClean="0"/>
           </a:p>
           <a:p>
             <a:pPr lvl="1"/>
@@ -3889,16 +4044,20 @@
             </a:r>
             <a:r>
               <a:rPr lang="pt-BR" sz="2400" dirty="0" smtClean="0"/>
-              <a:t>dos arquivos estáticos</a:t>
+              <a:t>dos arquivos </a:t>
+            </a:r>
+            <a:r>
+              <a:rPr lang="pt-BR" sz="2400" dirty="0" smtClean="0"/>
+              <a:t>estáticos</a:t>
             </a:r>
           </a:p>
           <a:p>
             <a:pPr lvl="1"/>
             <a:r>
               <a:rPr lang="pt-BR" sz="2400" dirty="0" smtClean="0"/>
-              <a:t>Uso obrigatório de conexões seguras (HTTPS)</a:t>
-            </a:r>
-            <a:endParaRPr lang="pt-BR" dirty="0"/>
+              <a:t>Notificações para reengajamento do usuário</a:t>
+            </a:r>
+            <a:endParaRPr lang="pt-BR" sz="2400" dirty="0" smtClean="0"/>
           </a:p>
         </p:txBody>
       </p:sp>
@@ -3926,11 +4085,42 @@
           </a:p>
         </p:txBody>
       </p:sp>
+      <p:pic>
+        <p:nvPicPr>
+          <p:cNvPr id="5" name="Imagem 4" descr="img4.jpg"/>
+          <p:cNvPicPr>
+            <a:picLocks noChangeAspect="1"/>
+          </p:cNvPicPr>
+          <p:nvPr/>
+        </p:nvPicPr>
+        <p:blipFill>
+          <a:blip r:embed="rId2"/>
+          <a:stretch>
+            <a:fillRect/>
+          </a:stretch>
+        </p:blipFill>
+        <p:spPr>
+          <a:xfrm>
+            <a:off x="144000" y="5216400"/>
+            <a:ext cx="2880000" cy="1440000"/>
+          </a:xfrm>
+          <a:prstGeom prst="rect">
+            <a:avLst/>
+          </a:prstGeom>
+        </p:spPr>
+      </p:pic>
     </p:spTree>
   </p:cSld>
   <p:clrMapOvr>
     <a:masterClrMapping/>
   </p:clrMapOvr>
+  <p:timing>
+    <p:tnLst>
+      <p:par>
+        <p:cTn id="1" dur="indefinite" restart="never" nodeType="tmRoot"/>
+      </p:par>
+    </p:tnLst>
+  </p:timing>
 </p:sld>
 </file>
 
@@ -4026,6 +4216,13 @@
   <p:clrMapOvr>
     <a:masterClrMapping/>
   </p:clrMapOvr>
+  <p:timing>
+    <p:tnLst>
+      <p:par>
+        <p:cTn id="1" dur="indefinite" restart="never" nodeType="tmRoot"/>
+      </p:par>
+    </p:tnLst>
+  </p:timing>
 </p:sld>
 </file>
 
@@ -4062,14 +4259,10 @@
           <a:lstStyle/>
           <a:p>
             <a:r>
-              <a:rPr lang="pt-BR" i="1" dirty="0" smtClean="0"/>
-              <a:t>Web </a:t>
-            </a:r>
-            <a:r>
-              <a:rPr lang="pt-BR" i="1" dirty="0" err="1" smtClean="0"/>
-              <a:t>Manifest</a:t>
-            </a:r>
-            <a:endParaRPr lang="pt-BR" i="1" dirty="0"/>
+              <a:rPr lang="pt-BR" dirty="0" smtClean="0"/>
+              <a:t>Problemas</a:t>
+            </a:r>
+            <a:endParaRPr lang="pt-BR" dirty="0"/>
           </a:p>
         </p:txBody>
       </p:sp>
@@ -4090,42 +4283,38 @@
           <a:p>
             <a:r>
               <a:rPr lang="pt-BR" sz="2400" dirty="0" smtClean="0"/>
-              <a:t>Arquivo JSON</a:t>
-            </a:r>
-          </a:p>
-          <a:p>
-            <a:pPr lvl="1"/>
-            <a:r>
-              <a:rPr lang="pt-BR" sz="2400" dirty="0" smtClean="0"/>
-              <a:t>Atalho na </a:t>
-            </a:r>
-            <a:r>
-              <a:rPr lang="pt-BR" sz="2400" i="1" dirty="0" err="1" smtClean="0"/>
-              <a:t>homescreen</a:t>
+              <a:t>Compatibilidade entre os </a:t>
             </a:r>
             <a:r>
               <a:rPr lang="pt-BR" sz="2400" i="1" dirty="0" smtClean="0"/>
-              <a:t> </a:t>
-            </a:r>
-            <a:r>
-              <a:rPr lang="pt-BR" sz="2400" dirty="0" smtClean="0"/>
-              <a:t>do aparelho</a:t>
-            </a:r>
-          </a:p>
-          <a:p>
-            <a:pPr lvl="1"/>
-            <a:r>
-              <a:rPr lang="pt-BR" sz="2400" dirty="0" smtClean="0"/>
-              <a:t>Definição de temas</a:t>
-            </a:r>
-          </a:p>
-          <a:p>
-            <a:pPr lvl="1"/>
-            <a:r>
-              <a:rPr lang="pt-BR" sz="2400" dirty="0" smtClean="0"/>
-              <a:t>Personalização do tipo de exibição</a:t>
-            </a:r>
-            <a:endParaRPr lang="pt-BR" dirty="0"/>
+              <a:t>browsers</a:t>
+            </a:r>
+            <a:endParaRPr lang="pt-BR" sz="2400" dirty="0" smtClean="0"/>
+          </a:p>
+          <a:p>
+            <a:r>
+              <a:rPr lang="pt-BR" sz="2400" dirty="0" smtClean="0"/>
+              <a:t>Acesso à recursos do aparelho</a:t>
+            </a:r>
+          </a:p>
+          <a:p>
+            <a:r>
+              <a:rPr lang="pt-BR" sz="2400" dirty="0" smtClean="0"/>
+              <a:t>Resistência à </a:t>
+            </a:r>
+            <a:r>
+              <a:rPr lang="pt-BR" sz="2400" dirty="0" smtClean="0"/>
+              <a:t>tecnologia (</a:t>
+            </a:r>
+            <a:r>
+              <a:rPr lang="pt-BR" sz="2400" i="1" dirty="0" smtClean="0"/>
+              <a:t>Apple</a:t>
+            </a:r>
+            <a:r>
+              <a:rPr lang="pt-BR" sz="2400" dirty="0" smtClean="0"/>
+              <a:t>)</a:t>
+            </a:r>
+            <a:endParaRPr lang="pt-BR" sz="2400" dirty="0" smtClean="0"/>
           </a:p>
         </p:txBody>
       </p:sp>
@@ -4153,11 +4342,42 @@
           </a:p>
         </p:txBody>
       </p:sp>
+      <p:pic>
+        <p:nvPicPr>
+          <p:cNvPr id="5" name="Imagem 4" descr="img5.png"/>
+          <p:cNvPicPr>
+            <a:picLocks noChangeAspect="1"/>
+          </p:cNvPicPr>
+          <p:nvPr/>
+        </p:nvPicPr>
+        <p:blipFill>
+          <a:blip r:embed="rId2"/>
+          <a:stretch>
+            <a:fillRect/>
+          </a:stretch>
+        </p:blipFill>
+        <p:spPr>
+          <a:xfrm>
+            <a:off x="144000" y="5216400"/>
+            <a:ext cx="1440000" cy="1440000"/>
+          </a:xfrm>
+          <a:prstGeom prst="rect">
+            <a:avLst/>
+          </a:prstGeom>
+        </p:spPr>
+      </p:pic>
     </p:spTree>
   </p:cSld>
   <p:clrMapOvr>
     <a:masterClrMapping/>
   </p:clrMapOvr>
+  <p:timing>
+    <p:tnLst>
+      <p:par>
+        <p:cTn id="1" dur="indefinite" restart="never" nodeType="tmRoot"/>
+      </p:par>
+    </p:tnLst>
+  </p:timing>
 </p:sld>
 </file>
 
@@ -4185,7 +4405,7 @@
             <a:spLocks noGrp="1"/>
           </p:cNvSpPr>
           <p:nvPr>
-            <p:ph type="title"/>
+            <p:ph type="ctrTitle"/>
           </p:nvPr>
         </p:nvSpPr>
         <p:spPr/>
@@ -4195,7 +4415,7 @@
           <a:p>
             <a:r>
               <a:rPr lang="pt-BR" dirty="0" smtClean="0"/>
-              <a:t>Problemas</a:t>
+              <a:t>III – Conclusão</a:t>
             </a:r>
             <a:endParaRPr lang="pt-BR" dirty="0"/>
           </a:p>
@@ -4203,35 +4423,20 @@
       </p:sp>
       <p:sp>
         <p:nvSpPr>
-          <p:cNvPr id="3" name="Espaço Reservado para Conteúdo 2"/>
-          <p:cNvSpPr>
-            <a:spLocks noGrp="1"/>
-          </p:cNvSpPr>
-          <p:nvPr>
-            <p:ph idx="1"/>
-          </p:nvPr>
-        </p:nvSpPr>
-        <p:spPr/>
-        <p:txBody>
-          <a:bodyPr/>
-          <a:lstStyle/>
-          <a:p>
-            <a:r>
-              <a:rPr lang="pt-BR" sz="2400" dirty="0" smtClean="0"/>
-              <a:t>Compatibilidade</a:t>
-            </a:r>
-          </a:p>
-          <a:p>
-            <a:r>
-              <a:rPr lang="pt-BR" sz="2400" dirty="0" smtClean="0"/>
-              <a:t>Acesso à recursos do aparelho</a:t>
-            </a:r>
-          </a:p>
-          <a:p>
-            <a:r>
-              <a:rPr lang="pt-BR" sz="2400" dirty="0" smtClean="0"/>
-              <a:t>Resistência à tecnologia</a:t>
-            </a:r>
+          <p:cNvPr id="3" name="Subtítulo 2"/>
+          <p:cNvSpPr>
+            <a:spLocks noGrp="1"/>
+          </p:cNvSpPr>
+          <p:nvPr>
+            <p:ph type="subTitle" idx="1"/>
+          </p:nvPr>
+        </p:nvSpPr>
+        <p:spPr/>
+        <p:txBody>
+          <a:bodyPr/>
+          <a:lstStyle/>
+          <a:p>
+            <a:endParaRPr lang="pt-BR" dirty="0"/>
           </a:p>
         </p:txBody>
       </p:sp>
@@ -4259,11 +4464,47 @@
           </a:p>
         </p:txBody>
       </p:sp>
+      <p:pic>
+        <p:nvPicPr>
+          <p:cNvPr id="5" name="Picture" descr="https://lh6.googleusercontent.com/Oeqrb8RwJRCAQ_-7gXnj3kjQ5OLUTKFX14h9rXgIsBwOL5x7HI0UfDUzzEEHfEyS_3bWZIOJm62_Vz_KRgA6vvjHnQLJNza8genuCBgp5s8UeiBO4Lm3uvpprtdmnitseQp8Zso"/>
+          <p:cNvPicPr/>
+          <p:nvPr/>
+        </p:nvPicPr>
+        <p:blipFill>
+          <a:blip r:embed="rId2"/>
+          <a:stretch>
+            <a:fillRect/>
+          </a:stretch>
+        </p:blipFill>
+        <p:spPr bwMode="auto">
+          <a:xfrm>
+            <a:off x="142844" y="5214950"/>
+            <a:ext cx="1583690" cy="1494790"/>
+          </a:xfrm>
+          <a:prstGeom prst="rect">
+            <a:avLst/>
+          </a:prstGeom>
+          <a:noFill/>
+          <a:ln w="9525">
+            <a:noFill/>
+            <a:miter lim="800000"/>
+            <a:headEnd/>
+            <a:tailEnd/>
+          </a:ln>
+        </p:spPr>
+      </p:pic>
     </p:spTree>
   </p:cSld>
   <p:clrMapOvr>
     <a:masterClrMapping/>
   </p:clrMapOvr>
+  <p:timing>
+    <p:tnLst>
+      <p:par>
+        <p:cTn id="1" dur="indefinite" restart="never" nodeType="tmRoot"/>
+      </p:par>
+    </p:tnLst>
+  </p:timing>
 </p:sld>
 </file>
 
@@ -4301,7 +4542,7 @@
           <a:p>
             <a:r>
               <a:rPr lang="pt-BR" dirty="0" smtClean="0"/>
-              <a:t>Metodologia</a:t>
+              <a:t>Escopo da solução</a:t>
             </a:r>
             <a:endParaRPr lang="pt-BR" dirty="0"/>
           </a:p>
@@ -4309,7 +4550,31 @@
       </p:sp>
       <p:sp>
         <p:nvSpPr>
-          <p:cNvPr id="3" name="Espaço Reservado para Conteúdo 2"/>
+          <p:cNvPr id="4" name="Espaço Reservado para Número de Slide 3"/>
+          <p:cNvSpPr>
+            <a:spLocks noGrp="1"/>
+          </p:cNvSpPr>
+          <p:nvPr>
+            <p:ph type="sldNum" sz="quarter" idx="12"/>
+          </p:nvPr>
+        </p:nvSpPr>
+        <p:spPr/>
+        <p:txBody>
+          <a:bodyPr/>
+          <a:lstStyle/>
+          <a:p>
+            <a:fld id="{7606F037-5F0B-48DD-A241-E3C6F3921244}" type="slidenum">
+              <a:rPr lang="pt-BR" smtClean="0"/>
+              <a:pPr/>
+              <a:t>15</a:t>
+            </a:fld>
+            <a:endParaRPr lang="pt-BR"/>
+          </a:p>
+        </p:txBody>
+      </p:sp>
+      <p:sp>
+        <p:nvSpPr>
+          <p:cNvPr id="6" name="Espaço Reservado para Conteúdo 5"/>
           <p:cNvSpPr>
             <a:spLocks noGrp="1"/>
           </p:cNvSpPr>
@@ -4326,7 +4591,7 @@
           <a:p>
             <a:r>
               <a:rPr lang="pt-BR" sz="2400" dirty="0" smtClean="0"/>
-              <a:t>Alguns métodos qualitativos serão utilizados como critério para avaliar o resultado do uso dos </a:t>
+              <a:t>Lista de indicadores para a análise de </a:t>
             </a:r>
             <a:r>
               <a:rPr lang="pt-BR" sz="2400" i="1" dirty="0" smtClean="0"/>
@@ -4334,268 +4599,56 @@
             </a:r>
           </a:p>
           <a:p>
-            <a:pPr lvl="1"/>
-            <a:r>
-              <a:rPr lang="pt-BR" sz="2400" dirty="0" smtClean="0"/>
-              <a:t>Escolha dos cenários propícios para a adoção da tecnologia</a:t>
-            </a:r>
-          </a:p>
-          <a:p>
-            <a:pPr lvl="1"/>
-            <a:r>
-              <a:rPr lang="pt-BR" sz="2400" dirty="0" smtClean="0"/>
-              <a:t>Elenco de critérios para avaliar comparativamente a solução empregada</a:t>
-            </a:r>
-          </a:p>
-          <a:p>
-            <a:pPr lvl="1"/>
-            <a:r>
-              <a:rPr lang="pt-BR" sz="2400" dirty="0" smtClean="0"/>
-              <a:t>Análise sucinta dos resultados</a:t>
-            </a:r>
-          </a:p>
-          <a:p>
-            <a:pPr lvl="1"/>
-            <a:endParaRPr lang="pt-BR" sz="2000" dirty="0"/>
-          </a:p>
-        </p:txBody>
-      </p:sp>
-      <p:sp>
-        <p:nvSpPr>
-          <p:cNvPr id="4" name="Espaço Reservado para Número de Slide 3"/>
-          <p:cNvSpPr>
-            <a:spLocks noGrp="1"/>
-          </p:cNvSpPr>
-          <p:nvPr>
-            <p:ph type="sldNum" sz="quarter" idx="12"/>
-          </p:nvPr>
-        </p:nvSpPr>
-        <p:spPr/>
-        <p:txBody>
-          <a:bodyPr/>
-          <a:lstStyle/>
-          <a:p>
-            <a:fld id="{7606F037-5F0B-48DD-A241-E3C6F3921244}" type="slidenum">
-              <a:rPr lang="pt-BR" smtClean="0"/>
-              <a:pPr/>
-              <a:t>15</a:t>
-            </a:fld>
-            <a:endParaRPr lang="pt-BR"/>
-          </a:p>
-        </p:txBody>
-      </p:sp>
+            <a:r>
+              <a:rPr lang="pt-BR" sz="2400" dirty="0" smtClean="0"/>
+              <a:t>Comparação de um estudo de caso de uma aplicação nativa e PWA</a:t>
+            </a:r>
+          </a:p>
+          <a:p>
+            <a:endParaRPr lang="pt-BR" sz="2400" dirty="0"/>
+          </a:p>
+        </p:txBody>
+      </p:sp>
+      <p:pic>
+        <p:nvPicPr>
+          <p:cNvPr id="7" name="Imagem 6" descr="img7.jpg"/>
+          <p:cNvPicPr>
+            <a:picLocks noChangeAspect="1"/>
+          </p:cNvPicPr>
+          <p:nvPr/>
+        </p:nvPicPr>
+        <p:blipFill>
+          <a:blip r:embed="rId2"/>
+          <a:stretch>
+            <a:fillRect/>
+          </a:stretch>
+        </p:blipFill>
+        <p:spPr>
+          <a:xfrm>
+            <a:off x="144000" y="5216400"/>
+            <a:ext cx="2155689" cy="1440000"/>
+          </a:xfrm>
+          <a:prstGeom prst="rect">
+            <a:avLst/>
+          </a:prstGeom>
+        </p:spPr>
+      </p:pic>
     </p:spTree>
   </p:cSld>
   <p:clrMapOvr>
     <a:masterClrMapping/>
   </p:clrMapOvr>
+  <p:timing>
+    <p:tnLst>
+      <p:par>
+        <p:cTn id="1" dur="indefinite" restart="never" nodeType="tmRoot"/>
+      </p:par>
+    </p:tnLst>
+  </p:timing>
 </p:sld>
 </file>
 
 <file path=ppt/slides/slide16.xml><?xml version="1.0" encoding="utf-8"?>
-<p:sld xmlns:a="http://schemas.openxmlformats.org/drawingml/2006/main" xmlns:r="http://schemas.openxmlformats.org/officeDocument/2006/relationships" xmlns:p="http://schemas.openxmlformats.org/presentationml/2006/main">
-  <p:cSld>
-    <p:spTree>
-      <p:nvGrpSpPr>
-        <p:cNvPr id="1" name=""/>
-        <p:cNvGrpSpPr/>
-        <p:nvPr/>
-      </p:nvGrpSpPr>
-      <p:grpSpPr>
-        <a:xfrm>
-          <a:off x="0" y="0"/>
-          <a:ext cx="0" cy="0"/>
-          <a:chOff x="0" y="0"/>
-          <a:chExt cx="0" cy="0"/>
-        </a:xfrm>
-      </p:grpSpPr>
-      <p:sp>
-        <p:nvSpPr>
-          <p:cNvPr id="2" name="Título 1"/>
-          <p:cNvSpPr>
-            <a:spLocks noGrp="1"/>
-          </p:cNvSpPr>
-          <p:nvPr>
-            <p:ph type="title"/>
-          </p:nvPr>
-        </p:nvSpPr>
-        <p:spPr/>
-        <p:txBody>
-          <a:bodyPr/>
-          <a:lstStyle/>
-          <a:p>
-            <a:r>
-              <a:rPr lang="pt-BR" dirty="0" smtClean="0"/>
-              <a:t>Metodologia</a:t>
-            </a:r>
-            <a:endParaRPr lang="pt-BR" dirty="0"/>
-          </a:p>
-        </p:txBody>
-      </p:sp>
-      <p:sp>
-        <p:nvSpPr>
-          <p:cNvPr id="3" name="Espaço Reservado para Conteúdo 2"/>
-          <p:cNvSpPr>
-            <a:spLocks noGrp="1"/>
-          </p:cNvSpPr>
-          <p:nvPr>
-            <p:ph idx="1"/>
-          </p:nvPr>
-        </p:nvSpPr>
-        <p:spPr/>
-        <p:txBody>
-          <a:bodyPr>
-            <a:normAutofit/>
-          </a:bodyPr>
-          <a:lstStyle/>
-          <a:p>
-            <a:endParaRPr lang="pt-BR" sz="2400" dirty="0" smtClean="0"/>
-          </a:p>
-          <a:p>
-            <a:r>
-              <a:rPr lang="pt-BR" sz="2400" dirty="0" smtClean="0"/>
-              <a:t>Embasamento teórico</a:t>
-            </a:r>
-          </a:p>
-          <a:p>
-            <a:r>
-              <a:rPr lang="pt-BR" sz="2400" dirty="0" smtClean="0"/>
-              <a:t>Estudo comparativo da abordagem</a:t>
-            </a:r>
-          </a:p>
-          <a:p>
-            <a:r>
-              <a:rPr lang="pt-BR" sz="2400" dirty="0" smtClean="0"/>
-              <a:t>Posicionamento conclusivo</a:t>
-            </a:r>
-            <a:endParaRPr lang="pt-BR" sz="2000" dirty="0"/>
-          </a:p>
-        </p:txBody>
-      </p:sp>
-      <p:sp>
-        <p:nvSpPr>
-          <p:cNvPr id="4" name="Espaço Reservado para Número de Slide 3"/>
-          <p:cNvSpPr>
-            <a:spLocks noGrp="1"/>
-          </p:cNvSpPr>
-          <p:nvPr>
-            <p:ph type="sldNum" sz="quarter" idx="12"/>
-          </p:nvPr>
-        </p:nvSpPr>
-        <p:spPr/>
-        <p:txBody>
-          <a:bodyPr/>
-          <a:lstStyle/>
-          <a:p>
-            <a:fld id="{7606F037-5F0B-48DD-A241-E3C6F3921244}" type="slidenum">
-              <a:rPr lang="pt-BR" smtClean="0"/>
-              <a:pPr/>
-              <a:t>16</a:t>
-            </a:fld>
-            <a:endParaRPr lang="pt-BR"/>
-          </a:p>
-        </p:txBody>
-      </p:sp>
-    </p:spTree>
-  </p:cSld>
-  <p:clrMapOvr>
-    <a:masterClrMapping/>
-  </p:clrMapOvr>
-</p:sld>
-</file>
-
-<file path=ppt/slides/slide17.xml><?xml version="1.0" encoding="utf-8"?>
-<p:sld xmlns:a="http://schemas.openxmlformats.org/drawingml/2006/main" xmlns:r="http://schemas.openxmlformats.org/officeDocument/2006/relationships" xmlns:p="http://schemas.openxmlformats.org/presentationml/2006/main">
-  <p:cSld>
-    <p:spTree>
-      <p:nvGrpSpPr>
-        <p:cNvPr id="1" name=""/>
-        <p:cNvGrpSpPr/>
-        <p:nvPr/>
-      </p:nvGrpSpPr>
-      <p:grpSpPr>
-        <a:xfrm>
-          <a:off x="0" y="0"/>
-          <a:ext cx="0" cy="0"/>
-          <a:chOff x="0" y="0"/>
-          <a:chExt cx="0" cy="0"/>
-        </a:xfrm>
-      </p:grpSpPr>
-      <p:sp>
-        <p:nvSpPr>
-          <p:cNvPr id="2" name="Título 1"/>
-          <p:cNvSpPr>
-            <a:spLocks noGrp="1"/>
-          </p:cNvSpPr>
-          <p:nvPr>
-            <p:ph type="ctrTitle"/>
-          </p:nvPr>
-        </p:nvSpPr>
-        <p:spPr/>
-        <p:txBody>
-          <a:bodyPr/>
-          <a:lstStyle/>
-          <a:p>
-            <a:r>
-              <a:rPr lang="pt-BR" dirty="0" smtClean="0"/>
-              <a:t>III – Conclusão</a:t>
-            </a:r>
-            <a:endParaRPr lang="pt-BR" dirty="0"/>
-          </a:p>
-        </p:txBody>
-      </p:sp>
-      <p:sp>
-        <p:nvSpPr>
-          <p:cNvPr id="3" name="Subtítulo 2"/>
-          <p:cNvSpPr>
-            <a:spLocks noGrp="1"/>
-          </p:cNvSpPr>
-          <p:nvPr>
-            <p:ph type="subTitle" idx="1"/>
-          </p:nvPr>
-        </p:nvSpPr>
-        <p:spPr/>
-        <p:txBody>
-          <a:bodyPr/>
-          <a:lstStyle/>
-          <a:p>
-            <a:endParaRPr lang="pt-BR" dirty="0"/>
-          </a:p>
-        </p:txBody>
-      </p:sp>
-      <p:sp>
-        <p:nvSpPr>
-          <p:cNvPr id="4" name="Espaço Reservado para Número de Slide 3"/>
-          <p:cNvSpPr>
-            <a:spLocks noGrp="1"/>
-          </p:cNvSpPr>
-          <p:nvPr>
-            <p:ph type="sldNum" sz="quarter" idx="12"/>
-          </p:nvPr>
-        </p:nvSpPr>
-        <p:spPr/>
-        <p:txBody>
-          <a:bodyPr/>
-          <a:lstStyle/>
-          <a:p>
-            <a:fld id="{7606F037-5F0B-48DD-A241-E3C6F3921244}" type="slidenum">
-              <a:rPr lang="pt-BR" smtClean="0"/>
-              <a:pPr/>
-              <a:t>17</a:t>
-            </a:fld>
-            <a:endParaRPr lang="pt-BR"/>
-          </a:p>
-        </p:txBody>
-      </p:sp>
-    </p:spTree>
-  </p:cSld>
-  <p:clrMapOvr>
-    <a:masterClrMapping/>
-  </p:clrMapOvr>
-</p:sld>
-</file>
-
-<file path=ppt/slides/slide18.xml><?xml version="1.0" encoding="utf-8"?>
 <p:sld xmlns:a="http://schemas.openxmlformats.org/drawingml/2006/main" xmlns:r="http://schemas.openxmlformats.org/officeDocument/2006/relationships" xmlns:p="http://schemas.openxmlformats.org/presentationml/2006/main">
   <p:cSld>
     <p:spTree>
@@ -4955,7 +5008,7 @@
             <a:fld id="{7606F037-5F0B-48DD-A241-E3C6F3921244}" type="slidenum">
               <a:rPr lang="pt-BR" smtClean="0"/>
               <a:pPr/>
-              <a:t>18</a:t>
+              <a:t>16</a:t>
             </a:fld>
             <a:endParaRPr lang="pt-BR"/>
           </a:p>
@@ -4966,10 +5019,17 @@
   <p:clrMapOvr>
     <a:masterClrMapping/>
   </p:clrMapOvr>
+  <p:timing>
+    <p:tnLst>
+      <p:par>
+        <p:cTn id="1" dur="indefinite" restart="never" nodeType="tmRoot"/>
+      </p:par>
+    </p:tnLst>
+  </p:timing>
 </p:sld>
 </file>
 
-<file path=ppt/slides/slide19.xml><?xml version="1.0" encoding="utf-8"?>
+<file path=ppt/slides/slide17.xml><?xml version="1.0" encoding="utf-8"?>
 <p:sld xmlns:a="http://schemas.openxmlformats.org/drawingml/2006/main" xmlns:r="http://schemas.openxmlformats.org/officeDocument/2006/relationships" xmlns:p="http://schemas.openxmlformats.org/presentationml/2006/main">
   <p:cSld>
     <p:spTree>
@@ -5028,9 +5088,58 @@
           <a:p>
             <a:r>
               <a:rPr lang="pt-BR" sz="2400" dirty="0" smtClean="0"/>
-              <a:t>https://developers.google.com/web/fundamentals/</a:t>
-            </a:r>
-            <a:endParaRPr lang="pt-BR" sz="2400" dirty="0"/>
+              <a:t>https://developers.google.com/web/fundamentals</a:t>
+            </a:r>
+            <a:r>
+              <a:rPr lang="pt-BR" sz="2400" dirty="0" smtClean="0"/>
+              <a:t>/</a:t>
+            </a:r>
+          </a:p>
+          <a:p>
+            <a:endParaRPr lang="pt-BR" sz="2400" dirty="0" smtClean="0"/>
+          </a:p>
+          <a:p>
+            <a:r>
+              <a:rPr lang="pt-BR" sz="2400" dirty="0" smtClean="0"/>
+              <a:t>https://</a:t>
+            </a:r>
+            <a:r>
+              <a:rPr lang="pt-BR" sz="2400" dirty="0" smtClean="0"/>
+              <a:t>developer.mozilla.org/en-US/Apps/Progressive</a:t>
+            </a:r>
+          </a:p>
+          <a:p>
+            <a:endParaRPr lang="pt-BR" sz="2400" dirty="0" smtClean="0"/>
+          </a:p>
+          <a:p>
+            <a:r>
+              <a:rPr lang="pt-BR" sz="2400" dirty="0" smtClean="0"/>
+              <a:t>https://developers.google.com/web/showcase/</a:t>
+            </a:r>
+            <a:endParaRPr lang="pt-BR" sz="2400" dirty="0" smtClean="0"/>
+          </a:p>
+          <a:p>
+            <a:endParaRPr lang="pt-BR" sz="2400" dirty="0" smtClean="0"/>
+          </a:p>
+          <a:p>
+            <a:r>
+              <a:rPr lang="pt-BR" sz="2400" dirty="0" smtClean="0"/>
+              <a:t>https</a:t>
+            </a:r>
+            <a:r>
+              <a:rPr lang="pt-BR" sz="2400" dirty="0" smtClean="0"/>
+              <a:t>://pwa.rocks</a:t>
+            </a:r>
+            <a:r>
+              <a:rPr lang="pt-BR" sz="2400" dirty="0" smtClean="0"/>
+              <a:t>/</a:t>
+            </a:r>
+          </a:p>
+          <a:p>
+            <a:endParaRPr lang="pt-BR" sz="2400" dirty="0" smtClean="0"/>
+          </a:p>
+          <a:p>
+            <a:endParaRPr lang="pt-BR" sz="2400" dirty="0" smtClean="0"/>
           </a:p>
         </p:txBody>
       </p:sp>
@@ -5052,7 +5161,7 @@
             <a:fld id="{7606F037-5F0B-48DD-A241-E3C6F3921244}" type="slidenum">
               <a:rPr lang="pt-BR" smtClean="0"/>
               <a:pPr/>
-              <a:t>19</a:t>
+              <a:t>17</a:t>
             </a:fld>
             <a:endParaRPr lang="pt-BR"/>
           </a:p>
@@ -5063,6 +5172,111 @@
   <p:clrMapOvr>
     <a:masterClrMapping/>
   </p:clrMapOvr>
+  <p:timing>
+    <p:tnLst>
+      <p:par>
+        <p:cTn id="1" dur="indefinite" restart="never" nodeType="tmRoot"/>
+      </p:par>
+    </p:tnLst>
+  </p:timing>
+</p:sld>
+</file>
+
+<file path=ppt/slides/slide18.xml><?xml version="1.0" encoding="utf-8"?>
+<p:sld xmlns:a="http://schemas.openxmlformats.org/drawingml/2006/main" xmlns:r="http://schemas.openxmlformats.org/officeDocument/2006/relationships" xmlns:p="http://schemas.openxmlformats.org/presentationml/2006/main">
+  <p:cSld>
+    <p:spTree>
+      <p:nvGrpSpPr>
+        <p:cNvPr id="1" name=""/>
+        <p:cNvGrpSpPr/>
+        <p:nvPr/>
+      </p:nvGrpSpPr>
+      <p:grpSpPr>
+        <a:xfrm>
+          <a:off x="0" y="0"/>
+          <a:ext cx="0" cy="0"/>
+          <a:chOff x="0" y="0"/>
+          <a:chExt cx="0" cy="0"/>
+        </a:xfrm>
+      </p:grpSpPr>
+      <p:sp>
+        <p:nvSpPr>
+          <p:cNvPr id="2" name="Título 1"/>
+          <p:cNvSpPr>
+            <a:spLocks noGrp="1"/>
+          </p:cNvSpPr>
+          <p:nvPr>
+            <p:ph type="ctrTitle"/>
+          </p:nvPr>
+        </p:nvSpPr>
+        <p:spPr/>
+        <p:txBody>
+          <a:bodyPr/>
+          <a:lstStyle/>
+          <a:p>
+            <a:r>
+              <a:rPr lang="pt-BR" dirty="0" smtClean="0"/>
+              <a:t>Obrigado pela atenção.</a:t>
+            </a:r>
+            <a:endParaRPr lang="pt-BR" dirty="0"/>
+          </a:p>
+        </p:txBody>
+      </p:sp>
+      <p:sp>
+        <p:nvSpPr>
+          <p:cNvPr id="3" name="Subtítulo 2"/>
+          <p:cNvSpPr>
+            <a:spLocks noGrp="1"/>
+          </p:cNvSpPr>
+          <p:nvPr>
+            <p:ph type="subTitle" idx="1"/>
+          </p:nvPr>
+        </p:nvSpPr>
+        <p:spPr/>
+        <p:txBody>
+          <a:bodyPr/>
+          <a:lstStyle/>
+          <a:p>
+            <a:endParaRPr lang="pt-BR"/>
+          </a:p>
+        </p:txBody>
+      </p:sp>
+      <p:sp>
+        <p:nvSpPr>
+          <p:cNvPr id="4" name="Espaço Reservado para Número de Slide 3"/>
+          <p:cNvSpPr>
+            <a:spLocks noGrp="1"/>
+          </p:cNvSpPr>
+          <p:nvPr>
+            <p:ph type="sldNum" sz="quarter" idx="12"/>
+          </p:nvPr>
+        </p:nvSpPr>
+        <p:spPr/>
+        <p:txBody>
+          <a:bodyPr/>
+          <a:lstStyle/>
+          <a:p>
+            <a:fld id="{7606F037-5F0B-48DD-A241-E3C6F3921244}" type="slidenum">
+              <a:rPr lang="pt-BR" smtClean="0"/>
+              <a:pPr/>
+              <a:t>18</a:t>
+            </a:fld>
+            <a:endParaRPr lang="pt-BR"/>
+          </a:p>
+        </p:txBody>
+      </p:sp>
+    </p:spTree>
+  </p:cSld>
+  <p:clrMapOvr>
+    <a:masterClrMapping/>
+  </p:clrMapOvr>
+  <p:timing>
+    <p:tnLst>
+      <p:par>
+        <p:cTn id="1" dur="indefinite" restart="never" nodeType="tmRoot"/>
+      </p:par>
+    </p:tnLst>
+  </p:timing>
 </p:sld>
 </file>
 
@@ -5119,7 +5333,7 @@
         <p:spPr/>
         <p:txBody>
           <a:bodyPr>
-            <a:normAutofit/>
+            <a:normAutofit lnSpcReduction="10000"/>
           </a:bodyPr>
           <a:lstStyle/>
           <a:p>
@@ -5143,6 +5357,14 @@
             </a:r>
           </a:p>
           <a:p>
+            <a:pPr lvl="1"/>
+            <a:r>
+              <a:rPr lang="pt-BR" sz="2400" dirty="0" smtClean="0"/>
+              <a:t>Metodologia</a:t>
+            </a:r>
+            <a:endParaRPr lang="pt-BR" sz="2400" dirty="0" smtClean="0"/>
+          </a:p>
+          <a:p>
             <a:r>
               <a:rPr lang="pt-BR" sz="2400" dirty="0" smtClean="0"/>
               <a:t>Referencial Teórico</a:t>
@@ -5163,16 +5385,16 @@
             </a:r>
           </a:p>
           <a:p>
+            <a:r>
+              <a:rPr lang="pt-BR" sz="2400" dirty="0" smtClean="0"/>
+              <a:t>Conclusão</a:t>
+            </a:r>
+          </a:p>
+          <a:p>
             <a:pPr lvl="1"/>
             <a:r>
               <a:rPr lang="pt-BR" sz="2400" dirty="0" smtClean="0"/>
-              <a:t>Metodologia</a:t>
-            </a:r>
-          </a:p>
-          <a:p>
-            <a:r>
-              <a:rPr lang="pt-BR" sz="2400" dirty="0" smtClean="0"/>
-              <a:t>Conclusão</a:t>
+              <a:t>Escopo da solução</a:t>
             </a:r>
           </a:p>
           <a:p>
@@ -5181,6 +5403,7 @@
               <a:rPr lang="pt-BR" sz="2400" dirty="0" smtClean="0"/>
               <a:t>Cronograma</a:t>
             </a:r>
+            <a:endParaRPr lang="pt-BR" sz="2400" dirty="0" smtClean="0"/>
           </a:p>
           <a:p>
             <a:pPr lvl="1"/>
@@ -5221,97 +5444,13 @@
   <p:clrMapOvr>
     <a:masterClrMapping/>
   </p:clrMapOvr>
-</p:sld>
-</file>
-
-<file path=ppt/slides/slide20.xml><?xml version="1.0" encoding="utf-8"?>
-<p:sld xmlns:a="http://schemas.openxmlformats.org/drawingml/2006/main" xmlns:r="http://schemas.openxmlformats.org/officeDocument/2006/relationships" xmlns:p="http://schemas.openxmlformats.org/presentationml/2006/main">
-  <p:cSld>
-    <p:spTree>
-      <p:nvGrpSpPr>
-        <p:cNvPr id="1" name=""/>
-        <p:cNvGrpSpPr/>
-        <p:nvPr/>
-      </p:nvGrpSpPr>
-      <p:grpSpPr>
-        <a:xfrm>
-          <a:off x="0" y="0"/>
-          <a:ext cx="0" cy="0"/>
-          <a:chOff x="0" y="0"/>
-          <a:chExt cx="0" cy="0"/>
-        </a:xfrm>
-      </p:grpSpPr>
-      <p:sp>
-        <p:nvSpPr>
-          <p:cNvPr id="2" name="Título 1"/>
-          <p:cNvSpPr>
-            <a:spLocks noGrp="1"/>
-          </p:cNvSpPr>
-          <p:nvPr>
-            <p:ph type="ctrTitle"/>
-          </p:nvPr>
-        </p:nvSpPr>
-        <p:spPr/>
-        <p:txBody>
-          <a:bodyPr/>
-          <a:lstStyle/>
-          <a:p>
-            <a:r>
-              <a:rPr lang="pt-BR" dirty="0" smtClean="0"/>
-              <a:t>Obrigado pela atenção.</a:t>
-            </a:r>
-            <a:endParaRPr lang="pt-BR" dirty="0"/>
-          </a:p>
-        </p:txBody>
-      </p:sp>
-      <p:sp>
-        <p:nvSpPr>
-          <p:cNvPr id="3" name="Subtítulo 2"/>
-          <p:cNvSpPr>
-            <a:spLocks noGrp="1"/>
-          </p:cNvSpPr>
-          <p:nvPr>
-            <p:ph type="subTitle" idx="1"/>
-          </p:nvPr>
-        </p:nvSpPr>
-        <p:spPr/>
-        <p:txBody>
-          <a:bodyPr/>
-          <a:lstStyle/>
-          <a:p>
-            <a:endParaRPr lang="pt-BR"/>
-          </a:p>
-        </p:txBody>
-      </p:sp>
-      <p:sp>
-        <p:nvSpPr>
-          <p:cNvPr id="4" name="Espaço Reservado para Número de Slide 3"/>
-          <p:cNvSpPr>
-            <a:spLocks noGrp="1"/>
-          </p:cNvSpPr>
-          <p:nvPr>
-            <p:ph type="sldNum" sz="quarter" idx="12"/>
-          </p:nvPr>
-        </p:nvSpPr>
-        <p:spPr/>
-        <p:txBody>
-          <a:bodyPr/>
-          <a:lstStyle/>
-          <a:p>
-            <a:fld id="{7606F037-5F0B-48DD-A241-E3C6F3921244}" type="slidenum">
-              <a:rPr lang="pt-BR" smtClean="0"/>
-              <a:pPr/>
-              <a:t>20</a:t>
-            </a:fld>
-            <a:endParaRPr lang="pt-BR"/>
-          </a:p>
-        </p:txBody>
-      </p:sp>
-    </p:spTree>
-  </p:cSld>
-  <p:clrMapOvr>
-    <a:masterClrMapping/>
-  </p:clrMapOvr>
+  <p:timing>
+    <p:tnLst>
+      <p:par>
+        <p:cTn id="1" dur="indefinite" restart="never" nodeType="tmRoot"/>
+      </p:par>
+    </p:tnLst>
+  </p:timing>
 </p:sld>
 </file>
 
@@ -5370,7 +5509,7 @@
           <a:bodyPr/>
           <a:lstStyle/>
           <a:p>
-            <a:endParaRPr lang="pt-BR"/>
+            <a:endParaRPr lang="pt-BR" dirty="0"/>
           </a:p>
         </p:txBody>
       </p:sp>
@@ -5398,11 +5537,47 @@
           </a:p>
         </p:txBody>
       </p:sp>
+      <p:pic>
+        <p:nvPicPr>
+          <p:cNvPr id="5" name="Picture" descr="https://lh6.googleusercontent.com/Oeqrb8RwJRCAQ_-7gXnj3kjQ5OLUTKFX14h9rXgIsBwOL5x7HI0UfDUzzEEHfEyS_3bWZIOJm62_Vz_KRgA6vvjHnQLJNza8genuCBgp5s8UeiBO4Lm3uvpprtdmnitseQp8Zso"/>
+          <p:cNvPicPr/>
+          <p:nvPr/>
+        </p:nvPicPr>
+        <p:blipFill>
+          <a:blip r:embed="rId2"/>
+          <a:stretch>
+            <a:fillRect/>
+          </a:stretch>
+        </p:blipFill>
+        <p:spPr bwMode="auto">
+          <a:xfrm>
+            <a:off x="142844" y="5220000"/>
+            <a:ext cx="1583690" cy="1494790"/>
+          </a:xfrm>
+          <a:prstGeom prst="rect">
+            <a:avLst/>
+          </a:prstGeom>
+          <a:noFill/>
+          <a:ln w="9525">
+            <a:noFill/>
+            <a:miter lim="800000"/>
+            <a:headEnd/>
+            <a:tailEnd/>
+          </a:ln>
+        </p:spPr>
+      </p:pic>
     </p:spTree>
   </p:cSld>
   <p:clrMapOvr>
     <a:masterClrMapping/>
   </p:clrMapOvr>
+  <p:timing>
+    <p:tnLst>
+      <p:par>
+        <p:cTn id="1" dur="indefinite" restart="never" nodeType="tmRoot"/>
+      </p:par>
+    </p:tnLst>
+  </p:timing>
 </p:sld>
 </file>
 
@@ -5430,7 +5605,7 @@
             <a:spLocks noGrp="1"/>
           </p:cNvSpPr>
           <p:nvPr>
-            <p:ph type="ctrTitle"/>
+            <p:ph type="title"/>
           </p:nvPr>
         </p:nvSpPr>
         <p:spPr/>
@@ -5440,31 +5615,35 @@
           <a:p>
             <a:r>
               <a:rPr lang="pt-BR" dirty="0" smtClean="0"/>
-              <a:t>Nativo x Web</a:t>
+              <a:t>Contextualização</a:t>
             </a:r>
             <a:endParaRPr lang="pt-BR" dirty="0"/>
           </a:p>
         </p:txBody>
       </p:sp>
-      <p:sp>
-        <p:nvSpPr>
-          <p:cNvPr id="3" name="Subtítulo 2"/>
-          <p:cNvSpPr>
-            <a:spLocks noGrp="1"/>
-          </p:cNvSpPr>
-          <p:nvPr>
-            <p:ph type="subTitle" idx="1"/>
-          </p:nvPr>
-        </p:nvSpPr>
-        <p:spPr/>
-        <p:txBody>
-          <a:bodyPr/>
-          <a:lstStyle/>
-          <a:p>
-            <a:endParaRPr lang="pt-BR"/>
-          </a:p>
-        </p:txBody>
-      </p:sp>
+      <p:pic>
+        <p:nvPicPr>
+          <p:cNvPr id="7" name="Espaço Reservado para Conteúdo 6" descr="img1.jpg"/>
+          <p:cNvPicPr>
+            <a:picLocks noGrp="1" noChangeAspect="1"/>
+          </p:cNvPicPr>
+          <p:nvPr>
+            <p:ph idx="1"/>
+          </p:nvPr>
+        </p:nvPicPr>
+        <p:blipFill>
+          <a:blip r:embed="rId2"/>
+          <a:stretch>
+            <a:fillRect/>
+          </a:stretch>
+        </p:blipFill>
+        <p:spPr>
+          <a:xfrm>
+            <a:off x="1238250" y="1958181"/>
+            <a:ext cx="6667500" cy="3810000"/>
+          </a:xfrm>
+        </p:spPr>
+      </p:pic>
       <p:sp>
         <p:nvSpPr>
           <p:cNvPr id="4" name="Espaço Reservado para Número de Slide 3"/>
@@ -5494,6 +5673,13 @@
   <p:clrMapOvr>
     <a:masterClrMapping/>
   </p:clrMapOvr>
+  <p:timing>
+    <p:tnLst>
+      <p:par>
+        <p:cTn id="1" dur="indefinite" restart="never" nodeType="tmRoot"/>
+      </p:par>
+    </p:tnLst>
+  </p:timing>
 </p:sld>
 </file>
 
@@ -5563,11 +5749,7 @@
             <a:pPr lvl="1"/>
             <a:r>
               <a:rPr lang="pt-BR" sz="2400" dirty="0" smtClean="0"/>
-              <a:t>Bom </a:t>
-            </a:r>
-            <a:r>
-              <a:rPr lang="pt-BR" sz="2400" dirty="0" smtClean="0"/>
-              <a:t>desempenho</a:t>
+              <a:t>Bom desempenho</a:t>
             </a:r>
           </a:p>
           <a:p>
@@ -5576,7 +5758,6 @@
               <a:rPr lang="pt-BR" sz="2400" dirty="0" smtClean="0"/>
               <a:t>Acesso à recursos do aparelho</a:t>
             </a:r>
-            <a:endParaRPr lang="pt-BR" sz="2400" dirty="0" smtClean="0"/>
           </a:p>
           <a:p>
             <a:pPr lvl="1"/>
@@ -5605,16 +5786,13 @@
               <a:rPr lang="pt-BR" sz="2400" dirty="0" smtClean="0"/>
               <a:t>burocratizado</a:t>
             </a:r>
+            <a:endParaRPr lang="pt-BR" sz="2400" dirty="0" smtClean="0"/>
           </a:p>
           <a:p>
             <a:pPr lvl="1"/>
             <a:r>
               <a:rPr lang="pt-BR" sz="2400" dirty="0" smtClean="0"/>
-              <a:t>Alto </a:t>
-            </a:r>
-            <a:r>
-              <a:rPr lang="pt-BR" sz="2400" dirty="0" smtClean="0"/>
-              <a:t>custo no desenvolvimento</a:t>
+              <a:t>Demanda um maior custo no desenvolvimento (contratação e treinamento)</a:t>
             </a:r>
             <a:endParaRPr lang="pt-BR" sz="2400" dirty="0"/>
           </a:p>
@@ -5644,11 +5822,42 @@
           </a:p>
         </p:txBody>
       </p:sp>
+      <p:pic>
+        <p:nvPicPr>
+          <p:cNvPr id="5" name="Imagem 4" descr="img8.jpg"/>
+          <p:cNvPicPr>
+            <a:picLocks noChangeAspect="1"/>
+          </p:cNvPicPr>
+          <p:nvPr/>
+        </p:nvPicPr>
+        <p:blipFill>
+          <a:blip r:embed="rId2" cstate="print"/>
+          <a:stretch>
+            <a:fillRect/>
+          </a:stretch>
+        </p:blipFill>
+        <p:spPr>
+          <a:xfrm>
+            <a:off x="144000" y="5216400"/>
+            <a:ext cx="2143437" cy="1440000"/>
+          </a:xfrm>
+          <a:prstGeom prst="rect">
+            <a:avLst/>
+          </a:prstGeom>
+        </p:spPr>
+      </p:pic>
     </p:spTree>
   </p:cSld>
   <p:clrMapOvr>
     <a:masterClrMapping/>
   </p:clrMapOvr>
+  <p:timing>
+    <p:tnLst>
+      <p:par>
+        <p:cTn id="1" dur="indefinite" restart="never" nodeType="tmRoot"/>
+      </p:par>
+    </p:tnLst>
+  </p:timing>
 </p:sld>
 </file>
 
@@ -5722,15 +5931,33 @@
             <a:pPr lvl="1"/>
             <a:r>
               <a:rPr lang="pt-BR" sz="2400" dirty="0" smtClean="0"/>
-              <a:t>Podem ser utilizados sem instalação</a:t>
-            </a:r>
+              <a:t>Podem ser utilizados sem </a:t>
+            </a:r>
+            <a:r>
+              <a:rPr lang="pt-BR" sz="2400" dirty="0" smtClean="0"/>
+              <a:t>prévia instalação</a:t>
+            </a:r>
+            <a:endParaRPr lang="pt-BR" sz="2400" dirty="0" smtClean="0"/>
           </a:p>
           <a:p>
             <a:pPr lvl="1"/>
             <a:r>
               <a:rPr lang="pt-BR" sz="2400" dirty="0" smtClean="0"/>
-              <a:t>Menor custo de desenvolvimento</a:t>
-            </a:r>
+              <a:t>Menor custo </a:t>
+            </a:r>
+            <a:r>
+              <a:rPr lang="pt-BR" sz="2400" dirty="0" smtClean="0"/>
+              <a:t>no desenvolvimento (</a:t>
+            </a:r>
+            <a:r>
+              <a:rPr lang="pt-BR" sz="2400" dirty="0" err="1" smtClean="0"/>
+              <a:t>multiplataforma</a:t>
+            </a:r>
+            <a:r>
+              <a:rPr lang="pt-BR" sz="2400" dirty="0" smtClean="0"/>
+              <a:t>)</a:t>
+            </a:r>
+            <a:endParaRPr lang="pt-BR" sz="2400" dirty="0" smtClean="0"/>
           </a:p>
           <a:p>
             <a:r>
@@ -5786,11 +6013,42 @@
           </a:p>
         </p:txBody>
       </p:sp>
+      <p:pic>
+        <p:nvPicPr>
+          <p:cNvPr id="5" name="Imagem 4" descr="img2.png"/>
+          <p:cNvPicPr>
+            <a:picLocks noChangeAspect="1"/>
+          </p:cNvPicPr>
+          <p:nvPr/>
+        </p:nvPicPr>
+        <p:blipFill>
+          <a:blip r:embed="rId2"/>
+          <a:stretch>
+            <a:fillRect/>
+          </a:stretch>
+        </p:blipFill>
+        <p:spPr>
+          <a:xfrm>
+            <a:off x="144000" y="5216400"/>
+            <a:ext cx="1440000" cy="1440000"/>
+          </a:xfrm>
+          <a:prstGeom prst="rect">
+            <a:avLst/>
+          </a:prstGeom>
+        </p:spPr>
+      </p:pic>
     </p:spTree>
   </p:cSld>
   <p:clrMapOvr>
     <a:masterClrMapping/>
   </p:clrMapOvr>
+  <p:timing>
+    <p:tnLst>
+      <p:par>
+        <p:cTn id="1" dur="indefinite" restart="never" nodeType="tmRoot"/>
+      </p:par>
+    </p:tnLst>
+  </p:timing>
 </p:sld>
 </file>
 
@@ -5861,8 +6119,13 @@
             </a:r>
             <a:r>
               <a:rPr lang="pt-BR" sz="2400" i="1" dirty="0" smtClean="0"/>
-              <a:t>app</a:t>
-            </a:r>
+              <a:t>app </a:t>
+            </a:r>
+            <a:r>
+              <a:rPr lang="pt-BR" sz="2400" dirty="0" smtClean="0"/>
+              <a:t>(PWA)</a:t>
+            </a:r>
+            <a:endParaRPr lang="pt-BR" sz="2400" dirty="0" smtClean="0"/>
           </a:p>
           <a:p>
             <a:pPr lvl="0"/>
@@ -5876,26 +6139,18 @@
             </a:r>
             <a:r>
               <a:rPr lang="pt-BR" sz="2400" dirty="0" smtClean="0"/>
-              <a:t> em relação à aplicações </a:t>
-            </a:r>
-            <a:r>
-              <a:rPr lang="pt-BR" sz="2400" dirty="0" smtClean="0"/>
-              <a:t>nativas</a:t>
+              <a:t> em </a:t>
+            </a:r>
+            <a:r>
+              <a:rPr lang="pt-BR" sz="2400" dirty="0" smtClean="0"/>
+              <a:t>relação à aplicações nativas</a:t>
             </a:r>
             <a:endParaRPr lang="pt-BR" sz="2400" i="1" dirty="0" smtClean="0"/>
           </a:p>
           <a:p>
             <a:r>
               <a:rPr lang="pt-BR" sz="2400" dirty="0" smtClean="0"/>
-              <a:t>Descrever </a:t>
-            </a:r>
-            <a:r>
-              <a:rPr lang="pt-BR" sz="2400" dirty="0" smtClean="0"/>
-              <a:t>os tipos </a:t>
-            </a:r>
-            <a:r>
-              <a:rPr lang="pt-BR" sz="2400" dirty="0" smtClean="0"/>
-              <a:t>de aplicações onde a abordagem pouco ou nada têm a contribuir</a:t>
+              <a:t>Descrever os tipos de aplicações onde a abordagem pouco ou nada têm a contribuir</a:t>
             </a:r>
           </a:p>
         </p:txBody>
@@ -5924,11 +6179,42 @@
           </a:p>
         </p:txBody>
       </p:sp>
+      <p:pic>
+        <p:nvPicPr>
+          <p:cNvPr id="5" name="Imagem 4" descr="img6.jpg"/>
+          <p:cNvPicPr>
+            <a:picLocks noChangeAspect="1"/>
+          </p:cNvPicPr>
+          <p:nvPr/>
+        </p:nvPicPr>
+        <p:blipFill>
+          <a:blip r:embed="rId2"/>
+          <a:stretch>
+            <a:fillRect/>
+          </a:stretch>
+        </p:blipFill>
+        <p:spPr>
+          <a:xfrm>
+            <a:off x="144000" y="5216400"/>
+            <a:ext cx="2163934" cy="1440000"/>
+          </a:xfrm>
+          <a:prstGeom prst="rect">
+            <a:avLst/>
+          </a:prstGeom>
+        </p:spPr>
+      </p:pic>
     </p:spTree>
   </p:cSld>
   <p:clrMapOvr>
     <a:masterClrMapping/>
   </p:clrMapOvr>
+  <p:timing>
+    <p:tnLst>
+      <p:par>
+        <p:cTn id="1" dur="indefinite" restart="never" nodeType="tmRoot"/>
+      </p:par>
+    </p:tnLst>
+  </p:timing>
 </p:sld>
 </file>
 
@@ -5956,7 +6242,7 @@
             <a:spLocks noGrp="1"/>
           </p:cNvSpPr>
           <p:nvPr>
-            <p:ph type="ctrTitle"/>
+            <p:ph type="title"/>
           </p:nvPr>
         </p:nvSpPr>
         <p:spPr/>
@@ -5966,7 +6252,7 @@
           <a:p>
             <a:r>
               <a:rPr lang="pt-BR" dirty="0" smtClean="0"/>
-              <a:t>II – Referencial Teórico</a:t>
+              <a:t>Metodologia</a:t>
             </a:r>
             <a:endParaRPr lang="pt-BR" dirty="0"/>
           </a:p>
@@ -5974,20 +6260,67 @@
       </p:sp>
       <p:sp>
         <p:nvSpPr>
-          <p:cNvPr id="3" name="Subtítulo 2"/>
-          <p:cNvSpPr>
-            <a:spLocks noGrp="1"/>
-          </p:cNvSpPr>
-          <p:nvPr>
-            <p:ph type="subTitle" idx="1"/>
-          </p:nvPr>
-        </p:nvSpPr>
-        <p:spPr/>
-        <p:txBody>
-          <a:bodyPr/>
-          <a:lstStyle/>
-          <a:p>
-            <a:endParaRPr lang="pt-BR"/>
+          <p:cNvPr id="3" name="Espaço Reservado para Conteúdo 2"/>
+          <p:cNvSpPr>
+            <a:spLocks noGrp="1"/>
+          </p:cNvSpPr>
+          <p:nvPr>
+            <p:ph idx="1"/>
+          </p:nvPr>
+        </p:nvSpPr>
+        <p:spPr/>
+        <p:txBody>
+          <a:bodyPr>
+            <a:normAutofit/>
+          </a:bodyPr>
+          <a:lstStyle/>
+          <a:p>
+            <a:r>
+              <a:rPr lang="pt-BR" sz="2400" dirty="0" smtClean="0"/>
+              <a:t>Alguns métodos qualitativos serão utilizados como critério para avaliar o resultado do uso dos </a:t>
+            </a:r>
+            <a:r>
+              <a:rPr lang="pt-BR" sz="2400" i="1" dirty="0" smtClean="0"/>
+              <a:t>progressive web apps</a:t>
+            </a:r>
+          </a:p>
+          <a:p>
+            <a:pPr lvl="1"/>
+            <a:r>
+              <a:rPr lang="pt-BR" sz="2400" dirty="0" smtClean="0"/>
+              <a:t>Escolha dos cenários propícios para a adoção da tecnologia</a:t>
+            </a:r>
+          </a:p>
+          <a:p>
+            <a:pPr lvl="1"/>
+            <a:r>
+              <a:rPr lang="pt-BR" sz="2400" dirty="0" smtClean="0"/>
+              <a:t>Elenco de critérios para avaliar comparativamente a solução </a:t>
+            </a:r>
+            <a:r>
+              <a:rPr lang="pt-BR" sz="2400" dirty="0" smtClean="0"/>
+              <a:t>empregada (uso de processador e memória, consumo de bateria, uso de dados, </a:t>
+            </a:r>
+            <a:r>
+              <a:rPr lang="pt-BR" sz="2400" dirty="0" err="1" smtClean="0"/>
+              <a:t>etc</a:t>
+            </a:r>
+            <a:r>
+              <a:rPr lang="pt-BR" sz="2400" dirty="0" smtClean="0"/>
+              <a:t>)</a:t>
+            </a:r>
+            <a:endParaRPr lang="pt-BR" dirty="0" smtClean="0"/>
+          </a:p>
+          <a:p>
+            <a:pPr lvl="1"/>
+            <a:r>
+              <a:rPr lang="pt-BR" sz="2400" dirty="0" smtClean="0"/>
+              <a:t>Análise sucinta dos resultados</a:t>
+            </a:r>
+          </a:p>
+          <a:p>
+            <a:pPr lvl="1"/>
+            <a:endParaRPr lang="pt-BR" sz="2000" dirty="0"/>
           </a:p>
         </p:txBody>
       </p:sp>
@@ -6015,11 +6348,42 @@
           </a:p>
         </p:txBody>
       </p:sp>
+      <p:pic>
+        <p:nvPicPr>
+          <p:cNvPr id="5" name="Imagem 4" descr="img9.jpg"/>
+          <p:cNvPicPr>
+            <a:picLocks noChangeAspect="1"/>
+          </p:cNvPicPr>
+          <p:nvPr/>
+        </p:nvPicPr>
+        <p:blipFill>
+          <a:blip r:embed="rId2"/>
+          <a:stretch>
+            <a:fillRect/>
+          </a:stretch>
+        </p:blipFill>
+        <p:spPr>
+          <a:xfrm>
+            <a:off x="144000" y="5216400"/>
+            <a:ext cx="1361702" cy="1440000"/>
+          </a:xfrm>
+          <a:prstGeom prst="rect">
+            <a:avLst/>
+          </a:prstGeom>
+        </p:spPr>
+      </p:pic>
     </p:spTree>
   </p:cSld>
   <p:clrMapOvr>
     <a:masterClrMapping/>
   </p:clrMapOvr>
+  <p:timing>
+    <p:tnLst>
+      <p:par>
+        <p:cTn id="1" dur="indefinite" restart="never" nodeType="tmRoot"/>
+      </p:par>
+    </p:tnLst>
+  </p:timing>
 </p:sld>
 </file>
 
@@ -6047,92 +6411,37 @@
             <a:spLocks noGrp="1"/>
           </p:cNvSpPr>
           <p:nvPr>
-            <p:ph type="title"/>
-          </p:nvPr>
-        </p:nvSpPr>
-        <p:spPr/>
-        <p:txBody>
-          <a:bodyPr/>
-          <a:lstStyle/>
-          <a:p>
-            <a:r>
-              <a:rPr lang="pt-BR" i="1" dirty="0" smtClean="0"/>
-              <a:t>Progressive Web Apps</a:t>
-            </a:r>
-            <a:endParaRPr lang="pt-BR" i="1" dirty="0"/>
-          </a:p>
-        </p:txBody>
-      </p:sp>
-      <p:sp>
-        <p:nvSpPr>
-          <p:cNvPr id="3" name="Espaço Reservado para Conteúdo 2"/>
-          <p:cNvSpPr>
-            <a:spLocks noGrp="1"/>
-          </p:cNvSpPr>
-          <p:nvPr>
-            <p:ph idx="1"/>
-          </p:nvPr>
-        </p:nvSpPr>
-        <p:spPr/>
-        <p:txBody>
-          <a:bodyPr/>
-          <a:lstStyle/>
-          <a:p>
-            <a:r>
-              <a:rPr lang="pt-BR" sz="2400" dirty="0" smtClean="0"/>
-              <a:t>Conjunto de tecnologias</a:t>
-            </a:r>
-          </a:p>
-          <a:p>
-            <a:pPr lvl="1"/>
-            <a:r>
-              <a:rPr lang="pt-BR" sz="2400" dirty="0" smtClean="0"/>
-              <a:t>Visual de aplicativos nativos</a:t>
-            </a:r>
-          </a:p>
-          <a:p>
-            <a:pPr lvl="1"/>
-            <a:r>
-              <a:rPr lang="pt-BR" sz="2400" dirty="0" smtClean="0"/>
-              <a:t>Carregamento rápido e confiável</a:t>
-            </a:r>
-          </a:p>
-          <a:p>
-            <a:pPr lvl="1"/>
-            <a:r>
-              <a:rPr lang="pt-BR" sz="2400" dirty="0" smtClean="0"/>
-              <a:t>Seguro</a:t>
-            </a:r>
-          </a:p>
-          <a:p>
-            <a:pPr lvl="1"/>
-            <a:r>
-              <a:rPr lang="pt-BR" sz="2400" dirty="0" err="1" smtClean="0"/>
-              <a:t>Indexável</a:t>
-            </a:r>
-            <a:endParaRPr lang="pt-BR" sz="2400" dirty="0" smtClean="0"/>
-          </a:p>
-          <a:p>
-            <a:pPr lvl="1"/>
-            <a:r>
-              <a:rPr lang="pt-BR" sz="2400" dirty="0" smtClean="0"/>
-              <a:t>Ícone de atalho na </a:t>
-            </a:r>
-            <a:r>
-              <a:rPr lang="pt-BR" sz="2400" i="1" dirty="0" err="1" smtClean="0"/>
-              <a:t>homescreen</a:t>
-            </a:r>
-            <a:r>
-              <a:rPr lang="pt-BR" sz="2400" i="1" dirty="0" smtClean="0"/>
-              <a:t> </a:t>
-            </a:r>
-            <a:r>
-              <a:rPr lang="pt-BR" sz="2400" dirty="0" smtClean="0"/>
-              <a:t>do aparelho</a:t>
-            </a:r>
-          </a:p>
-          <a:p>
-            <a:pPr lvl="1"/>
+            <p:ph type="ctrTitle"/>
+          </p:nvPr>
+        </p:nvSpPr>
+        <p:spPr/>
+        <p:txBody>
+          <a:bodyPr/>
+          <a:lstStyle/>
+          <a:p>
+            <a:r>
+              <a:rPr lang="pt-BR" dirty="0" smtClean="0"/>
+              <a:t>II – Referencial Teórico</a:t>
+            </a:r>
+            <a:endParaRPr lang="pt-BR" dirty="0"/>
+          </a:p>
+        </p:txBody>
+      </p:sp>
+      <p:sp>
+        <p:nvSpPr>
+          <p:cNvPr id="3" name="Subtítulo 2"/>
+          <p:cNvSpPr>
+            <a:spLocks noGrp="1"/>
+          </p:cNvSpPr>
+          <p:nvPr>
+            <p:ph type="subTitle" idx="1"/>
+          </p:nvPr>
+        </p:nvSpPr>
+        <p:spPr/>
+        <p:txBody>
+          <a:bodyPr/>
+          <a:lstStyle/>
+          <a:p>
             <a:endParaRPr lang="pt-BR" dirty="0"/>
           </a:p>
         </p:txBody>
@@ -6161,11 +6470,47 @@
           </a:p>
         </p:txBody>
       </p:sp>
+      <p:pic>
+        <p:nvPicPr>
+          <p:cNvPr id="5" name="Picture" descr="https://lh6.googleusercontent.com/Oeqrb8RwJRCAQ_-7gXnj3kjQ5OLUTKFX14h9rXgIsBwOL5x7HI0UfDUzzEEHfEyS_3bWZIOJm62_Vz_KRgA6vvjHnQLJNza8genuCBgp5s8UeiBO4Lm3uvpprtdmnitseQp8Zso"/>
+          <p:cNvPicPr/>
+          <p:nvPr/>
+        </p:nvPicPr>
+        <p:blipFill>
+          <a:blip r:embed="rId2"/>
+          <a:stretch>
+            <a:fillRect/>
+          </a:stretch>
+        </p:blipFill>
+        <p:spPr bwMode="auto">
+          <a:xfrm>
+            <a:off x="142844" y="5214950"/>
+            <a:ext cx="1583690" cy="1494790"/>
+          </a:xfrm>
+          <a:prstGeom prst="rect">
+            <a:avLst/>
+          </a:prstGeom>
+          <a:noFill/>
+          <a:ln w="9525">
+            <a:noFill/>
+            <a:miter lim="800000"/>
+            <a:headEnd/>
+            <a:tailEnd/>
+          </a:ln>
+        </p:spPr>
+      </p:pic>
     </p:spTree>
   </p:cSld>
   <p:clrMapOvr>
     <a:masterClrMapping/>
   </p:clrMapOvr>
+  <p:timing>
+    <p:tnLst>
+      <p:par>
+        <p:cTn id="1" dur="indefinite" restart="never" nodeType="tmRoot"/>
+      </p:par>
+    </p:tnLst>
+  </p:timing>
 </p:sld>
 </file>
 

</xml_diff>

<commit_message>
Sat Jun 17 2017 23:02:41
</commit_message>
<xml_diff>
--- a/apresentacao.pptx
+++ b/apresentacao.pptx
@@ -3727,26 +3727,52 @@
           <a:lstStyle/>
           <a:p>
             <a:r>
+              <a:rPr lang="pt-BR" sz="2400" i="1" dirty="0" smtClean="0"/>
+              <a:t>Web apps </a:t>
+            </a:r>
+            <a:r>
               <a:rPr lang="pt-BR" sz="2400" dirty="0" smtClean="0"/>
-              <a:t>Conjunto de tecnologias</a:t>
-            </a:r>
+              <a:t>“melhorados”</a:t>
+            </a:r>
+            <a:endParaRPr lang="pt-BR" sz="2000" dirty="0" smtClean="0"/>
           </a:p>
           <a:p>
             <a:pPr lvl="1"/>
             <a:r>
               <a:rPr lang="pt-BR" sz="2400" dirty="0" smtClean="0"/>
-              <a:t>Visual de aplicativos nativos</a:t>
-            </a:r>
+              <a:t>Funcionamento </a:t>
+            </a:r>
+            <a:r>
+              <a:rPr lang="pt-BR" sz="2400" i="1" dirty="0" smtClean="0"/>
+              <a:t>off-line </a:t>
+            </a:r>
+            <a:r>
+              <a:rPr lang="pt-BR" sz="2400" dirty="0" smtClean="0"/>
+              <a:t>(</a:t>
+            </a:r>
+            <a:r>
+              <a:rPr lang="pt-BR" sz="2400" i="1" dirty="0" smtClean="0"/>
+              <a:t>service </a:t>
+            </a:r>
+            <a:r>
+              <a:rPr lang="pt-BR" sz="2400" i="1" dirty="0" err="1" smtClean="0"/>
+              <a:t>workers</a:t>
+            </a:r>
+            <a:r>
+              <a:rPr lang="pt-BR" sz="2400" dirty="0" smtClean="0"/>
+              <a:t>)</a:t>
+            </a:r>
+            <a:endParaRPr lang="pt-BR" sz="2400" dirty="0" smtClean="0"/>
           </a:p>
           <a:p>
             <a:pPr lvl="1"/>
             <a:r>
               <a:rPr lang="pt-BR" sz="2400" dirty="0" smtClean="0"/>
-              <a:t>Carregamento rápido e </a:t>
+              <a:t>Carregamento </a:t>
             </a:r>
             <a:r>
               <a:rPr lang="pt-BR" sz="2400" dirty="0" smtClean="0"/>
-              <a:t>confiável (</a:t>
+              <a:t>rápido e confiável (</a:t>
             </a:r>
             <a:r>
               <a:rPr lang="pt-BR" sz="2400" i="1" dirty="0" smtClean="0"/>
@@ -3760,6 +3786,37 @@
               <a:rPr lang="pt-BR" sz="2400" dirty="0" smtClean="0"/>
               <a:t>)</a:t>
             </a:r>
+          </a:p>
+          <a:p>
+            <a:pPr lvl="1"/>
+            <a:r>
+              <a:rPr lang="pt-BR" sz="2400" dirty="0" smtClean="0"/>
+              <a:t>Ícone de atalho na </a:t>
+            </a:r>
+            <a:r>
+              <a:rPr lang="pt-BR" sz="2400" i="1" dirty="0" err="1" smtClean="0"/>
+              <a:t>homescreen</a:t>
+            </a:r>
+            <a:r>
+              <a:rPr lang="pt-BR" sz="2400" i="1" dirty="0" smtClean="0"/>
+              <a:t> </a:t>
+            </a:r>
+            <a:r>
+              <a:rPr lang="pt-BR" sz="2400" dirty="0" smtClean="0"/>
+              <a:t>do aparelho (</a:t>
+            </a:r>
+            <a:r>
+              <a:rPr lang="pt-BR" sz="2400" i="1" dirty="0" smtClean="0"/>
+              <a:t>web </a:t>
+            </a:r>
+            <a:r>
+              <a:rPr lang="pt-BR" sz="2400" i="1" dirty="0" err="1" smtClean="0"/>
+              <a:t>manifest</a:t>
+            </a:r>
+            <a:r>
+              <a:rPr lang="pt-BR" sz="2400" dirty="0" smtClean="0"/>
+              <a:t>)</a:t>
+            </a:r>
             <a:endParaRPr lang="pt-BR" sz="2400" dirty="0" smtClean="0"/>
           </a:p>
           <a:p>
@@ -3768,7 +3825,6 @@
               <a:rPr lang="pt-BR" sz="2400" dirty="0" smtClean="0"/>
               <a:t>Seguro (uso obrigatório de HTTPS)</a:t>
             </a:r>
-            <a:endParaRPr lang="pt-BR" sz="2400" dirty="0" smtClean="0"/>
           </a:p>
           <a:p>
             <a:pPr lvl="1"/>
@@ -3782,68 +3838,9 @@
             <a:pPr lvl="1"/>
             <a:r>
               <a:rPr lang="pt-BR" sz="2400" dirty="0" smtClean="0"/>
-              <a:t>Ícone de atalho na </a:t>
-            </a:r>
-            <a:r>
-              <a:rPr lang="pt-BR" sz="2400" i="1" dirty="0" err="1" smtClean="0"/>
-              <a:t>homescreen</a:t>
-            </a:r>
-            <a:r>
-              <a:rPr lang="pt-BR" sz="2400" i="1" dirty="0" smtClean="0"/>
-              <a:t> </a:t>
-            </a:r>
-            <a:r>
-              <a:rPr lang="pt-BR" sz="2400" dirty="0" smtClean="0"/>
-              <a:t>do </a:t>
-            </a:r>
-            <a:r>
-              <a:rPr lang="pt-BR" sz="2400" dirty="0" smtClean="0"/>
-              <a:t>aparelho (</a:t>
-            </a:r>
-            <a:r>
-              <a:rPr lang="pt-BR" sz="2400" i="1" dirty="0" smtClean="0"/>
-              <a:t>web </a:t>
-            </a:r>
-            <a:r>
-              <a:rPr lang="pt-BR" sz="2400" i="1" dirty="0" err="1" smtClean="0"/>
-              <a:t>manifest</a:t>
-            </a:r>
-            <a:r>
-              <a:rPr lang="pt-BR" sz="2400" dirty="0" smtClean="0"/>
-              <a:t>)</a:t>
-            </a:r>
-          </a:p>
-          <a:p>
-            <a:pPr lvl="1"/>
-            <a:r>
-              <a:rPr lang="pt-BR" sz="2400" dirty="0" smtClean="0"/>
-              <a:t>Funcionamento </a:t>
-            </a:r>
-            <a:r>
-              <a:rPr lang="pt-BR" sz="2400" i="1" dirty="0" smtClean="0"/>
-              <a:t>off-line </a:t>
-            </a:r>
-            <a:r>
-              <a:rPr lang="pt-BR" sz="2400" dirty="0" smtClean="0"/>
-              <a:t>(</a:t>
-            </a:r>
-            <a:r>
-              <a:rPr lang="pt-BR" sz="2400" i="1" dirty="0" smtClean="0"/>
-              <a:t>service </a:t>
-            </a:r>
-            <a:r>
-              <a:rPr lang="pt-BR" sz="2400" i="1" dirty="0" err="1" smtClean="0"/>
-              <a:t>workers</a:t>
-            </a:r>
-            <a:r>
-              <a:rPr lang="pt-BR" sz="2400" dirty="0" smtClean="0"/>
-              <a:t>)</a:t>
+              <a:t>Responsivo</a:t>
             </a:r>
             <a:endParaRPr lang="pt-BR" sz="2400" dirty="0" smtClean="0"/>
-          </a:p>
-          <a:p>
-            <a:pPr lvl="1"/>
-            <a:endParaRPr lang="pt-BR" dirty="0"/>
           </a:p>
         </p:txBody>
       </p:sp>
@@ -3982,15 +3979,7 @@
             <a:pPr lvl="1"/>
             <a:r>
               <a:rPr lang="pt-BR" sz="2400" dirty="0" smtClean="0"/>
-              <a:t>Atua como um s</a:t>
-            </a:r>
-            <a:r>
-              <a:rPr lang="pt-BR" sz="2400" dirty="0" smtClean="0"/>
-              <a:t>ervidor </a:t>
-            </a:r>
-            <a:r>
-              <a:rPr lang="pt-BR" sz="2400" dirty="0" smtClean="0"/>
-              <a:t>de </a:t>
+              <a:t>Atua como um servidor de </a:t>
             </a:r>
             <a:r>
               <a:rPr lang="pt-BR" sz="2400" i="1" dirty="0" err="1" smtClean="0"/>
@@ -4002,11 +3991,7 @@
             </a:r>
             <a:r>
               <a:rPr lang="pt-BR" sz="2400" dirty="0" smtClean="0"/>
-              <a:t>de rede </a:t>
-            </a:r>
-            <a:r>
-              <a:rPr lang="pt-BR" sz="2400" dirty="0" smtClean="0"/>
-              <a:t>programável</a:t>
+              <a:t>de rede programável</a:t>
             </a:r>
           </a:p>
           <a:p>
@@ -4014,19 +3999,13 @@
               <a:rPr lang="pt-BR" sz="2400" dirty="0" smtClean="0"/>
               <a:t>Funcionalidades</a:t>
             </a:r>
-            <a:endParaRPr lang="pt-BR" sz="2400" dirty="0" smtClean="0"/>
           </a:p>
           <a:p>
             <a:pPr lvl="1"/>
             <a:r>
               <a:rPr lang="pt-BR" sz="2400" dirty="0" smtClean="0"/>
-              <a:t>Execução em segundo </a:t>
-            </a:r>
-            <a:r>
-              <a:rPr lang="pt-BR" sz="2400" dirty="0" smtClean="0"/>
-              <a:t>plano do aplicativo</a:t>
-            </a:r>
-            <a:endParaRPr lang="pt-BR" sz="2400" dirty="0" smtClean="0"/>
+              <a:t>Execução em segundo plano do aplicativo</a:t>
+            </a:r>
           </a:p>
           <a:p>
             <a:pPr lvl="1"/>
@@ -4044,11 +4023,7 @@
             </a:r>
             <a:r>
               <a:rPr lang="pt-BR" sz="2400" dirty="0" smtClean="0"/>
-              <a:t>dos arquivos </a:t>
-            </a:r>
-            <a:r>
-              <a:rPr lang="pt-BR" sz="2400" dirty="0" smtClean="0"/>
-              <a:t>estáticos</a:t>
+              <a:t>dos arquivos estáticos</a:t>
             </a:r>
           </a:p>
           <a:p>
@@ -4057,7 +4032,6 @@
               <a:rPr lang="pt-BR" sz="2400" dirty="0" smtClean="0"/>
               <a:t>Notificações para reengajamento do usuário</a:t>
             </a:r>
-            <a:endParaRPr lang="pt-BR" sz="2400" dirty="0" smtClean="0"/>
           </a:p>
         </p:txBody>
       </p:sp>
@@ -4300,11 +4274,7 @@
           <a:p>
             <a:r>
               <a:rPr lang="pt-BR" sz="2400" dirty="0" smtClean="0"/>
-              <a:t>Resistência à </a:t>
-            </a:r>
-            <a:r>
-              <a:rPr lang="pt-BR" sz="2400" dirty="0" smtClean="0"/>
-              <a:t>tecnologia (</a:t>
+              <a:t>Resistência à tecnologia (</a:t>
             </a:r>
             <a:r>
               <a:rPr lang="pt-BR" sz="2400" i="1" dirty="0" smtClean="0"/>
@@ -4314,7 +4284,6 @@
               <a:rPr lang="pt-BR" sz="2400" dirty="0" smtClean="0"/>
               <a:t>)</a:t>
             </a:r>
-            <a:endParaRPr lang="pt-BR" sz="2400" dirty="0" smtClean="0"/>
           </a:p>
         </p:txBody>
       </p:sp>
@@ -5088,24 +5057,16 @@
           <a:p>
             <a:r>
               <a:rPr lang="pt-BR" sz="2400" dirty="0" smtClean="0"/>
-              <a:t>https://developers.google.com/web/fundamentals</a:t>
-            </a:r>
+              <a:t>https://developers.google.com/web/fundamentals/</a:t>
+            </a:r>
+          </a:p>
+          <a:p>
+            <a:endParaRPr lang="pt-BR" sz="2400" dirty="0" smtClean="0"/>
+          </a:p>
+          <a:p>
             <a:r>
               <a:rPr lang="pt-BR" sz="2400" dirty="0" smtClean="0"/>
-              <a:t>/</a:t>
-            </a:r>
-          </a:p>
-          <a:p>
-            <a:endParaRPr lang="pt-BR" sz="2400" dirty="0" smtClean="0"/>
-          </a:p>
-          <a:p>
-            <a:r>
-              <a:rPr lang="pt-BR" sz="2400" dirty="0" smtClean="0"/>
-              <a:t>https://</a:t>
-            </a:r>
-            <a:r>
-              <a:rPr lang="pt-BR" sz="2400" dirty="0" smtClean="0"/>
-              <a:t>developer.mozilla.org/en-US/Apps/Progressive</a:t>
+              <a:t>https://developer.mozilla.org/en-US/Apps/Progressive</a:t>
             </a:r>
           </a:p>
           <a:p>
@@ -5116,23 +5077,14 @@
               <a:rPr lang="pt-BR" sz="2400" dirty="0" smtClean="0"/>
               <a:t>https://developers.google.com/web/showcase/</a:t>
             </a:r>
+          </a:p>
+          <a:p>
             <a:endParaRPr lang="pt-BR" sz="2400" dirty="0" smtClean="0"/>
           </a:p>
           <a:p>
-            <a:endParaRPr lang="pt-BR" sz="2400" dirty="0" smtClean="0"/>
-          </a:p>
-          <a:p>
             <a:r>
               <a:rPr lang="pt-BR" sz="2400" dirty="0" smtClean="0"/>
-              <a:t>https</a:t>
-            </a:r>
-            <a:r>
-              <a:rPr lang="pt-BR" sz="2400" dirty="0" smtClean="0"/>
-              <a:t>://pwa.rocks</a:t>
-            </a:r>
-            <a:r>
-              <a:rPr lang="pt-BR" sz="2400" dirty="0" smtClean="0"/>
-              <a:t>/</a:t>
+              <a:t>https://pwa.rocks/</a:t>
             </a:r>
           </a:p>
           <a:p>
@@ -5362,7 +5314,6 @@
               <a:rPr lang="pt-BR" sz="2400" dirty="0" smtClean="0"/>
               <a:t>Metodologia</a:t>
             </a:r>
-            <a:endParaRPr lang="pt-BR" sz="2400" dirty="0" smtClean="0"/>
           </a:p>
           <a:p>
             <a:r>
@@ -5403,7 +5354,6 @@
               <a:rPr lang="pt-BR" sz="2400" dirty="0" smtClean="0"/>
               <a:t>Cronograma</a:t>
             </a:r>
-            <a:endParaRPr lang="pt-BR" sz="2400" dirty="0" smtClean="0"/>
           </a:p>
           <a:p>
             <a:pPr lvl="1"/>
@@ -5780,13 +5730,8 @@
             <a:pPr lvl="1"/>
             <a:r>
               <a:rPr lang="pt-BR" sz="2400" dirty="0" smtClean="0"/>
-              <a:t>Uso </a:t>
-            </a:r>
-            <a:r>
-              <a:rPr lang="pt-BR" sz="2400" dirty="0" smtClean="0"/>
-              <a:t>burocratizado</a:t>
-            </a:r>
-            <a:endParaRPr lang="pt-BR" sz="2400" dirty="0" smtClean="0"/>
+              <a:t>Uso burocratizado</a:t>
+            </a:r>
           </a:p>
           <a:p>
             <a:pPr lvl="1"/>
@@ -5931,23 +5876,14 @@
             <a:pPr lvl="1"/>
             <a:r>
               <a:rPr lang="pt-BR" sz="2400" dirty="0" smtClean="0"/>
-              <a:t>Podem ser utilizados sem </a:t>
-            </a:r>
+              <a:t>Podem ser utilizados sem prévia instalação</a:t>
+            </a:r>
+          </a:p>
+          <a:p>
+            <a:pPr lvl="1"/>
             <a:r>
               <a:rPr lang="pt-BR" sz="2400" dirty="0" smtClean="0"/>
-              <a:t>prévia instalação</a:t>
-            </a:r>
-            <a:endParaRPr lang="pt-BR" sz="2400" dirty="0" smtClean="0"/>
-          </a:p>
-          <a:p>
-            <a:pPr lvl="1"/>
-            <a:r>
-              <a:rPr lang="pt-BR" sz="2400" dirty="0" smtClean="0"/>
-              <a:t>Menor custo </a:t>
-            </a:r>
-            <a:r>
-              <a:rPr lang="pt-BR" sz="2400" dirty="0" smtClean="0"/>
-              <a:t>no desenvolvimento (</a:t>
+              <a:t>Menor custo no desenvolvimento (</a:t>
             </a:r>
             <a:r>
               <a:rPr lang="pt-BR" sz="2400" dirty="0" err="1" smtClean="0"/>
@@ -5957,7 +5893,6 @@
               <a:rPr lang="pt-BR" sz="2400" dirty="0" smtClean="0"/>
               <a:t>)</a:t>
             </a:r>
-            <a:endParaRPr lang="pt-BR" sz="2400" dirty="0" smtClean="0"/>
           </a:p>
           <a:p>
             <a:r>
@@ -5983,7 +5918,11 @@
             <a:pPr lvl="1"/>
             <a:r>
               <a:rPr lang="pt-BR" sz="2400" dirty="0" smtClean="0"/>
-              <a:t>Dificuldade no acesso à recursos do aparelho</a:t>
+              <a:t>Limitação no </a:t>
+            </a:r>
+            <a:r>
+              <a:rPr lang="pt-BR" sz="2400" dirty="0" smtClean="0"/>
+              <a:t>acesso à recursos do aparelho</a:t>
             </a:r>
             <a:endParaRPr lang="pt-BR" sz="2400" dirty="0"/>
           </a:p>
@@ -6115,17 +6054,12 @@
             </a:r>
             <a:r>
               <a:rPr lang="pt-BR" sz="2400" i="1" dirty="0" smtClean="0"/>
-              <a:t>progressive web </a:t>
-            </a:r>
-            <a:r>
-              <a:rPr lang="pt-BR" sz="2400" i="1" dirty="0" smtClean="0"/>
-              <a:t>app </a:t>
+              <a:t>progressive web app </a:t>
             </a:r>
             <a:r>
               <a:rPr lang="pt-BR" sz="2400" dirty="0" smtClean="0"/>
               <a:t>(PWA)</a:t>
             </a:r>
-            <a:endParaRPr lang="pt-BR" sz="2400" dirty="0" smtClean="0"/>
           </a:p>
           <a:p>
             <a:pPr lvl="0"/>
@@ -6139,18 +6073,18 @@
             </a:r>
             <a:r>
               <a:rPr lang="pt-BR" sz="2400" dirty="0" smtClean="0"/>
-              <a:t> em </a:t>
-            </a:r>
+              <a:t> em relação à aplicações nativas</a:t>
+            </a:r>
+            <a:endParaRPr lang="pt-BR" sz="2400" i="1" dirty="0" smtClean="0"/>
+          </a:p>
+          <a:p>
             <a:r>
               <a:rPr lang="pt-BR" sz="2400" dirty="0" smtClean="0"/>
-              <a:t>relação à aplicações nativas</a:t>
-            </a:r>
-            <a:endParaRPr lang="pt-BR" sz="2400" i="1" dirty="0" smtClean="0"/>
-          </a:p>
-          <a:p>
+              <a:t>Apontar os </a:t>
+            </a:r>
             <a:r>
               <a:rPr lang="pt-BR" sz="2400" dirty="0" smtClean="0"/>
-              <a:t>Descrever os tipos de aplicações onde a abordagem pouco ou nada têm a contribuir</a:t>
+              <a:t>tipos de aplicações onde a abordagem pouco ou nada têm a contribuir</a:t>
             </a:r>
           </a:p>
         </p:txBody>
@@ -6295,11 +6229,7 @@
             <a:pPr lvl="1"/>
             <a:r>
               <a:rPr lang="pt-BR" sz="2400" dirty="0" smtClean="0"/>
-              <a:t>Elenco de critérios para avaliar comparativamente a solução </a:t>
-            </a:r>
-            <a:r>
-              <a:rPr lang="pt-BR" sz="2400" dirty="0" smtClean="0"/>
-              <a:t>empregada (uso de processador e memória, consumo de bateria, uso de dados, </a:t>
+              <a:t>Elenco de critérios para avaliar comparativamente a solução empregada (uso de processador e memória, consumo de bateria, uso de dados, </a:t>
             </a:r>
             <a:r>
               <a:rPr lang="pt-BR" sz="2400" dirty="0" err="1" smtClean="0"/>

</xml_diff>